<commit_message>
Added Login Sequence Diagram section in DG, with pptx and picture
</commit_message>
<xml_diff>
--- a/docs/diagrams/UiComponentClassDiagram.pptx
+++ b/docs/diagrams/UiComponentClassDiagram.pptx
@@ -208,7 +208,7 @@
           <a:p>
             <a:fld id="{F5CC4B3F-88C1-4FFA-B1B6-F41C21DC6924}" type="datetimeFigureOut">
               <a:rPr lang="en-US" smtClean="0"/>
-              <a:t>1/7/2017</a:t>
+              <a:t>10/12/2018</a:t>
             </a:fld>
             <a:endParaRPr lang="en-US"/>
           </a:p>
@@ -654,7 +654,7 @@
           <a:p>
             <a:fld id="{78C97017-6FC3-485B-9764-EAC9E56C1D49}" type="datetimeFigureOut">
               <a:rPr lang="en-US" smtClean="0"/>
-              <a:t>1/7/2017</a:t>
+              <a:t>10/12/2018</a:t>
             </a:fld>
             <a:endParaRPr lang="en-US"/>
           </a:p>
@@ -822,7 +822,7 @@
           <a:p>
             <a:fld id="{78C97017-6FC3-485B-9764-EAC9E56C1D49}" type="datetimeFigureOut">
               <a:rPr lang="en-US" smtClean="0"/>
-              <a:t>1/7/2017</a:t>
+              <a:t>10/12/2018</a:t>
             </a:fld>
             <a:endParaRPr lang="en-US"/>
           </a:p>
@@ -1000,7 +1000,7 @@
           <a:p>
             <a:fld id="{78C97017-6FC3-485B-9764-EAC9E56C1D49}" type="datetimeFigureOut">
               <a:rPr lang="en-US" smtClean="0"/>
-              <a:t>1/7/2017</a:t>
+              <a:t>10/12/2018</a:t>
             </a:fld>
             <a:endParaRPr lang="en-US"/>
           </a:p>
@@ -1168,7 +1168,7 @@
           <a:p>
             <a:fld id="{78C97017-6FC3-485B-9764-EAC9E56C1D49}" type="datetimeFigureOut">
               <a:rPr lang="en-US" smtClean="0"/>
-              <a:t>1/7/2017</a:t>
+              <a:t>10/12/2018</a:t>
             </a:fld>
             <a:endParaRPr lang="en-US"/>
           </a:p>
@@ -1413,7 +1413,7 @@
           <a:p>
             <a:fld id="{78C97017-6FC3-485B-9764-EAC9E56C1D49}" type="datetimeFigureOut">
               <a:rPr lang="en-US" smtClean="0"/>
-              <a:t>1/7/2017</a:t>
+              <a:t>10/12/2018</a:t>
             </a:fld>
             <a:endParaRPr lang="en-US"/>
           </a:p>
@@ -1698,7 +1698,7 @@
           <a:p>
             <a:fld id="{78C97017-6FC3-485B-9764-EAC9E56C1D49}" type="datetimeFigureOut">
               <a:rPr lang="en-US" smtClean="0"/>
-              <a:t>1/7/2017</a:t>
+              <a:t>10/12/2018</a:t>
             </a:fld>
             <a:endParaRPr lang="en-US"/>
           </a:p>
@@ -2117,7 +2117,7 @@
           <a:p>
             <a:fld id="{78C97017-6FC3-485B-9764-EAC9E56C1D49}" type="datetimeFigureOut">
               <a:rPr lang="en-US" smtClean="0"/>
-              <a:t>1/7/2017</a:t>
+              <a:t>10/12/2018</a:t>
             </a:fld>
             <a:endParaRPr lang="en-US"/>
           </a:p>
@@ -2234,7 +2234,7 @@
           <a:p>
             <a:fld id="{78C97017-6FC3-485B-9764-EAC9E56C1D49}" type="datetimeFigureOut">
               <a:rPr lang="en-US" smtClean="0"/>
-              <a:t>1/7/2017</a:t>
+              <a:t>10/12/2018</a:t>
             </a:fld>
             <a:endParaRPr lang="en-US"/>
           </a:p>
@@ -2329,7 +2329,7 @@
           <a:p>
             <a:fld id="{78C97017-6FC3-485B-9764-EAC9E56C1D49}" type="datetimeFigureOut">
               <a:rPr lang="en-US" smtClean="0"/>
-              <a:t>1/7/2017</a:t>
+              <a:t>10/12/2018</a:t>
             </a:fld>
             <a:endParaRPr lang="en-US"/>
           </a:p>
@@ -2604,7 +2604,7 @@
           <a:p>
             <a:fld id="{78C97017-6FC3-485B-9764-EAC9E56C1D49}" type="datetimeFigureOut">
               <a:rPr lang="en-US" smtClean="0"/>
-              <a:t>1/7/2017</a:t>
+              <a:t>10/12/2018</a:t>
             </a:fld>
             <a:endParaRPr lang="en-US"/>
           </a:p>
@@ -2856,7 +2856,7 @@
           <a:p>
             <a:fld id="{78C97017-6FC3-485B-9764-EAC9E56C1D49}" type="datetimeFigureOut">
               <a:rPr lang="en-US" smtClean="0"/>
-              <a:t>1/7/2017</a:t>
+              <a:t>10/12/2018</a:t>
             </a:fld>
             <a:endParaRPr lang="en-US"/>
           </a:p>
@@ -3067,7 +3067,7 @@
           <a:p>
             <a:fld id="{78C97017-6FC3-485B-9764-EAC9E56C1D49}" type="datetimeFigureOut">
               <a:rPr lang="en-US" smtClean="0"/>
-              <a:t>1/7/2017</a:t>
+              <a:t>10/12/2018</a:t>
             </a:fld>
             <a:endParaRPr lang="en-US"/>
           </a:p>

</xml_diff>

<commit_message>
Updated code and comments. Updated part of DG.
</commit_message>
<xml_diff>
--- a/docs/diagrams/UiComponentClassDiagram.pptx
+++ b/docs/diagrams/UiComponentClassDiagram.pptx
@@ -208,7 +208,7 @@
           <a:p>
             <a:fld id="{F5CC4B3F-88C1-4FFA-B1B6-F41C21DC6924}" type="datetimeFigureOut">
               <a:rPr lang="en-US" smtClean="0"/>
-              <a:t>1/7/2017</a:t>
+              <a:t>10/26/2018</a:t>
             </a:fld>
             <a:endParaRPr lang="en-US"/>
           </a:p>
@@ -475,6 +475,90 @@
 </p:notesMaster>
 </file>
 
+<file path=ppt/notesSlides/notesSlide1.xml><?xml version="1.0" encoding="utf-8"?>
+<p:notes xmlns:a="http://schemas.openxmlformats.org/drawingml/2006/main" xmlns:r="http://schemas.openxmlformats.org/officeDocument/2006/relationships" xmlns:p="http://schemas.openxmlformats.org/presentationml/2006/main">
+  <p:cSld>
+    <p:spTree>
+      <p:nvGrpSpPr>
+        <p:cNvPr id="1" name=""/>
+        <p:cNvGrpSpPr/>
+        <p:nvPr/>
+      </p:nvGrpSpPr>
+      <p:grpSpPr>
+        <a:xfrm>
+          <a:off x="0" y="0"/>
+          <a:ext cx="0" cy="0"/>
+          <a:chOff x="0" y="0"/>
+          <a:chExt cx="0" cy="0"/>
+        </a:xfrm>
+      </p:grpSpPr>
+      <p:sp>
+        <p:nvSpPr>
+          <p:cNvPr id="2" name="Slide Image Placeholder 1"/>
+          <p:cNvSpPr>
+            <a:spLocks noGrp="1" noRot="1" noChangeAspect="1"/>
+          </p:cNvSpPr>
+          <p:nvPr>
+            <p:ph type="sldImg"/>
+          </p:nvPr>
+        </p:nvSpPr>
+        <p:spPr/>
+      </p:sp>
+      <p:sp>
+        <p:nvSpPr>
+          <p:cNvPr id="3" name="Notes Placeholder 2"/>
+          <p:cNvSpPr>
+            <a:spLocks noGrp="1"/>
+          </p:cNvSpPr>
+          <p:nvPr>
+            <p:ph type="body" idx="1"/>
+          </p:nvPr>
+        </p:nvSpPr>
+        <p:spPr/>
+        <p:txBody>
+          <a:bodyPr/>
+          <a:lstStyle/>
+          <a:p>
+            <a:endParaRPr lang="en-SG" dirty="0"/>
+          </a:p>
+        </p:txBody>
+      </p:sp>
+      <p:sp>
+        <p:nvSpPr>
+          <p:cNvPr id="4" name="Slide Number Placeholder 3"/>
+          <p:cNvSpPr>
+            <a:spLocks noGrp="1"/>
+          </p:cNvSpPr>
+          <p:nvPr>
+            <p:ph type="sldNum" sz="quarter" idx="5"/>
+          </p:nvPr>
+        </p:nvSpPr>
+        <p:spPr/>
+        <p:txBody>
+          <a:bodyPr/>
+          <a:lstStyle/>
+          <a:p>
+            <a:fld id="{5A7AB025-77E3-4BD1-A2FD-B3183DBA47A3}" type="slidenum">
+              <a:rPr lang="en-US" smtClean="0"/>
+              <a:t>1</a:t>
+            </a:fld>
+            <a:endParaRPr lang="en-US"/>
+          </a:p>
+        </p:txBody>
+      </p:sp>
+    </p:spTree>
+    <p:extLst>
+      <p:ext uri="{BB962C8B-B14F-4D97-AF65-F5344CB8AC3E}">
+        <p14:creationId xmlns:p14="http://schemas.microsoft.com/office/powerpoint/2010/main" val="4148959668"/>
+      </p:ext>
+    </p:extLst>
+  </p:cSld>
+  <p:clrMapOvr>
+    <a:masterClrMapping/>
+  </p:clrMapOvr>
+</p:notes>
+</file>
+
 <file path=ppt/slideLayouts/slideLayout1.xml><?xml version="1.0" encoding="utf-8"?>
 <p:sldLayout xmlns:a="http://schemas.openxmlformats.org/drawingml/2006/main" xmlns:r="http://schemas.openxmlformats.org/officeDocument/2006/relationships" xmlns:p="http://schemas.openxmlformats.org/presentationml/2006/main" type="title" preserve="1">
   <p:cSld name="Title Slide">
@@ -654,7 +738,7 @@
           <a:p>
             <a:fld id="{78C97017-6FC3-485B-9764-EAC9E56C1D49}" type="datetimeFigureOut">
               <a:rPr lang="en-US" smtClean="0"/>
-              <a:t>1/7/2017</a:t>
+              <a:t>10/26/2018</a:t>
             </a:fld>
             <a:endParaRPr lang="en-US"/>
           </a:p>
@@ -822,7 +906,7 @@
           <a:p>
             <a:fld id="{78C97017-6FC3-485B-9764-EAC9E56C1D49}" type="datetimeFigureOut">
               <a:rPr lang="en-US" smtClean="0"/>
-              <a:t>1/7/2017</a:t>
+              <a:t>10/26/2018</a:t>
             </a:fld>
             <a:endParaRPr lang="en-US"/>
           </a:p>
@@ -1000,7 +1084,7 @@
           <a:p>
             <a:fld id="{78C97017-6FC3-485B-9764-EAC9E56C1D49}" type="datetimeFigureOut">
               <a:rPr lang="en-US" smtClean="0"/>
-              <a:t>1/7/2017</a:t>
+              <a:t>10/26/2018</a:t>
             </a:fld>
             <a:endParaRPr lang="en-US"/>
           </a:p>
@@ -1168,7 +1252,7 @@
           <a:p>
             <a:fld id="{78C97017-6FC3-485B-9764-EAC9E56C1D49}" type="datetimeFigureOut">
               <a:rPr lang="en-US" smtClean="0"/>
-              <a:t>1/7/2017</a:t>
+              <a:t>10/26/2018</a:t>
             </a:fld>
             <a:endParaRPr lang="en-US"/>
           </a:p>
@@ -1413,7 +1497,7 @@
           <a:p>
             <a:fld id="{78C97017-6FC3-485B-9764-EAC9E56C1D49}" type="datetimeFigureOut">
               <a:rPr lang="en-US" smtClean="0"/>
-              <a:t>1/7/2017</a:t>
+              <a:t>10/26/2018</a:t>
             </a:fld>
             <a:endParaRPr lang="en-US"/>
           </a:p>
@@ -1698,7 +1782,7 @@
           <a:p>
             <a:fld id="{78C97017-6FC3-485B-9764-EAC9E56C1D49}" type="datetimeFigureOut">
               <a:rPr lang="en-US" smtClean="0"/>
-              <a:t>1/7/2017</a:t>
+              <a:t>10/26/2018</a:t>
             </a:fld>
             <a:endParaRPr lang="en-US"/>
           </a:p>
@@ -2117,7 +2201,7 @@
           <a:p>
             <a:fld id="{78C97017-6FC3-485B-9764-EAC9E56C1D49}" type="datetimeFigureOut">
               <a:rPr lang="en-US" smtClean="0"/>
-              <a:t>1/7/2017</a:t>
+              <a:t>10/26/2018</a:t>
             </a:fld>
             <a:endParaRPr lang="en-US"/>
           </a:p>
@@ -2234,7 +2318,7 @@
           <a:p>
             <a:fld id="{78C97017-6FC3-485B-9764-EAC9E56C1D49}" type="datetimeFigureOut">
               <a:rPr lang="en-US" smtClean="0"/>
-              <a:t>1/7/2017</a:t>
+              <a:t>10/26/2018</a:t>
             </a:fld>
             <a:endParaRPr lang="en-US"/>
           </a:p>
@@ -2329,7 +2413,7 @@
           <a:p>
             <a:fld id="{78C97017-6FC3-485B-9764-EAC9E56C1D49}" type="datetimeFigureOut">
               <a:rPr lang="en-US" smtClean="0"/>
-              <a:t>1/7/2017</a:t>
+              <a:t>10/26/2018</a:t>
             </a:fld>
             <a:endParaRPr lang="en-US"/>
           </a:p>
@@ -2604,7 +2688,7 @@
           <a:p>
             <a:fld id="{78C97017-6FC3-485B-9764-EAC9E56C1D49}" type="datetimeFigureOut">
               <a:rPr lang="en-US" smtClean="0"/>
-              <a:t>1/7/2017</a:t>
+              <a:t>10/26/2018</a:t>
             </a:fld>
             <a:endParaRPr lang="en-US"/>
           </a:p>
@@ -2856,7 +2940,7 @@
           <a:p>
             <a:fld id="{78C97017-6FC3-485B-9764-EAC9E56C1D49}" type="datetimeFigureOut">
               <a:rPr lang="en-US" smtClean="0"/>
-              <a:t>1/7/2017</a:t>
+              <a:t>10/26/2018</a:t>
             </a:fld>
             <a:endParaRPr lang="en-US"/>
           </a:p>
@@ -3067,7 +3151,7 @@
           <a:p>
             <a:fld id="{78C97017-6FC3-485B-9764-EAC9E56C1D49}" type="datetimeFigureOut">
               <a:rPr lang="en-US" smtClean="0"/>
-              <a:t>1/7/2017</a:t>
+              <a:t>10/26/2018</a:t>
             </a:fld>
             <a:endParaRPr lang="en-US"/>
           </a:p>
@@ -3450,8 +3534,8 @@
         </p:nvSpPr>
         <p:spPr>
           <a:xfrm>
-            <a:off x="1217465" y="1447800"/>
-            <a:ext cx="4917083" cy="3962400"/>
+            <a:off x="1217465" y="1447799"/>
+            <a:ext cx="4917083" cy="4724400"/>
           </a:xfrm>
           <a:prstGeom prst="roundRect">
             <a:avLst>
@@ -3879,13 +3963,13 @@
       </p:sp>
       <p:sp>
         <p:nvSpPr>
-          <p:cNvPr id="34" name="Rectangle 11"/>
+          <p:cNvPr id="35" name="Rectangle 11"/>
           <p:cNvSpPr/>
           <p:nvPr/>
         </p:nvSpPr>
         <p:spPr>
           <a:xfrm>
-            <a:off x="2592528" y="3649359"/>
+            <a:off x="2592527" y="5554359"/>
             <a:ext cx="1093635" cy="236841"/>
           </a:xfrm>
           <a:prstGeom prst="rect">
@@ -3925,7 +4009,7 @@
                   </a:schemeClr>
                 </a:solidFill>
               </a:rPr>
-              <a:t>BrowserPanel</a:t>
+              <a:t>StatusBarFooter</a:t>
             </a:r>
             <a:endParaRPr lang="en-SG" sz="1050" b="1" dirty="0">
               <a:solidFill>
@@ -3939,193 +4023,13 @@
       </p:sp>
       <p:sp>
         <p:nvSpPr>
-          <p:cNvPr id="35" name="Rectangle 11"/>
-          <p:cNvSpPr/>
-          <p:nvPr/>
-        </p:nvSpPr>
-        <p:spPr>
-          <a:xfrm>
-            <a:off x="2592527" y="4563759"/>
-            <a:ext cx="1093635" cy="236841"/>
-          </a:xfrm>
-          <a:prstGeom prst="rect">
-            <a:avLst/>
-          </a:prstGeom>
-          <a:ln w="19050">
-            <a:solidFill>
-              <a:schemeClr val="accent3"/>
-            </a:solidFill>
-          </a:ln>
-          <a:effectLst/>
-        </p:spPr>
-        <p:style>
-          <a:lnRef idx="1">
-            <a:schemeClr val="accent3"/>
-          </a:lnRef>
-          <a:fillRef idx="2">
-            <a:schemeClr val="accent3"/>
-          </a:fillRef>
-          <a:effectRef idx="1">
-            <a:schemeClr val="accent3"/>
-          </a:effectRef>
-          <a:fontRef idx="minor">
-            <a:schemeClr val="dk1"/>
-          </a:fontRef>
-        </p:style>
-        <p:txBody>
-          <a:bodyPr rtlCol="0" anchor="ctr"/>
-          <a:lstStyle/>
-          <a:p>
-            <a:pPr algn="ctr"/>
-            <a:r>
-              <a:rPr lang="en-US" sz="1050" b="1" dirty="0" err="1">
-                <a:solidFill>
-                  <a:schemeClr val="accent3">
-                    <a:lumMod val="75000"/>
-                  </a:schemeClr>
-                </a:solidFill>
-              </a:rPr>
-              <a:t>StatusBarFooter</a:t>
-            </a:r>
-            <a:endParaRPr lang="en-SG" sz="1050" b="1" dirty="0">
-              <a:solidFill>
-                <a:schemeClr val="accent3">
-                  <a:lumMod val="75000"/>
-                </a:schemeClr>
-              </a:solidFill>
-            </a:endParaRPr>
-          </a:p>
-        </p:txBody>
-      </p:sp>
-      <p:sp>
-        <p:nvSpPr>
-          <p:cNvPr id="36" name="Rectangle 11"/>
-          <p:cNvSpPr/>
-          <p:nvPr/>
-        </p:nvSpPr>
-        <p:spPr>
-          <a:xfrm>
-            <a:off x="2592526" y="3991960"/>
-            <a:ext cx="1093635" cy="236841"/>
-          </a:xfrm>
-          <a:prstGeom prst="rect">
-            <a:avLst/>
-          </a:prstGeom>
-          <a:ln w="19050">
-            <a:solidFill>
-              <a:schemeClr val="accent3"/>
-            </a:solidFill>
-          </a:ln>
-          <a:effectLst/>
-        </p:spPr>
-        <p:style>
-          <a:lnRef idx="1">
-            <a:schemeClr val="accent3"/>
-          </a:lnRef>
-          <a:fillRef idx="2">
-            <a:schemeClr val="accent3"/>
-          </a:fillRef>
-          <a:effectRef idx="1">
-            <a:schemeClr val="accent3"/>
-          </a:effectRef>
-          <a:fontRef idx="minor">
-            <a:schemeClr val="dk1"/>
-          </a:fontRef>
-        </p:style>
-        <p:txBody>
-          <a:bodyPr rtlCol="0" anchor="ctr"/>
-          <a:lstStyle/>
-          <a:p>
-            <a:pPr algn="ctr"/>
-            <a:r>
-              <a:rPr lang="en-US" sz="1050" b="1" dirty="0" err="1">
-                <a:solidFill>
-                  <a:schemeClr val="accent3">
-                    <a:lumMod val="75000"/>
-                  </a:schemeClr>
-                </a:solidFill>
-              </a:rPr>
-              <a:t>PersonListPanel</a:t>
-            </a:r>
-            <a:endParaRPr lang="en-SG" sz="1050" b="1" dirty="0">
-              <a:solidFill>
-                <a:schemeClr val="accent3">
-                  <a:lumMod val="75000"/>
-                </a:schemeClr>
-              </a:solidFill>
-            </a:endParaRPr>
-          </a:p>
-        </p:txBody>
-      </p:sp>
-      <p:sp>
-        <p:nvSpPr>
-          <p:cNvPr id="37" name="Rectangle 11"/>
-          <p:cNvSpPr/>
-          <p:nvPr/>
-        </p:nvSpPr>
-        <p:spPr>
-          <a:xfrm>
-            <a:off x="3839323" y="4228801"/>
-            <a:ext cx="1040906" cy="236841"/>
-          </a:xfrm>
-          <a:prstGeom prst="rect">
-            <a:avLst/>
-          </a:prstGeom>
-          <a:ln w="19050">
-            <a:solidFill>
-              <a:schemeClr val="accent3"/>
-            </a:solidFill>
-          </a:ln>
-          <a:effectLst/>
-        </p:spPr>
-        <p:style>
-          <a:lnRef idx="1">
-            <a:schemeClr val="accent3"/>
-          </a:lnRef>
-          <a:fillRef idx="2">
-            <a:schemeClr val="accent3"/>
-          </a:fillRef>
-          <a:effectRef idx="1">
-            <a:schemeClr val="accent3"/>
-          </a:effectRef>
-          <a:fontRef idx="minor">
-            <a:schemeClr val="dk1"/>
-          </a:fontRef>
-        </p:style>
-        <p:txBody>
-          <a:bodyPr rtlCol="0" anchor="ctr"/>
-          <a:lstStyle/>
-          <a:p>
-            <a:pPr algn="ctr"/>
-            <a:r>
-              <a:rPr lang="en-US" sz="1050" b="1" dirty="0" err="1">
-                <a:solidFill>
-                  <a:schemeClr val="accent3">
-                    <a:lumMod val="75000"/>
-                  </a:schemeClr>
-                </a:solidFill>
-              </a:rPr>
-              <a:t>PersonCard</a:t>
-            </a:r>
-            <a:endParaRPr lang="en-SG" sz="1050" b="1" dirty="0">
-              <a:solidFill>
-                <a:schemeClr val="accent3">
-                  <a:lumMod val="75000"/>
-                </a:schemeClr>
-              </a:solidFill>
-            </a:endParaRPr>
-          </a:p>
-        </p:txBody>
-      </p:sp>
-      <p:sp>
-        <p:nvSpPr>
           <p:cNvPr id="38" name="Rectangle 11"/>
           <p:cNvSpPr/>
           <p:nvPr/>
         </p:nvSpPr>
         <p:spPr>
           <a:xfrm>
-            <a:off x="2592528" y="4966000"/>
+            <a:off x="2592528" y="5859159"/>
             <a:ext cx="1093635" cy="236841"/>
           </a:xfrm>
           <a:prstGeom prst="rect">
@@ -4328,17 +4232,17 @@
       </p:sp>
       <p:cxnSp>
         <p:nvCxnSpPr>
-          <p:cNvPr id="44" name="Elbow Connector 63"/>
+          <p:cNvPr id="50" name="Elbow Connector 63"/>
           <p:cNvCxnSpPr>
             <a:stCxn id="39" idx="2"/>
-            <a:endCxn id="34" idx="1"/>
+            <a:endCxn id="35" idx="1"/>
           </p:cNvCxnSpPr>
           <p:nvPr/>
         </p:nvCxnSpPr>
         <p:spPr>
           <a:xfrm rot="16200000" flipH="1">
-            <a:off x="2054450" y="3229701"/>
-            <a:ext cx="899755" cy="176402"/>
+            <a:off x="1101949" y="4182201"/>
+            <a:ext cx="2804755" cy="176401"/>
           </a:xfrm>
           <a:prstGeom prst="bentConnector2">
             <a:avLst/>
@@ -4369,98 +4273,17 @@
       </p:cxnSp>
       <p:cxnSp>
         <p:nvCxnSpPr>
-          <p:cNvPr id="47" name="Elbow Connector 63"/>
-          <p:cNvCxnSpPr>
-            <a:stCxn id="39" idx="2"/>
-            <a:endCxn id="36" idx="1"/>
-          </p:cNvCxnSpPr>
-          <p:nvPr/>
-        </p:nvCxnSpPr>
-        <p:spPr>
-          <a:xfrm rot="16200000" flipH="1">
-            <a:off x="1883148" y="3401003"/>
-            <a:ext cx="1242356" cy="176400"/>
-          </a:xfrm>
-          <a:prstGeom prst="bentConnector2">
-            <a:avLst/>
-          </a:prstGeom>
-          <a:ln w="19050">
-            <a:solidFill>
-              <a:schemeClr val="accent3"/>
-            </a:solidFill>
-            <a:headEnd type="none" w="med" len="med"/>
-            <a:tailEnd type="arrow" w="med" len="med"/>
-          </a:ln>
-          <a:effectLst/>
-        </p:spPr>
-        <p:style>
-          <a:lnRef idx="1">
-            <a:schemeClr val="accent2"/>
-          </a:lnRef>
-          <a:fillRef idx="2">
-            <a:schemeClr val="accent2"/>
-          </a:fillRef>
-          <a:effectRef idx="1">
-            <a:schemeClr val="accent2"/>
-          </a:effectRef>
-          <a:fontRef idx="minor">
-            <a:schemeClr val="dk1"/>
-          </a:fontRef>
-        </p:style>
-      </p:cxnSp>
-      <p:cxnSp>
-        <p:nvCxnSpPr>
-          <p:cNvPr id="50" name="Elbow Connector 63"/>
-          <p:cNvCxnSpPr>
-            <a:stCxn id="39" idx="2"/>
-            <a:endCxn id="35" idx="1"/>
-          </p:cNvCxnSpPr>
-          <p:nvPr/>
-        </p:nvCxnSpPr>
-        <p:spPr>
-          <a:xfrm rot="16200000" flipH="1">
-            <a:off x="1597249" y="3686901"/>
-            <a:ext cx="1814155" cy="176401"/>
-          </a:xfrm>
-          <a:prstGeom prst="bentConnector2">
-            <a:avLst/>
-          </a:prstGeom>
-          <a:ln w="19050">
-            <a:solidFill>
-              <a:schemeClr val="accent3"/>
-            </a:solidFill>
-            <a:headEnd type="none" w="med" len="med"/>
-            <a:tailEnd type="arrow" w="med" len="med"/>
-          </a:ln>
-          <a:effectLst/>
-        </p:spPr>
-        <p:style>
-          <a:lnRef idx="1">
-            <a:schemeClr val="accent2"/>
-          </a:lnRef>
-          <a:fillRef idx="2">
-            <a:schemeClr val="accent2"/>
-          </a:fillRef>
-          <a:effectRef idx="1">
-            <a:schemeClr val="accent2"/>
-          </a:effectRef>
-          <a:fontRef idx="minor">
-            <a:schemeClr val="dk1"/>
-          </a:fontRef>
-        </p:style>
-      </p:cxnSp>
-      <p:cxnSp>
-        <p:nvCxnSpPr>
           <p:cNvPr id="53" name="Elbow Connector 63"/>
           <p:cNvCxnSpPr>
+            <a:cxnSpLocks/>
             <a:endCxn id="38" idx="1"/>
           </p:cNvCxnSpPr>
           <p:nvPr/>
         </p:nvCxnSpPr>
         <p:spPr>
           <a:xfrm rot="16200000" flipH="1">
-            <a:off x="1184119" y="3676012"/>
-            <a:ext cx="2396440" cy="420377"/>
+            <a:off x="753196" y="4138248"/>
+            <a:ext cx="3295936" cy="382728"/>
           </a:xfrm>
           <a:prstGeom prst="bentConnector2">
             <a:avLst/>
@@ -4572,6 +4395,7 @@
         <p:nvCxnSpPr>
           <p:cNvPr id="74" name="Elbow Connector 63"/>
           <p:cNvCxnSpPr>
+            <a:cxnSpLocks/>
             <a:stCxn id="43" idx="3"/>
             <a:endCxn id="16" idx="3"/>
           </p:cNvCxnSpPr>
@@ -4613,6 +4437,7 @@
         <p:nvCxnSpPr>
           <p:cNvPr id="77" name="Elbow Connector 63"/>
           <p:cNvCxnSpPr>
+            <a:cxnSpLocks/>
             <a:stCxn id="16" idx="3"/>
             <a:endCxn id="37" idx="3"/>
           </p:cNvCxnSpPr>
@@ -4620,8 +4445,8 @@
         </p:nvCxnSpPr>
         <p:spPr>
           <a:xfrm rot="5400000">
-            <a:off x="4174488" y="2991741"/>
-            <a:ext cx="2061222" cy="649740"/>
+            <a:off x="4350292" y="3350103"/>
+            <a:ext cx="2243780" cy="115575"/>
           </a:xfrm>
           <a:prstGeom prst="bentConnector2">
             <a:avLst/>
@@ -4661,8 +4486,8 @@
         </p:nvCxnSpPr>
         <p:spPr>
           <a:xfrm rot="5400000">
-            <a:off x="3867176" y="2104987"/>
-            <a:ext cx="1481780" cy="1843806"/>
+            <a:off x="4133013" y="2370824"/>
+            <a:ext cx="1481780" cy="1312132"/>
           </a:xfrm>
           <a:prstGeom prst="bentConnector2">
             <a:avLst/>
@@ -4736,6 +4561,7 @@
         <p:nvCxnSpPr>
           <p:cNvPr id="91" name="Elbow Connector 63"/>
           <p:cNvCxnSpPr>
+            <a:cxnSpLocks/>
             <a:stCxn id="16" idx="3"/>
             <a:endCxn id="35" idx="3"/>
           </p:cNvCxnSpPr>
@@ -4743,8 +4569,8 @@
         </p:nvCxnSpPr>
         <p:spPr>
           <a:xfrm rot="5400000">
-            <a:off x="3409976" y="2562187"/>
-            <a:ext cx="2396180" cy="1843807"/>
+            <a:off x="2914676" y="3057487"/>
+            <a:ext cx="3386780" cy="1843807"/>
           </a:xfrm>
           <a:prstGeom prst="bentConnector2">
             <a:avLst/>
@@ -4784,8 +4610,8 @@
         </p:nvCxnSpPr>
         <p:spPr>
           <a:xfrm rot="5400000">
-            <a:off x="3208856" y="2763307"/>
-            <a:ext cx="2798421" cy="1843806"/>
+            <a:off x="2762276" y="3209887"/>
+            <a:ext cx="3691580" cy="1843806"/>
           </a:xfrm>
           <a:prstGeom prst="bentConnector2">
             <a:avLst/>
@@ -5159,49 +4985,9 @@
       </p:cxnSp>
       <p:cxnSp>
         <p:nvCxnSpPr>
-          <p:cNvPr id="137" name="Elbow Connector 136"/>
-          <p:cNvCxnSpPr>
-            <a:stCxn id="36" idx="2"/>
-            <a:endCxn id="37" idx="1"/>
-          </p:cNvCxnSpPr>
-          <p:nvPr/>
-        </p:nvCxnSpPr>
-        <p:spPr>
-          <a:xfrm rot="16200000" flipH="1">
-            <a:off x="3430123" y="3938021"/>
-            <a:ext cx="118421" cy="699979"/>
-          </a:xfrm>
-          <a:prstGeom prst="bentConnector2">
-            <a:avLst/>
-          </a:prstGeom>
-          <a:ln w="19050">
-            <a:solidFill>
-              <a:schemeClr val="accent3"/>
-            </a:solidFill>
-            <a:headEnd type="none" w="med" len="med"/>
-            <a:tailEnd type="arrow" w="med" len="med"/>
-          </a:ln>
-          <a:effectLst/>
-        </p:spPr>
-        <p:style>
-          <a:lnRef idx="1">
-            <a:schemeClr val="accent2"/>
-          </a:lnRef>
-          <a:fillRef idx="2">
-            <a:schemeClr val="accent2"/>
-          </a:fillRef>
-          <a:effectRef idx="1">
-            <a:schemeClr val="accent2"/>
-          </a:effectRef>
-          <a:fontRef idx="minor">
-            <a:schemeClr val="dk1"/>
-          </a:fontRef>
-        </p:style>
-      </p:cxnSp>
-      <p:cxnSp>
-        <p:nvCxnSpPr>
           <p:cNvPr id="140" name="Elbow Connector 63"/>
           <p:cNvCxnSpPr>
+            <a:cxnSpLocks/>
             <a:stCxn id="16" idx="3"/>
             <a:endCxn id="36" idx="3"/>
           </p:cNvCxnSpPr>
@@ -5209,8 +4995,8 @@
         </p:nvCxnSpPr>
         <p:spPr>
           <a:xfrm rot="5400000">
-            <a:off x="3695875" y="2276286"/>
-            <a:ext cx="1824381" cy="1843808"/>
+            <a:off x="3862192" y="2641643"/>
+            <a:ext cx="2023421" cy="1312134"/>
           </a:xfrm>
           <a:prstGeom prst="bentConnector2">
             <a:avLst/>
@@ -5427,6 +5213,324 @@
           </a:p>
         </p:txBody>
       </p:sp>
+      <p:cxnSp>
+        <p:nvCxnSpPr>
+          <p:cNvPr id="48" name="Elbow Connector 63">
+            <a:extLst>
+              <a:ext uri="{FF2B5EF4-FFF2-40B4-BE49-F238E27FC236}">
+                <a16:creationId xmlns:a16="http://schemas.microsoft.com/office/drawing/2014/main" id="{189867C4-0770-46E8-89BD-8331C9ACE0D3}"/>
+              </a:ext>
+            </a:extLst>
+          </p:cNvPr>
+          <p:cNvCxnSpPr>
+            <a:cxnSpLocks/>
+            <a:stCxn id="16" idx="3"/>
+            <a:endCxn id="42" idx="3"/>
+          </p:cNvCxnSpPr>
+          <p:nvPr/>
+        </p:nvCxnSpPr>
+        <p:spPr>
+          <a:xfrm rot="5400000">
+            <a:off x="4639450" y="3048039"/>
+            <a:ext cx="1652559" cy="128481"/>
+          </a:xfrm>
+          <a:prstGeom prst="bentConnector2">
+            <a:avLst/>
+          </a:prstGeom>
+          <a:ln w="6350">
+            <a:solidFill>
+              <a:schemeClr val="accent3"/>
+            </a:solidFill>
+            <a:headEnd type="none" w="med" len="med"/>
+            <a:tailEnd type="none" w="med" len="med"/>
+          </a:ln>
+          <a:effectLst/>
+        </p:spPr>
+        <p:style>
+          <a:lnRef idx="1">
+            <a:schemeClr val="accent2"/>
+          </a:lnRef>
+          <a:fillRef idx="2">
+            <a:schemeClr val="accent2"/>
+          </a:fillRef>
+          <a:effectRef idx="1">
+            <a:schemeClr val="accent2"/>
+          </a:effectRef>
+          <a:fontRef idx="minor">
+            <a:schemeClr val="dk1"/>
+          </a:fontRef>
+        </p:style>
+      </p:cxnSp>
+      <p:cxnSp>
+        <p:nvCxnSpPr>
+          <p:cNvPr id="52" name="Elbow Connector 63">
+            <a:extLst>
+              <a:ext uri="{FF2B5EF4-FFF2-40B4-BE49-F238E27FC236}">
+                <a16:creationId xmlns:a16="http://schemas.microsoft.com/office/drawing/2014/main" id="{BFE08AB9-F697-4062-9E9A-10D0AA82AC4D}"/>
+              </a:ext>
+            </a:extLst>
+          </p:cNvPr>
+          <p:cNvCxnSpPr>
+            <a:cxnSpLocks/>
+            <a:stCxn id="16" idx="3"/>
+            <a:endCxn id="51" idx="3"/>
+          </p:cNvCxnSpPr>
+          <p:nvPr/>
+        </p:nvCxnSpPr>
+        <p:spPr>
+          <a:xfrm rot="5400000">
+            <a:off x="4202243" y="3506854"/>
+            <a:ext cx="2548580" cy="106872"/>
+          </a:xfrm>
+          <a:prstGeom prst="bentConnector2">
+            <a:avLst/>
+          </a:prstGeom>
+          <a:ln w="6350">
+            <a:solidFill>
+              <a:schemeClr val="accent3"/>
+            </a:solidFill>
+            <a:headEnd type="none" w="med" len="med"/>
+            <a:tailEnd type="none" w="med" len="med"/>
+          </a:ln>
+          <a:effectLst/>
+        </p:spPr>
+        <p:style>
+          <a:lnRef idx="1">
+            <a:schemeClr val="accent2"/>
+          </a:lnRef>
+          <a:fillRef idx="2">
+            <a:schemeClr val="accent2"/>
+          </a:fillRef>
+          <a:effectRef idx="1">
+            <a:schemeClr val="accent2"/>
+          </a:effectRef>
+          <a:fontRef idx="minor">
+            <a:schemeClr val="dk1"/>
+          </a:fontRef>
+        </p:style>
+      </p:cxnSp>
+      <p:sp>
+        <p:nvSpPr>
+          <p:cNvPr id="34" name="Rectangle 11"/>
+          <p:cNvSpPr/>
+          <p:nvPr/>
+        </p:nvSpPr>
+        <p:spPr>
+          <a:xfrm>
+            <a:off x="3124202" y="3649359"/>
+            <a:ext cx="1093635" cy="236841"/>
+          </a:xfrm>
+          <a:prstGeom prst="rect">
+            <a:avLst/>
+          </a:prstGeom>
+          <a:ln w="19050">
+            <a:solidFill>
+              <a:schemeClr val="accent3"/>
+            </a:solidFill>
+          </a:ln>
+          <a:effectLst/>
+        </p:spPr>
+        <p:style>
+          <a:lnRef idx="1">
+            <a:schemeClr val="accent3"/>
+          </a:lnRef>
+          <a:fillRef idx="2">
+            <a:schemeClr val="accent3"/>
+          </a:fillRef>
+          <a:effectRef idx="1">
+            <a:schemeClr val="accent3"/>
+          </a:effectRef>
+          <a:fontRef idx="minor">
+            <a:schemeClr val="dk1"/>
+          </a:fontRef>
+        </p:style>
+        <p:txBody>
+          <a:bodyPr rtlCol="0" anchor="ctr"/>
+          <a:lstStyle/>
+          <a:p>
+            <a:pPr algn="ctr"/>
+            <a:r>
+              <a:rPr lang="en-US" sz="700" b="1" dirty="0" err="1">
+                <a:solidFill>
+                  <a:schemeClr val="accent3">
+                    <a:lumMod val="75000"/>
+                  </a:schemeClr>
+                </a:solidFill>
+              </a:rPr>
+              <a:t>CandidateDetailsPanel</a:t>
+            </a:r>
+            <a:endParaRPr lang="en-SG" sz="700" b="1" dirty="0">
+              <a:solidFill>
+                <a:schemeClr val="accent3">
+                  <a:lumMod val="75000"/>
+                </a:schemeClr>
+              </a:solidFill>
+            </a:endParaRPr>
+          </a:p>
+        </p:txBody>
+      </p:sp>
+      <p:sp>
+        <p:nvSpPr>
+          <p:cNvPr id="36" name="Rectangle 11"/>
+          <p:cNvSpPr/>
+          <p:nvPr/>
+        </p:nvSpPr>
+        <p:spPr>
+          <a:xfrm>
+            <a:off x="3124200" y="4191000"/>
+            <a:ext cx="1093635" cy="236841"/>
+          </a:xfrm>
+          <a:prstGeom prst="rect">
+            <a:avLst/>
+          </a:prstGeom>
+          <a:ln w="19050">
+            <a:solidFill>
+              <a:schemeClr val="accent3"/>
+            </a:solidFill>
+          </a:ln>
+          <a:effectLst/>
+        </p:spPr>
+        <p:style>
+          <a:lnRef idx="1">
+            <a:schemeClr val="accent3"/>
+          </a:lnRef>
+          <a:fillRef idx="2">
+            <a:schemeClr val="accent3"/>
+          </a:fillRef>
+          <a:effectRef idx="1">
+            <a:schemeClr val="accent3"/>
+          </a:effectRef>
+          <a:fontRef idx="minor">
+            <a:schemeClr val="dk1"/>
+          </a:fontRef>
+        </p:style>
+        <p:txBody>
+          <a:bodyPr rtlCol="0" anchor="ctr"/>
+          <a:lstStyle/>
+          <a:p>
+            <a:pPr algn="ctr"/>
+            <a:r>
+              <a:rPr lang="en-US" sz="650" b="1" dirty="0" err="1">
+                <a:solidFill>
+                  <a:schemeClr val="accent3">
+                    <a:lumMod val="75000"/>
+                  </a:schemeClr>
+                </a:solidFill>
+              </a:rPr>
+              <a:t>CompanyJobDetailsPanel</a:t>
+            </a:r>
+            <a:endParaRPr lang="en-SG" sz="650" b="1" dirty="0">
+              <a:solidFill>
+                <a:schemeClr val="accent3">
+                  <a:lumMod val="75000"/>
+                </a:schemeClr>
+              </a:solidFill>
+            </a:endParaRPr>
+          </a:p>
+        </p:txBody>
+      </p:sp>
+      <p:sp>
+        <p:nvSpPr>
+          <p:cNvPr id="37" name="Rectangle 11"/>
+          <p:cNvSpPr/>
+          <p:nvPr/>
+        </p:nvSpPr>
+        <p:spPr>
+          <a:xfrm>
+            <a:off x="4373488" y="4411359"/>
+            <a:ext cx="1040906" cy="236841"/>
+          </a:xfrm>
+          <a:prstGeom prst="rect">
+            <a:avLst/>
+          </a:prstGeom>
+          <a:ln w="19050">
+            <a:solidFill>
+              <a:schemeClr val="accent3"/>
+            </a:solidFill>
+          </a:ln>
+          <a:effectLst/>
+        </p:spPr>
+        <p:style>
+          <a:lnRef idx="1">
+            <a:schemeClr val="accent3"/>
+          </a:lnRef>
+          <a:fillRef idx="2">
+            <a:schemeClr val="accent3"/>
+          </a:fillRef>
+          <a:effectRef idx="1">
+            <a:schemeClr val="accent3"/>
+          </a:effectRef>
+          <a:fontRef idx="minor">
+            <a:schemeClr val="dk1"/>
+          </a:fontRef>
+        </p:style>
+        <p:txBody>
+          <a:bodyPr rtlCol="0" anchor="ctr"/>
+          <a:lstStyle/>
+          <a:p>
+            <a:pPr algn="ctr"/>
+            <a:r>
+              <a:rPr lang="en-US" sz="1050" b="1" dirty="0" err="1">
+                <a:solidFill>
+                  <a:schemeClr val="accent3">
+                    <a:lumMod val="75000"/>
+                  </a:schemeClr>
+                </a:solidFill>
+              </a:rPr>
+              <a:t>CompanyCard</a:t>
+            </a:r>
+            <a:endParaRPr lang="en-SG" sz="1050" b="1" dirty="0">
+              <a:solidFill>
+                <a:schemeClr val="accent3">
+                  <a:lumMod val="75000"/>
+                </a:schemeClr>
+              </a:solidFill>
+            </a:endParaRPr>
+          </a:p>
+        </p:txBody>
+      </p:sp>
+      <p:cxnSp>
+        <p:nvCxnSpPr>
+          <p:cNvPr id="137" name="Elbow Connector 136"/>
+          <p:cNvCxnSpPr>
+            <a:cxnSpLocks/>
+            <a:stCxn id="36" idx="2"/>
+            <a:endCxn id="37" idx="1"/>
+          </p:cNvCxnSpPr>
+          <p:nvPr/>
+        </p:nvCxnSpPr>
+        <p:spPr>
+          <a:xfrm rot="16200000" flipH="1">
+            <a:off x="3971284" y="4127575"/>
+            <a:ext cx="101939" cy="702470"/>
+          </a:xfrm>
+          <a:prstGeom prst="bentConnector2">
+            <a:avLst/>
+          </a:prstGeom>
+          <a:ln w="19050">
+            <a:solidFill>
+              <a:schemeClr val="accent3"/>
+            </a:solidFill>
+            <a:headEnd type="none" w="med" len="med"/>
+            <a:tailEnd type="arrow" w="med" len="med"/>
+          </a:ln>
+          <a:effectLst/>
+        </p:spPr>
+        <p:style>
+          <a:lnRef idx="1">
+            <a:schemeClr val="accent2"/>
+          </a:lnRef>
+          <a:fillRef idx="2">
+            <a:schemeClr val="accent2"/>
+          </a:fillRef>
+          <a:effectRef idx="1">
+            <a:schemeClr val="accent2"/>
+          </a:effectRef>
+          <a:fontRef idx="minor">
+            <a:schemeClr val="dk1"/>
+          </a:fontRef>
+        </p:style>
+      </p:cxnSp>
       <p:sp>
         <p:nvSpPr>
           <p:cNvPr id="118" name="Freeform 117"/>
@@ -5435,8 +5539,8 @@
         </p:nvSpPr>
         <p:spPr>
           <a:xfrm flipV="1">
-            <a:off x="4114799" y="4472708"/>
-            <a:ext cx="2642195" cy="101600"/>
+            <a:off x="4646473" y="4636462"/>
+            <a:ext cx="2080391" cy="45719"/>
           </a:xfrm>
           <a:custGeom>
             <a:avLst/>
@@ -5509,6 +5613,763 @@
           </a:p>
         </p:txBody>
       </p:sp>
+      <p:sp>
+        <p:nvSpPr>
+          <p:cNvPr id="42" name="Rectangle 11">
+            <a:extLst>
+              <a:ext uri="{FF2B5EF4-FFF2-40B4-BE49-F238E27FC236}">
+                <a16:creationId xmlns:a16="http://schemas.microsoft.com/office/drawing/2014/main" id="{11677187-4F00-4519-B1C8-5EACE4745630}"/>
+              </a:ext>
+            </a:extLst>
+          </p:cNvPr>
+          <p:cNvSpPr/>
+          <p:nvPr/>
+        </p:nvSpPr>
+        <p:spPr>
+          <a:xfrm>
+            <a:off x="4360582" y="3820138"/>
+            <a:ext cx="1040906" cy="236841"/>
+          </a:xfrm>
+          <a:prstGeom prst="rect">
+            <a:avLst/>
+          </a:prstGeom>
+          <a:ln w="19050">
+            <a:solidFill>
+              <a:schemeClr val="accent3"/>
+            </a:solidFill>
+          </a:ln>
+          <a:effectLst/>
+        </p:spPr>
+        <p:style>
+          <a:lnRef idx="1">
+            <a:schemeClr val="accent3"/>
+          </a:lnRef>
+          <a:fillRef idx="2">
+            <a:schemeClr val="accent3"/>
+          </a:fillRef>
+          <a:effectRef idx="1">
+            <a:schemeClr val="accent3"/>
+          </a:effectRef>
+          <a:fontRef idx="minor">
+            <a:schemeClr val="dk1"/>
+          </a:fontRef>
+        </p:style>
+        <p:txBody>
+          <a:bodyPr rtlCol="0" anchor="ctr"/>
+          <a:lstStyle/>
+          <a:p>
+            <a:pPr algn="ctr"/>
+            <a:r>
+              <a:rPr lang="en-US" sz="1050" b="1" dirty="0" err="1">
+                <a:solidFill>
+                  <a:schemeClr val="accent3">
+                    <a:lumMod val="75000"/>
+                  </a:schemeClr>
+                </a:solidFill>
+              </a:rPr>
+              <a:t>CandidateCard</a:t>
+            </a:r>
+            <a:endParaRPr lang="en-SG" sz="1050" b="1" dirty="0">
+              <a:solidFill>
+                <a:schemeClr val="accent3">
+                  <a:lumMod val="75000"/>
+                </a:schemeClr>
+              </a:solidFill>
+            </a:endParaRPr>
+          </a:p>
+        </p:txBody>
+      </p:sp>
+      <p:sp>
+        <p:nvSpPr>
+          <p:cNvPr id="45" name="Freeform 117">
+            <a:extLst>
+              <a:ext uri="{FF2B5EF4-FFF2-40B4-BE49-F238E27FC236}">
+                <a16:creationId xmlns:a16="http://schemas.microsoft.com/office/drawing/2014/main" id="{44318722-AFAE-4643-9F8D-E6BBDB7C6019}"/>
+              </a:ext>
+            </a:extLst>
+          </p:cNvPr>
+          <p:cNvSpPr/>
+          <p:nvPr/>
+        </p:nvSpPr>
+        <p:spPr>
+          <a:xfrm flipV="1">
+            <a:off x="4570274" y="4079214"/>
+            <a:ext cx="2150632" cy="164722"/>
+          </a:xfrm>
+          <a:custGeom>
+            <a:avLst/>
+            <a:gdLst>
+              <a:gd name="connsiteX0" fmla="*/ 0 w 3048000"/>
+              <a:gd name="connsiteY0" fmla="*/ 203200 h 203200"/>
+              <a:gd name="connsiteX1" fmla="*/ 221673 w 3048000"/>
+              <a:gd name="connsiteY1" fmla="*/ 0 h 203200"/>
+              <a:gd name="connsiteX2" fmla="*/ 3048000 w 3048000"/>
+              <a:gd name="connsiteY2" fmla="*/ 0 h 203200"/>
+            </a:gdLst>
+            <a:ahLst/>
+            <a:cxnLst>
+              <a:cxn ang="0">
+                <a:pos x="connsiteX0" y="connsiteY0"/>
+              </a:cxn>
+              <a:cxn ang="0">
+                <a:pos x="connsiteX1" y="connsiteY1"/>
+              </a:cxn>
+              <a:cxn ang="0">
+                <a:pos x="connsiteX2" y="connsiteY2"/>
+              </a:cxn>
+            </a:cxnLst>
+            <a:rect l="l" t="t" r="r" b="b"/>
+            <a:pathLst>
+              <a:path w="3048000" h="203200">
+                <a:moveTo>
+                  <a:pt x="0" y="203200"/>
+                </a:moveTo>
+                <a:lnTo>
+                  <a:pt x="221673" y="0"/>
+                </a:lnTo>
+                <a:lnTo>
+                  <a:pt x="3048000" y="0"/>
+                </a:lnTo>
+              </a:path>
+            </a:pathLst>
+          </a:custGeom>
+          <a:noFill/>
+          <a:ln w="19050">
+            <a:solidFill>
+              <a:schemeClr val="accent3"/>
+            </a:solidFill>
+            <a:prstDash val="sysDot"/>
+            <a:headEnd type="none" w="med" len="med"/>
+            <a:tailEnd type="arrow" w="med" len="med"/>
+          </a:ln>
+          <a:effectLst/>
+        </p:spPr>
+        <p:style>
+          <a:lnRef idx="1">
+            <a:schemeClr val="accent2"/>
+          </a:lnRef>
+          <a:fillRef idx="2">
+            <a:schemeClr val="accent2"/>
+          </a:fillRef>
+          <a:effectRef idx="1">
+            <a:schemeClr val="accent2"/>
+          </a:effectRef>
+          <a:fontRef idx="minor">
+            <a:schemeClr val="dk1"/>
+          </a:fontRef>
+        </p:style>
+        <p:txBody>
+          <a:bodyPr rtlCol="0" anchor="ctr"/>
+          <a:lstStyle/>
+          <a:p>
+            <a:pPr algn="ctr"/>
+            <a:endParaRPr lang="en-SG"/>
+          </a:p>
+        </p:txBody>
+      </p:sp>
+      <p:cxnSp>
+        <p:nvCxnSpPr>
+          <p:cNvPr id="46" name="Elbow Connector 136">
+            <a:extLst>
+              <a:ext uri="{FF2B5EF4-FFF2-40B4-BE49-F238E27FC236}">
+                <a16:creationId xmlns:a16="http://schemas.microsoft.com/office/drawing/2014/main" id="{9BFCC47C-1F08-496F-BE34-27195102FDCB}"/>
+              </a:ext>
+            </a:extLst>
+          </p:cNvPr>
+          <p:cNvCxnSpPr/>
+          <p:nvPr/>
+        </p:nvCxnSpPr>
+        <p:spPr>
+          <a:xfrm rot="16200000" flipH="1">
+            <a:off x="3967015" y="3601830"/>
+            <a:ext cx="118421" cy="699979"/>
+          </a:xfrm>
+          <a:prstGeom prst="bentConnector2">
+            <a:avLst/>
+          </a:prstGeom>
+          <a:ln w="19050">
+            <a:solidFill>
+              <a:schemeClr val="accent3"/>
+            </a:solidFill>
+            <a:headEnd type="none" w="med" len="med"/>
+            <a:tailEnd type="arrow" w="med" len="med"/>
+          </a:ln>
+          <a:effectLst/>
+        </p:spPr>
+        <p:style>
+          <a:lnRef idx="1">
+            <a:schemeClr val="accent2"/>
+          </a:lnRef>
+          <a:fillRef idx="2">
+            <a:schemeClr val="accent2"/>
+          </a:fillRef>
+          <a:effectRef idx="1">
+            <a:schemeClr val="accent2"/>
+          </a:effectRef>
+          <a:fontRef idx="minor">
+            <a:schemeClr val="dk1"/>
+          </a:fontRef>
+        </p:style>
+      </p:cxnSp>
+      <p:sp>
+        <p:nvSpPr>
+          <p:cNvPr id="51" name="Rectangle 11">
+            <a:extLst>
+              <a:ext uri="{FF2B5EF4-FFF2-40B4-BE49-F238E27FC236}">
+                <a16:creationId xmlns:a16="http://schemas.microsoft.com/office/drawing/2014/main" id="{93C17915-CD56-47AE-965E-002C6F7AACB4}"/>
+              </a:ext>
+            </a:extLst>
+          </p:cNvPr>
+          <p:cNvSpPr/>
+          <p:nvPr/>
+        </p:nvSpPr>
+        <p:spPr>
+          <a:xfrm>
+            <a:off x="4382191" y="4716159"/>
+            <a:ext cx="1040906" cy="236841"/>
+          </a:xfrm>
+          <a:prstGeom prst="rect">
+            <a:avLst/>
+          </a:prstGeom>
+          <a:ln w="19050">
+            <a:solidFill>
+              <a:schemeClr val="accent3"/>
+            </a:solidFill>
+          </a:ln>
+          <a:effectLst/>
+        </p:spPr>
+        <p:style>
+          <a:lnRef idx="1">
+            <a:schemeClr val="accent3"/>
+          </a:lnRef>
+          <a:fillRef idx="2">
+            <a:schemeClr val="accent3"/>
+          </a:fillRef>
+          <a:effectRef idx="1">
+            <a:schemeClr val="accent3"/>
+          </a:effectRef>
+          <a:fontRef idx="minor">
+            <a:schemeClr val="dk1"/>
+          </a:fontRef>
+        </p:style>
+        <p:txBody>
+          <a:bodyPr rtlCol="0" anchor="ctr"/>
+          <a:lstStyle/>
+          <a:p>
+            <a:pPr algn="ctr"/>
+            <a:r>
+              <a:rPr lang="en-US" sz="1050" b="1" dirty="0" err="1">
+                <a:solidFill>
+                  <a:schemeClr val="accent3">
+                    <a:lumMod val="75000"/>
+                  </a:schemeClr>
+                </a:solidFill>
+              </a:rPr>
+              <a:t>JobCard</a:t>
+            </a:r>
+            <a:endParaRPr lang="en-SG" sz="1050" b="1" dirty="0">
+              <a:solidFill>
+                <a:schemeClr val="accent3">
+                  <a:lumMod val="75000"/>
+                </a:schemeClr>
+              </a:solidFill>
+            </a:endParaRPr>
+          </a:p>
+        </p:txBody>
+      </p:sp>
+      <p:cxnSp>
+        <p:nvCxnSpPr>
+          <p:cNvPr id="58" name="Elbow Connector 136">
+            <a:extLst>
+              <a:ext uri="{FF2B5EF4-FFF2-40B4-BE49-F238E27FC236}">
+                <a16:creationId xmlns:a16="http://schemas.microsoft.com/office/drawing/2014/main" id="{FF9D1836-AE90-4870-9DB8-6EE546D74696}"/>
+              </a:ext>
+            </a:extLst>
+          </p:cNvPr>
+          <p:cNvCxnSpPr>
+            <a:cxnSpLocks/>
+            <a:stCxn id="36" idx="2"/>
+            <a:endCxn id="51" idx="1"/>
+          </p:cNvCxnSpPr>
+          <p:nvPr/>
+        </p:nvCxnSpPr>
+        <p:spPr>
+          <a:xfrm rot="16200000" flipH="1">
+            <a:off x="3823235" y="4275623"/>
+            <a:ext cx="406739" cy="711173"/>
+          </a:xfrm>
+          <a:prstGeom prst="bentConnector2">
+            <a:avLst/>
+          </a:prstGeom>
+          <a:ln w="19050">
+            <a:solidFill>
+              <a:schemeClr val="accent3"/>
+            </a:solidFill>
+            <a:headEnd type="none" w="med" len="med"/>
+            <a:tailEnd type="arrow" w="med" len="med"/>
+          </a:ln>
+          <a:effectLst/>
+        </p:spPr>
+        <p:style>
+          <a:lnRef idx="1">
+            <a:schemeClr val="accent2"/>
+          </a:lnRef>
+          <a:fillRef idx="2">
+            <a:schemeClr val="accent2"/>
+          </a:fillRef>
+          <a:effectRef idx="1">
+            <a:schemeClr val="accent2"/>
+          </a:effectRef>
+          <a:fontRef idx="minor">
+            <a:schemeClr val="dk1"/>
+          </a:fontRef>
+        </p:style>
+      </p:cxnSp>
+      <p:sp>
+        <p:nvSpPr>
+          <p:cNvPr id="62" name="Freeform 117">
+            <a:extLst>
+              <a:ext uri="{FF2B5EF4-FFF2-40B4-BE49-F238E27FC236}">
+                <a16:creationId xmlns:a16="http://schemas.microsoft.com/office/drawing/2014/main" id="{6F2D0B08-E377-4585-90CC-F561C0DBF698}"/>
+              </a:ext>
+            </a:extLst>
+          </p:cNvPr>
+          <p:cNvSpPr/>
+          <p:nvPr/>
+        </p:nvSpPr>
+        <p:spPr>
+          <a:xfrm flipV="1">
+            <a:off x="4642150" y="4953000"/>
+            <a:ext cx="2093365" cy="59298"/>
+          </a:xfrm>
+          <a:custGeom>
+            <a:avLst/>
+            <a:gdLst>
+              <a:gd name="connsiteX0" fmla="*/ 0 w 3048000"/>
+              <a:gd name="connsiteY0" fmla="*/ 203200 h 203200"/>
+              <a:gd name="connsiteX1" fmla="*/ 221673 w 3048000"/>
+              <a:gd name="connsiteY1" fmla="*/ 0 h 203200"/>
+              <a:gd name="connsiteX2" fmla="*/ 3048000 w 3048000"/>
+              <a:gd name="connsiteY2" fmla="*/ 0 h 203200"/>
+            </a:gdLst>
+            <a:ahLst/>
+            <a:cxnLst>
+              <a:cxn ang="0">
+                <a:pos x="connsiteX0" y="connsiteY0"/>
+              </a:cxn>
+              <a:cxn ang="0">
+                <a:pos x="connsiteX1" y="connsiteY1"/>
+              </a:cxn>
+              <a:cxn ang="0">
+                <a:pos x="connsiteX2" y="connsiteY2"/>
+              </a:cxn>
+            </a:cxnLst>
+            <a:rect l="l" t="t" r="r" b="b"/>
+            <a:pathLst>
+              <a:path w="3048000" h="203200">
+                <a:moveTo>
+                  <a:pt x="0" y="203200"/>
+                </a:moveTo>
+                <a:lnTo>
+                  <a:pt x="221673" y="0"/>
+                </a:lnTo>
+                <a:lnTo>
+                  <a:pt x="3048000" y="0"/>
+                </a:lnTo>
+              </a:path>
+            </a:pathLst>
+          </a:custGeom>
+          <a:noFill/>
+          <a:ln w="19050">
+            <a:solidFill>
+              <a:schemeClr val="accent3"/>
+            </a:solidFill>
+            <a:prstDash val="sysDot"/>
+            <a:headEnd type="none" w="med" len="med"/>
+            <a:tailEnd type="arrow" w="med" len="med"/>
+          </a:ln>
+          <a:effectLst/>
+        </p:spPr>
+        <p:style>
+          <a:lnRef idx="1">
+            <a:schemeClr val="accent2"/>
+          </a:lnRef>
+          <a:fillRef idx="2">
+            <a:schemeClr val="accent2"/>
+          </a:fillRef>
+          <a:effectRef idx="1">
+            <a:schemeClr val="accent2"/>
+          </a:effectRef>
+          <a:fontRef idx="minor">
+            <a:schemeClr val="dk1"/>
+          </a:fontRef>
+        </p:style>
+        <p:txBody>
+          <a:bodyPr rtlCol="0" anchor="ctr"/>
+          <a:lstStyle/>
+          <a:p>
+            <a:pPr algn="ctr"/>
+            <a:endParaRPr lang="en-SG"/>
+          </a:p>
+        </p:txBody>
+      </p:sp>
+      <p:cxnSp>
+        <p:nvCxnSpPr>
+          <p:cNvPr id="84" name="Elbow Connector 63">
+            <a:extLst>
+              <a:ext uri="{FF2B5EF4-FFF2-40B4-BE49-F238E27FC236}">
+                <a16:creationId xmlns:a16="http://schemas.microsoft.com/office/drawing/2014/main" id="{78BEF2E4-4BBD-4C41-99C2-BCE49BCCA10E}"/>
+              </a:ext>
+            </a:extLst>
+          </p:cNvPr>
+          <p:cNvCxnSpPr>
+            <a:cxnSpLocks/>
+            <a:endCxn id="36" idx="1"/>
+          </p:cNvCxnSpPr>
+          <p:nvPr/>
+        </p:nvCxnSpPr>
+        <p:spPr>
+          <a:xfrm rot="16200000" flipH="1">
+            <a:off x="2094874" y="3280095"/>
+            <a:ext cx="1348848" cy="709803"/>
+          </a:xfrm>
+          <a:prstGeom prst="bentConnector2">
+            <a:avLst/>
+          </a:prstGeom>
+          <a:ln w="19050">
+            <a:solidFill>
+              <a:schemeClr val="accent3"/>
+            </a:solidFill>
+            <a:headEnd type="none" w="med" len="med"/>
+            <a:tailEnd type="arrow" w="med" len="med"/>
+          </a:ln>
+          <a:effectLst/>
+        </p:spPr>
+        <p:style>
+          <a:lnRef idx="1">
+            <a:schemeClr val="accent2"/>
+          </a:lnRef>
+          <a:fillRef idx="2">
+            <a:schemeClr val="accent2"/>
+          </a:fillRef>
+          <a:effectRef idx="1">
+            <a:schemeClr val="accent2"/>
+          </a:effectRef>
+          <a:fontRef idx="minor">
+            <a:schemeClr val="dk1"/>
+          </a:fontRef>
+        </p:style>
+      </p:cxnSp>
+      <p:cxnSp>
+        <p:nvCxnSpPr>
+          <p:cNvPr id="87" name="Elbow Connector 63">
+            <a:extLst>
+              <a:ext uri="{FF2B5EF4-FFF2-40B4-BE49-F238E27FC236}">
+                <a16:creationId xmlns:a16="http://schemas.microsoft.com/office/drawing/2014/main" id="{30E8BB47-7464-429C-9F90-41420DDEC4AE}"/>
+              </a:ext>
+            </a:extLst>
+          </p:cNvPr>
+          <p:cNvCxnSpPr>
+            <a:cxnSpLocks/>
+            <a:stCxn id="39" idx="2"/>
+            <a:endCxn id="34" idx="1"/>
+          </p:cNvCxnSpPr>
+          <p:nvPr/>
+        </p:nvCxnSpPr>
+        <p:spPr>
+          <a:xfrm rot="16200000" flipH="1">
+            <a:off x="2320287" y="2963864"/>
+            <a:ext cx="899755" cy="708076"/>
+          </a:xfrm>
+          <a:prstGeom prst="bentConnector2">
+            <a:avLst/>
+          </a:prstGeom>
+          <a:ln w="19050">
+            <a:solidFill>
+              <a:schemeClr val="accent3"/>
+            </a:solidFill>
+            <a:headEnd type="none" w="med" len="med"/>
+            <a:tailEnd type="arrow" w="med" len="med"/>
+          </a:ln>
+          <a:effectLst/>
+        </p:spPr>
+        <p:style>
+          <a:lnRef idx="1">
+            <a:schemeClr val="accent2"/>
+          </a:lnRef>
+          <a:fillRef idx="2">
+            <a:schemeClr val="accent2"/>
+          </a:fillRef>
+          <a:effectRef idx="1">
+            <a:schemeClr val="accent2"/>
+          </a:effectRef>
+          <a:fontRef idx="minor">
+            <a:schemeClr val="dk1"/>
+          </a:fontRef>
+        </p:style>
+      </p:cxnSp>
+      <p:sp>
+        <p:nvSpPr>
+          <p:cNvPr id="90" name="Rectangle 11">
+            <a:extLst>
+              <a:ext uri="{FF2B5EF4-FFF2-40B4-BE49-F238E27FC236}">
+                <a16:creationId xmlns:a16="http://schemas.microsoft.com/office/drawing/2014/main" id="{F2C46377-7DB8-4F45-BFB9-57172555C2F6}"/>
+              </a:ext>
+            </a:extLst>
+          </p:cNvPr>
+          <p:cNvSpPr/>
+          <p:nvPr/>
+        </p:nvSpPr>
+        <p:spPr>
+          <a:xfrm>
+            <a:off x="2580518" y="5249559"/>
+            <a:ext cx="1095361" cy="236841"/>
+          </a:xfrm>
+          <a:prstGeom prst="rect">
+            <a:avLst/>
+          </a:prstGeom>
+          <a:ln w="19050">
+            <a:solidFill>
+              <a:schemeClr val="accent3"/>
+            </a:solidFill>
+          </a:ln>
+          <a:effectLst/>
+        </p:spPr>
+        <p:style>
+          <a:lnRef idx="1">
+            <a:schemeClr val="accent3"/>
+          </a:lnRef>
+          <a:fillRef idx="2">
+            <a:schemeClr val="accent3"/>
+          </a:fillRef>
+          <a:effectRef idx="1">
+            <a:schemeClr val="accent3"/>
+          </a:effectRef>
+          <a:fontRef idx="minor">
+            <a:schemeClr val="dk1"/>
+          </a:fontRef>
+        </p:style>
+        <p:txBody>
+          <a:bodyPr rtlCol="0" anchor="ctr"/>
+          <a:lstStyle/>
+          <a:p>
+            <a:pPr algn="ctr"/>
+            <a:r>
+              <a:rPr lang="en-US" sz="1050" b="1" dirty="0" err="1">
+                <a:solidFill>
+                  <a:schemeClr val="accent3">
+                    <a:lumMod val="75000"/>
+                  </a:schemeClr>
+                </a:solidFill>
+              </a:rPr>
+              <a:t>ShortlistPanel</a:t>
+            </a:r>
+            <a:endParaRPr lang="en-SG" sz="1050" b="1" dirty="0">
+              <a:solidFill>
+                <a:schemeClr val="accent3">
+                  <a:lumMod val="75000"/>
+                </a:schemeClr>
+              </a:solidFill>
+            </a:endParaRPr>
+          </a:p>
+        </p:txBody>
+      </p:sp>
+      <p:cxnSp>
+        <p:nvCxnSpPr>
+          <p:cNvPr id="92" name="Elbow Connector 63">
+            <a:extLst>
+              <a:ext uri="{FF2B5EF4-FFF2-40B4-BE49-F238E27FC236}">
+                <a16:creationId xmlns:a16="http://schemas.microsoft.com/office/drawing/2014/main" id="{776AB822-0BD9-4FE1-A4E7-964094B18B26}"/>
+              </a:ext>
+            </a:extLst>
+          </p:cNvPr>
+          <p:cNvCxnSpPr>
+            <a:cxnSpLocks/>
+            <a:stCxn id="39" idx="2"/>
+            <a:endCxn id="90" idx="1"/>
+          </p:cNvCxnSpPr>
+          <p:nvPr/>
+        </p:nvCxnSpPr>
+        <p:spPr>
+          <a:xfrm rot="16200000" flipH="1">
+            <a:off x="1248345" y="4035806"/>
+            <a:ext cx="2499955" cy="164392"/>
+          </a:xfrm>
+          <a:prstGeom prst="bentConnector2">
+            <a:avLst/>
+          </a:prstGeom>
+          <a:ln w="19050">
+            <a:solidFill>
+              <a:schemeClr val="accent3"/>
+            </a:solidFill>
+            <a:headEnd type="none" w="med" len="med"/>
+            <a:tailEnd type="arrow" w="med" len="med"/>
+          </a:ln>
+          <a:effectLst/>
+        </p:spPr>
+        <p:style>
+          <a:lnRef idx="1">
+            <a:schemeClr val="accent2"/>
+          </a:lnRef>
+          <a:fillRef idx="2">
+            <a:schemeClr val="accent2"/>
+          </a:fillRef>
+          <a:effectRef idx="1">
+            <a:schemeClr val="accent2"/>
+          </a:effectRef>
+          <a:fontRef idx="minor">
+            <a:schemeClr val="dk1"/>
+          </a:fontRef>
+        </p:style>
+      </p:cxnSp>
+      <p:cxnSp>
+        <p:nvCxnSpPr>
+          <p:cNvPr id="95" name="Elbow Connector 136">
+            <a:extLst>
+              <a:ext uri="{FF2B5EF4-FFF2-40B4-BE49-F238E27FC236}">
+                <a16:creationId xmlns:a16="http://schemas.microsoft.com/office/drawing/2014/main" id="{5D309582-4DBE-49A7-8329-93C5488FF88A}"/>
+              </a:ext>
+            </a:extLst>
+          </p:cNvPr>
+          <p:cNvCxnSpPr>
+            <a:cxnSpLocks/>
+          </p:cNvCxnSpPr>
+          <p:nvPr/>
+        </p:nvCxnSpPr>
+        <p:spPr>
+          <a:xfrm flipH="1" flipV="1">
+            <a:off x="3131337" y="3865089"/>
+            <a:ext cx="551677" cy="1447800"/>
+          </a:xfrm>
+          <a:prstGeom prst="bentConnector5">
+            <a:avLst>
+              <a:gd name="adj1" fmla="val -35013"/>
+              <a:gd name="adj2" fmla="val 23562"/>
+              <a:gd name="adj3" fmla="val 173559"/>
+            </a:avLst>
+          </a:prstGeom>
+          <a:ln w="19050">
+            <a:solidFill>
+              <a:schemeClr val="accent3"/>
+            </a:solidFill>
+            <a:headEnd type="none" w="med" len="med"/>
+            <a:tailEnd type="arrow" w="med" len="med"/>
+          </a:ln>
+          <a:effectLst/>
+        </p:spPr>
+        <p:style>
+          <a:lnRef idx="1">
+            <a:schemeClr val="accent2"/>
+          </a:lnRef>
+          <a:fillRef idx="2">
+            <a:schemeClr val="accent2"/>
+          </a:fillRef>
+          <a:effectRef idx="1">
+            <a:schemeClr val="accent2"/>
+          </a:effectRef>
+          <a:fontRef idx="minor">
+            <a:schemeClr val="dk1"/>
+          </a:fontRef>
+        </p:style>
+      </p:cxnSp>
+      <p:cxnSp>
+        <p:nvCxnSpPr>
+          <p:cNvPr id="112" name="Elbow Connector 136">
+            <a:extLst>
+              <a:ext uri="{FF2B5EF4-FFF2-40B4-BE49-F238E27FC236}">
+                <a16:creationId xmlns:a16="http://schemas.microsoft.com/office/drawing/2014/main" id="{590B79A1-0836-4261-9E5F-50736064889E}"/>
+              </a:ext>
+            </a:extLst>
+          </p:cNvPr>
+          <p:cNvCxnSpPr>
+            <a:cxnSpLocks/>
+          </p:cNvCxnSpPr>
+          <p:nvPr/>
+        </p:nvCxnSpPr>
+        <p:spPr>
+          <a:xfrm flipH="1" flipV="1">
+            <a:off x="3124200" y="4419600"/>
+            <a:ext cx="551679" cy="990600"/>
+          </a:xfrm>
+          <a:prstGeom prst="bentConnector5">
+            <a:avLst>
+              <a:gd name="adj1" fmla="val -46577"/>
+              <a:gd name="adj2" fmla="val 53577"/>
+              <a:gd name="adj3" fmla="val 141437"/>
+            </a:avLst>
+          </a:prstGeom>
+          <a:ln w="19050">
+            <a:solidFill>
+              <a:schemeClr val="accent3"/>
+            </a:solidFill>
+            <a:headEnd type="none" w="med" len="med"/>
+            <a:tailEnd type="arrow" w="med" len="med"/>
+          </a:ln>
+          <a:effectLst/>
+        </p:spPr>
+        <p:style>
+          <a:lnRef idx="1">
+            <a:schemeClr val="accent2"/>
+          </a:lnRef>
+          <a:fillRef idx="2">
+            <a:schemeClr val="accent2"/>
+          </a:fillRef>
+          <a:effectRef idx="1">
+            <a:schemeClr val="accent2"/>
+          </a:effectRef>
+          <a:fontRef idx="minor">
+            <a:schemeClr val="dk1"/>
+          </a:fontRef>
+        </p:style>
+      </p:cxnSp>
+      <p:cxnSp>
+        <p:nvCxnSpPr>
+          <p:cNvPr id="126" name="Elbow Connector 63">
+            <a:extLst>
+              <a:ext uri="{FF2B5EF4-FFF2-40B4-BE49-F238E27FC236}">
+                <a16:creationId xmlns:a16="http://schemas.microsoft.com/office/drawing/2014/main" id="{B1D01EE2-DF42-474F-AA37-E10A4E0AB54C}"/>
+              </a:ext>
+            </a:extLst>
+          </p:cNvPr>
+          <p:cNvCxnSpPr>
+            <a:cxnSpLocks/>
+            <a:stCxn id="16" idx="3"/>
+            <a:endCxn id="90" idx="3"/>
+          </p:cNvCxnSpPr>
+          <p:nvPr/>
+        </p:nvCxnSpPr>
+        <p:spPr>
+          <a:xfrm rot="5400000">
+            <a:off x="3061934" y="2899945"/>
+            <a:ext cx="3081980" cy="1854090"/>
+          </a:xfrm>
+          <a:prstGeom prst="bentConnector2">
+            <a:avLst/>
+          </a:prstGeom>
+          <a:ln w="6350">
+            <a:solidFill>
+              <a:schemeClr val="accent3"/>
+            </a:solidFill>
+            <a:headEnd type="none" w="med" len="med"/>
+            <a:tailEnd type="none" w="med" len="med"/>
+          </a:ln>
+          <a:effectLst/>
+        </p:spPr>
+        <p:style>
+          <a:lnRef idx="1">
+            <a:schemeClr val="accent2"/>
+          </a:lnRef>
+          <a:fillRef idx="2">
+            <a:schemeClr val="accent2"/>
+          </a:fillRef>
+          <a:effectRef idx="1">
+            <a:schemeClr val="accent2"/>
+          </a:effectRef>
+          <a:fontRef idx="minor">
+            <a:schemeClr val="dk1"/>
+          </a:fontRef>
+        </p:style>
+      </p:cxnSp>
     </p:spTree>
     <p:extLst>
       <p:ext uri="{BB962C8B-B14F-4D97-AF65-F5344CB8AC3E}">

</xml_diff>

<commit_message>
Update UiClassDiagram in dev guide
. Include GroupListPanel and GroupPersonListPanel
</commit_message>
<xml_diff>
--- a/docs/diagrams/UiComponentClassDiagram.pptx
+++ b/docs/diagrams/UiComponentClassDiagram.pptx
@@ -208,7 +208,7 @@
           <a:p>
             <a:fld id="{F5CC4B3F-88C1-4FFA-B1B6-F41C21DC6924}" type="datetimeFigureOut">
               <a:rPr lang="en-US" smtClean="0"/>
-              <a:t>1/7/2017</a:t>
+              <a:t>10/29/2018</a:t>
             </a:fld>
             <a:endParaRPr lang="en-US"/>
           </a:p>
@@ -654,7 +654,7 @@
           <a:p>
             <a:fld id="{78C97017-6FC3-485B-9764-EAC9E56C1D49}" type="datetimeFigureOut">
               <a:rPr lang="en-US" smtClean="0"/>
-              <a:t>1/7/2017</a:t>
+              <a:t>10/29/2018</a:t>
             </a:fld>
             <a:endParaRPr lang="en-US"/>
           </a:p>
@@ -822,7 +822,7 @@
           <a:p>
             <a:fld id="{78C97017-6FC3-485B-9764-EAC9E56C1D49}" type="datetimeFigureOut">
               <a:rPr lang="en-US" smtClean="0"/>
-              <a:t>1/7/2017</a:t>
+              <a:t>10/29/2018</a:t>
             </a:fld>
             <a:endParaRPr lang="en-US"/>
           </a:p>
@@ -1000,7 +1000,7 @@
           <a:p>
             <a:fld id="{78C97017-6FC3-485B-9764-EAC9E56C1D49}" type="datetimeFigureOut">
               <a:rPr lang="en-US" smtClean="0"/>
-              <a:t>1/7/2017</a:t>
+              <a:t>10/29/2018</a:t>
             </a:fld>
             <a:endParaRPr lang="en-US"/>
           </a:p>
@@ -1168,7 +1168,7 @@
           <a:p>
             <a:fld id="{78C97017-6FC3-485B-9764-EAC9E56C1D49}" type="datetimeFigureOut">
               <a:rPr lang="en-US" smtClean="0"/>
-              <a:t>1/7/2017</a:t>
+              <a:t>10/29/2018</a:t>
             </a:fld>
             <a:endParaRPr lang="en-US"/>
           </a:p>
@@ -1413,7 +1413,7 @@
           <a:p>
             <a:fld id="{78C97017-6FC3-485B-9764-EAC9E56C1D49}" type="datetimeFigureOut">
               <a:rPr lang="en-US" smtClean="0"/>
-              <a:t>1/7/2017</a:t>
+              <a:t>10/29/2018</a:t>
             </a:fld>
             <a:endParaRPr lang="en-US"/>
           </a:p>
@@ -1698,7 +1698,7 @@
           <a:p>
             <a:fld id="{78C97017-6FC3-485B-9764-EAC9E56C1D49}" type="datetimeFigureOut">
               <a:rPr lang="en-US" smtClean="0"/>
-              <a:t>1/7/2017</a:t>
+              <a:t>10/29/2018</a:t>
             </a:fld>
             <a:endParaRPr lang="en-US"/>
           </a:p>
@@ -2117,7 +2117,7 @@
           <a:p>
             <a:fld id="{78C97017-6FC3-485B-9764-EAC9E56C1D49}" type="datetimeFigureOut">
               <a:rPr lang="en-US" smtClean="0"/>
-              <a:t>1/7/2017</a:t>
+              <a:t>10/29/2018</a:t>
             </a:fld>
             <a:endParaRPr lang="en-US"/>
           </a:p>
@@ -2234,7 +2234,7 @@
           <a:p>
             <a:fld id="{78C97017-6FC3-485B-9764-EAC9E56C1D49}" type="datetimeFigureOut">
               <a:rPr lang="en-US" smtClean="0"/>
-              <a:t>1/7/2017</a:t>
+              <a:t>10/29/2018</a:t>
             </a:fld>
             <a:endParaRPr lang="en-US"/>
           </a:p>
@@ -2329,7 +2329,7 @@
           <a:p>
             <a:fld id="{78C97017-6FC3-485B-9764-EAC9E56C1D49}" type="datetimeFigureOut">
               <a:rPr lang="en-US" smtClean="0"/>
-              <a:t>1/7/2017</a:t>
+              <a:t>10/29/2018</a:t>
             </a:fld>
             <a:endParaRPr lang="en-US"/>
           </a:p>
@@ -2604,7 +2604,7 @@
           <a:p>
             <a:fld id="{78C97017-6FC3-485B-9764-EAC9E56C1D49}" type="datetimeFigureOut">
               <a:rPr lang="en-US" smtClean="0"/>
-              <a:t>1/7/2017</a:t>
+              <a:t>10/29/2018</a:t>
             </a:fld>
             <a:endParaRPr lang="en-US"/>
           </a:p>
@@ -2856,7 +2856,7 @@
           <a:p>
             <a:fld id="{78C97017-6FC3-485B-9764-EAC9E56C1D49}" type="datetimeFigureOut">
               <a:rPr lang="en-US" smtClean="0"/>
-              <a:t>1/7/2017</a:t>
+              <a:t>10/29/2018</a:t>
             </a:fld>
             <a:endParaRPr lang="en-US"/>
           </a:p>
@@ -3067,7 +3067,7 @@
           <a:p>
             <a:fld id="{78C97017-6FC3-485B-9764-EAC9E56C1D49}" type="datetimeFigureOut">
               <a:rPr lang="en-US" smtClean="0"/>
-              <a:t>1/7/2017</a:t>
+              <a:t>10/29/2018</a:t>
             </a:fld>
             <a:endParaRPr lang="en-US"/>
           </a:p>
@@ -3450,8 +3450,8 @@
         </p:nvSpPr>
         <p:spPr>
           <a:xfrm>
-            <a:off x="1217465" y="1447800"/>
-            <a:ext cx="4917083" cy="3962400"/>
+            <a:off x="1143000" y="1409701"/>
+            <a:ext cx="4917083" cy="5143500"/>
           </a:xfrm>
           <a:prstGeom prst="roundRect">
             <a:avLst>
@@ -3545,7 +3545,7 @@
           <a:p>
             <a:pPr algn="ctr"/>
             <a:r>
-              <a:rPr lang="en-US" sz="1050" b="1" dirty="0" err="1">
+              <a:rPr lang="en-US" sz="1050" b="1" dirty="0">
                 <a:solidFill>
                   <a:schemeClr val="accent3">
                     <a:lumMod val="75000"/>
@@ -3605,7 +3605,7 @@
           <a:p>
             <a:pPr algn="ctr"/>
             <a:r>
-              <a:rPr lang="en-US" sz="1050" b="1" dirty="0" err="1">
+              <a:rPr lang="en-US" sz="1050" b="1" dirty="0">
                 <a:solidFill>
                   <a:schemeClr val="accent3">
                     <a:lumMod val="75000"/>
@@ -3668,7 +3668,7 @@
           <a:p>
             <a:pPr algn="ctr"/>
             <a:r>
-              <a:rPr lang="en-US" sz="1050" dirty="0" err="1">
+              <a:rPr lang="en-US" sz="1050" dirty="0">
                 <a:solidFill>
                   <a:schemeClr val="bg1"/>
                 </a:solidFill>
@@ -3918,7 +3918,7 @@
           <a:p>
             <a:pPr algn="ctr"/>
             <a:r>
-              <a:rPr lang="en-US" sz="1050" b="1" dirty="0" err="1">
+              <a:rPr lang="en-US" sz="1050" b="1" dirty="0">
                 <a:solidFill>
                   <a:schemeClr val="accent3">
                     <a:lumMod val="75000"/>
@@ -3945,7 +3945,7 @@
         </p:nvSpPr>
         <p:spPr>
           <a:xfrm>
-            <a:off x="2592527" y="4563759"/>
+            <a:off x="2572271" y="5622514"/>
             <a:ext cx="1093635" cy="236841"/>
           </a:xfrm>
           <a:prstGeom prst="rect">
@@ -3978,7 +3978,7 @@
           <a:p>
             <a:pPr algn="ctr"/>
             <a:r>
-              <a:rPr lang="en-US" sz="1050" b="1" dirty="0" err="1">
+              <a:rPr lang="en-US" sz="1050" b="1" dirty="0">
                 <a:solidFill>
                   <a:schemeClr val="accent3">
                     <a:lumMod val="75000"/>
@@ -4038,7 +4038,7 @@
           <a:p>
             <a:pPr algn="ctr"/>
             <a:r>
-              <a:rPr lang="en-US" sz="1050" b="1" dirty="0" err="1">
+              <a:rPr lang="en-US" sz="1050" b="1" dirty="0">
                 <a:solidFill>
                   <a:schemeClr val="accent3">
                     <a:lumMod val="75000"/>
@@ -4098,7 +4098,7 @@
           <a:p>
             <a:pPr algn="ctr"/>
             <a:r>
-              <a:rPr lang="en-US" sz="1050" b="1" dirty="0" err="1">
+              <a:rPr lang="en-US" sz="1050" b="1" dirty="0">
                 <a:solidFill>
                   <a:schemeClr val="accent3">
                     <a:lumMod val="75000"/>
@@ -4125,7 +4125,7 @@
         </p:nvSpPr>
         <p:spPr>
           <a:xfrm>
-            <a:off x="2592528" y="4966000"/>
+            <a:off x="2582371" y="6012778"/>
             <a:ext cx="1093635" cy="236841"/>
           </a:xfrm>
           <a:prstGeom prst="rect">
@@ -4158,7 +4158,7 @@
           <a:p>
             <a:pPr algn="ctr"/>
             <a:r>
-              <a:rPr lang="en-US" sz="1050" b="1" dirty="0" err="1">
+              <a:rPr lang="en-US" sz="1050" b="1" dirty="0">
                 <a:solidFill>
                   <a:schemeClr val="accent3">
                     <a:lumMod val="75000"/>
@@ -4307,7 +4307,7 @@
           <a:p>
             <a:pPr algn="ctr"/>
             <a:r>
-              <a:rPr lang="en-US" sz="1050" b="1" dirty="0" err="1">
+              <a:rPr lang="en-US" sz="1050" b="1" dirty="0">
                 <a:solidFill>
                   <a:schemeClr val="accent3">
                     <a:lumMod val="75000"/>
@@ -4371,6 +4371,7 @@
         <p:nvCxnSpPr>
           <p:cNvPr id="47" name="Elbow Connector 63"/>
           <p:cNvCxnSpPr>
+            <a:cxnSpLocks/>
             <a:stCxn id="39" idx="2"/>
             <a:endCxn id="36" idx="1"/>
           </p:cNvCxnSpPr>
@@ -4412,15 +4413,14 @@
         <p:nvCxnSpPr>
           <p:cNvPr id="50" name="Elbow Connector 63"/>
           <p:cNvCxnSpPr>
-            <a:stCxn id="39" idx="2"/>
-            <a:endCxn id="35" idx="1"/>
+            <a:cxnSpLocks/>
           </p:cNvCxnSpPr>
           <p:nvPr/>
         </p:nvCxnSpPr>
         <p:spPr>
           <a:xfrm rot="16200000" flipH="1">
-            <a:off x="1597249" y="3686901"/>
-            <a:ext cx="1814155" cy="176401"/>
+            <a:off x="1041771" y="4232601"/>
+            <a:ext cx="2895664" cy="166509"/>
           </a:xfrm>
           <a:prstGeom prst="bentConnector2">
             <a:avLst/>
@@ -4453,14 +4453,14 @@
         <p:nvCxnSpPr>
           <p:cNvPr id="53" name="Elbow Connector 63"/>
           <p:cNvCxnSpPr>
-            <a:endCxn id="38" idx="1"/>
+            <a:cxnSpLocks/>
           </p:cNvCxnSpPr>
           <p:nvPr/>
         </p:nvCxnSpPr>
         <p:spPr>
           <a:xfrm rot="16200000" flipH="1">
-            <a:off x="1184119" y="3676012"/>
-            <a:ext cx="2396440" cy="420377"/>
+            <a:off x="644170" y="4211192"/>
+            <a:ext cx="3452749" cy="387265"/>
           </a:xfrm>
           <a:prstGeom prst="bentConnector2">
             <a:avLst/>
@@ -4549,7 +4549,7 @@
               </a:rPr>
             </a:br>
             <a:r>
-              <a:rPr lang="en-US" sz="1050" b="1" dirty="0" err="1">
+              <a:rPr lang="en-US" sz="1050" b="1" dirty="0">
                 <a:solidFill>
                   <a:schemeClr val="accent3">
                     <a:lumMod val="75000"/>
@@ -4743,8 +4743,8 @@
         </p:nvCxnSpPr>
         <p:spPr>
           <a:xfrm rot="5400000">
-            <a:off x="3409976" y="2562187"/>
-            <a:ext cx="2396180" cy="1843807"/>
+            <a:off x="2870471" y="3081436"/>
+            <a:ext cx="3454935" cy="1864063"/>
           </a:xfrm>
           <a:prstGeom prst="bentConnector2">
             <a:avLst/>
@@ -4784,8 +4784,8 @@
         </p:nvCxnSpPr>
         <p:spPr>
           <a:xfrm rot="5400000">
-            <a:off x="3208856" y="2763307"/>
-            <a:ext cx="2798421" cy="1843806"/>
+            <a:off x="2680389" y="3281618"/>
+            <a:ext cx="3845199" cy="1853963"/>
           </a:xfrm>
           <a:prstGeom prst="bentConnector2">
             <a:avLst/>
@@ -4863,8 +4863,8 @@
         </p:nvSpPr>
         <p:spPr>
           <a:xfrm rot="16200000">
-            <a:off x="6213739" y="4560376"/>
-            <a:ext cx="1371599" cy="328045"/>
+            <a:off x="5794029" y="4980085"/>
+            <a:ext cx="2211020" cy="328045"/>
           </a:xfrm>
           <a:prstGeom prst="roundRect">
             <a:avLst/>
@@ -4970,7 +4970,7 @@
           <a:p>
             <a:pPr algn="ctr"/>
             <a:r>
-              <a:rPr lang="en-US" sz="1050" dirty="0" err="1">
+              <a:rPr lang="en-US" sz="1050" dirty="0">
                 <a:solidFill>
                   <a:schemeClr val="bg1"/>
                 </a:solidFill>
@@ -5436,6 +5436,626 @@
         <p:spPr>
           <a:xfrm flipV="1">
             <a:off x="4114799" y="4472708"/>
+            <a:ext cx="2642195" cy="101600"/>
+          </a:xfrm>
+          <a:custGeom>
+            <a:avLst/>
+            <a:gdLst>
+              <a:gd name="connsiteX0" fmla="*/ 0 w 3048000"/>
+              <a:gd name="connsiteY0" fmla="*/ 203200 h 203200"/>
+              <a:gd name="connsiteX1" fmla="*/ 221673 w 3048000"/>
+              <a:gd name="connsiteY1" fmla="*/ 0 h 203200"/>
+              <a:gd name="connsiteX2" fmla="*/ 3048000 w 3048000"/>
+              <a:gd name="connsiteY2" fmla="*/ 0 h 203200"/>
+            </a:gdLst>
+            <a:ahLst/>
+            <a:cxnLst>
+              <a:cxn ang="0">
+                <a:pos x="connsiteX0" y="connsiteY0"/>
+              </a:cxn>
+              <a:cxn ang="0">
+                <a:pos x="connsiteX1" y="connsiteY1"/>
+              </a:cxn>
+              <a:cxn ang="0">
+                <a:pos x="connsiteX2" y="connsiteY2"/>
+              </a:cxn>
+            </a:cxnLst>
+            <a:rect l="l" t="t" r="r" b="b"/>
+            <a:pathLst>
+              <a:path w="3048000" h="203200">
+                <a:moveTo>
+                  <a:pt x="0" y="203200"/>
+                </a:moveTo>
+                <a:lnTo>
+                  <a:pt x="221673" y="0"/>
+                </a:lnTo>
+                <a:lnTo>
+                  <a:pt x="3048000" y="0"/>
+                </a:lnTo>
+              </a:path>
+            </a:pathLst>
+          </a:custGeom>
+          <a:noFill/>
+          <a:ln w="19050">
+            <a:solidFill>
+              <a:schemeClr val="accent3"/>
+            </a:solidFill>
+            <a:prstDash val="sysDot"/>
+            <a:headEnd type="none" w="med" len="med"/>
+            <a:tailEnd type="arrow" w="med" len="med"/>
+          </a:ln>
+          <a:effectLst/>
+        </p:spPr>
+        <p:style>
+          <a:lnRef idx="1">
+            <a:schemeClr val="accent2"/>
+          </a:lnRef>
+          <a:fillRef idx="2">
+            <a:schemeClr val="accent2"/>
+          </a:fillRef>
+          <a:effectRef idx="1">
+            <a:schemeClr val="accent2"/>
+          </a:effectRef>
+          <a:fontRef idx="minor">
+            <a:schemeClr val="dk1"/>
+          </a:fontRef>
+        </p:style>
+        <p:txBody>
+          <a:bodyPr rtlCol="0" anchor="ctr"/>
+          <a:lstStyle/>
+          <a:p>
+            <a:pPr algn="ctr"/>
+            <a:endParaRPr lang="en-SG"/>
+          </a:p>
+        </p:txBody>
+      </p:sp>
+      <p:cxnSp>
+        <p:nvCxnSpPr>
+          <p:cNvPr id="59" name="Elbow Connector 63">
+            <a:extLst>
+              <a:ext uri="{FF2B5EF4-FFF2-40B4-BE49-F238E27FC236}">
+                <a16:creationId xmlns:a16="http://schemas.microsoft.com/office/drawing/2014/main" id="{4E141416-92C2-440A-80B4-366CF35C0558}"/>
+              </a:ext>
+            </a:extLst>
+          </p:cNvPr>
+          <p:cNvCxnSpPr>
+            <a:cxnSpLocks/>
+          </p:cNvCxnSpPr>
+          <p:nvPr/>
+        </p:nvCxnSpPr>
+        <p:spPr>
+          <a:xfrm rot="16200000" flipH="1">
+            <a:off x="1488706" y="4125774"/>
+            <a:ext cx="2006326" cy="169838"/>
+          </a:xfrm>
+          <a:prstGeom prst="bentConnector2">
+            <a:avLst/>
+          </a:prstGeom>
+          <a:ln w="19050">
+            <a:solidFill>
+              <a:schemeClr val="accent3"/>
+            </a:solidFill>
+            <a:headEnd type="none" w="med" len="med"/>
+            <a:tailEnd type="arrow" w="med" len="med"/>
+          </a:ln>
+          <a:effectLst/>
+        </p:spPr>
+        <p:style>
+          <a:lnRef idx="1">
+            <a:schemeClr val="accent2"/>
+          </a:lnRef>
+          <a:fillRef idx="2">
+            <a:schemeClr val="accent2"/>
+          </a:fillRef>
+          <a:effectRef idx="1">
+            <a:schemeClr val="accent2"/>
+          </a:effectRef>
+          <a:fontRef idx="minor">
+            <a:schemeClr val="dk1"/>
+          </a:fontRef>
+        </p:style>
+      </p:cxnSp>
+      <p:sp>
+        <p:nvSpPr>
+          <p:cNvPr id="60" name="Rectangle 11">
+            <a:extLst>
+              <a:ext uri="{FF2B5EF4-FFF2-40B4-BE49-F238E27FC236}">
+                <a16:creationId xmlns:a16="http://schemas.microsoft.com/office/drawing/2014/main" id="{535049BE-FEC9-4700-996A-CAA3549170CD}"/>
+              </a:ext>
+            </a:extLst>
+          </p:cNvPr>
+          <p:cNvSpPr/>
+          <p:nvPr/>
+        </p:nvSpPr>
+        <p:spPr>
+          <a:xfrm>
+            <a:off x="2594514" y="4477799"/>
+            <a:ext cx="1093635" cy="236841"/>
+          </a:xfrm>
+          <a:prstGeom prst="rect">
+            <a:avLst/>
+          </a:prstGeom>
+          <a:ln w="19050">
+            <a:solidFill>
+              <a:schemeClr val="accent3"/>
+            </a:solidFill>
+          </a:ln>
+          <a:effectLst/>
+        </p:spPr>
+        <p:style>
+          <a:lnRef idx="1">
+            <a:schemeClr val="accent3"/>
+          </a:lnRef>
+          <a:fillRef idx="2">
+            <a:schemeClr val="accent3"/>
+          </a:fillRef>
+          <a:effectRef idx="1">
+            <a:schemeClr val="accent3"/>
+          </a:effectRef>
+          <a:fontRef idx="minor">
+            <a:schemeClr val="dk1"/>
+          </a:fontRef>
+        </p:style>
+        <p:txBody>
+          <a:bodyPr rtlCol="0" anchor="ctr"/>
+          <a:lstStyle/>
+          <a:p>
+            <a:pPr algn="ctr"/>
+            <a:r>
+              <a:rPr lang="en-US" sz="1050" b="1" dirty="0">
+                <a:solidFill>
+                  <a:schemeClr val="accent3">
+                    <a:lumMod val="75000"/>
+                  </a:schemeClr>
+                </a:solidFill>
+              </a:rPr>
+              <a:t>GroupListPanel</a:t>
+            </a:r>
+            <a:endParaRPr lang="en-SG" sz="1050" b="1" dirty="0">
+              <a:solidFill>
+                <a:schemeClr val="accent3">
+                  <a:lumMod val="75000"/>
+                </a:schemeClr>
+              </a:solidFill>
+            </a:endParaRPr>
+          </a:p>
+        </p:txBody>
+      </p:sp>
+      <p:sp>
+        <p:nvSpPr>
+          <p:cNvPr id="61" name="Rectangle 11">
+            <a:extLst>
+              <a:ext uri="{FF2B5EF4-FFF2-40B4-BE49-F238E27FC236}">
+                <a16:creationId xmlns:a16="http://schemas.microsoft.com/office/drawing/2014/main" id="{6C43F4AA-99DE-44A9-99A9-FA9EE0D360F9}"/>
+              </a:ext>
+            </a:extLst>
+          </p:cNvPr>
+          <p:cNvSpPr/>
+          <p:nvPr/>
+        </p:nvSpPr>
+        <p:spPr>
+          <a:xfrm>
+            <a:off x="3840642" y="4772128"/>
+            <a:ext cx="1040906" cy="236841"/>
+          </a:xfrm>
+          <a:prstGeom prst="rect">
+            <a:avLst/>
+          </a:prstGeom>
+          <a:ln w="19050">
+            <a:solidFill>
+              <a:schemeClr val="accent3"/>
+            </a:solidFill>
+          </a:ln>
+          <a:effectLst/>
+        </p:spPr>
+        <p:style>
+          <a:lnRef idx="1">
+            <a:schemeClr val="accent3"/>
+          </a:lnRef>
+          <a:fillRef idx="2">
+            <a:schemeClr val="accent3"/>
+          </a:fillRef>
+          <a:effectRef idx="1">
+            <a:schemeClr val="accent3"/>
+          </a:effectRef>
+          <a:fontRef idx="minor">
+            <a:schemeClr val="dk1"/>
+          </a:fontRef>
+        </p:style>
+        <p:txBody>
+          <a:bodyPr rtlCol="0" anchor="ctr"/>
+          <a:lstStyle/>
+          <a:p>
+            <a:pPr algn="ctr"/>
+            <a:r>
+              <a:rPr lang="en-US" sz="1050" b="1" dirty="0">
+                <a:solidFill>
+                  <a:schemeClr val="accent3">
+                    <a:lumMod val="75000"/>
+                  </a:schemeClr>
+                </a:solidFill>
+              </a:rPr>
+              <a:t>GroupCard</a:t>
+            </a:r>
+            <a:endParaRPr lang="en-SG" sz="1050" b="1" dirty="0">
+              <a:solidFill>
+                <a:schemeClr val="accent3">
+                  <a:lumMod val="75000"/>
+                </a:schemeClr>
+              </a:solidFill>
+            </a:endParaRPr>
+          </a:p>
+        </p:txBody>
+      </p:sp>
+      <p:cxnSp>
+        <p:nvCxnSpPr>
+          <p:cNvPr id="62" name="Elbow Connector 136">
+            <a:extLst>
+              <a:ext uri="{FF2B5EF4-FFF2-40B4-BE49-F238E27FC236}">
+                <a16:creationId xmlns:a16="http://schemas.microsoft.com/office/drawing/2014/main" id="{65DFC4EB-F136-4E71-B0B4-809170796EF9}"/>
+              </a:ext>
+            </a:extLst>
+          </p:cNvPr>
+          <p:cNvCxnSpPr/>
+          <p:nvPr/>
+        </p:nvCxnSpPr>
+        <p:spPr>
+          <a:xfrm rot="16200000" flipH="1">
+            <a:off x="3436803" y="4458863"/>
+            <a:ext cx="118421" cy="699979"/>
+          </a:xfrm>
+          <a:prstGeom prst="bentConnector2">
+            <a:avLst/>
+          </a:prstGeom>
+          <a:ln w="19050">
+            <a:solidFill>
+              <a:schemeClr val="accent3"/>
+            </a:solidFill>
+            <a:headEnd type="none" w="med" len="med"/>
+            <a:tailEnd type="arrow" w="med" len="med"/>
+          </a:ln>
+          <a:effectLst/>
+        </p:spPr>
+        <p:style>
+          <a:lnRef idx="1">
+            <a:schemeClr val="accent2"/>
+          </a:lnRef>
+          <a:fillRef idx="2">
+            <a:schemeClr val="accent2"/>
+          </a:fillRef>
+          <a:effectRef idx="1">
+            <a:schemeClr val="accent2"/>
+          </a:effectRef>
+          <a:fontRef idx="minor">
+            <a:schemeClr val="dk1"/>
+          </a:fontRef>
+        </p:style>
+      </p:cxnSp>
+      <p:sp>
+        <p:nvSpPr>
+          <p:cNvPr id="65" name="Freeform 117">
+            <a:extLst>
+              <a:ext uri="{FF2B5EF4-FFF2-40B4-BE49-F238E27FC236}">
+                <a16:creationId xmlns:a16="http://schemas.microsoft.com/office/drawing/2014/main" id="{83E0DA75-59AB-4F60-937F-30EC6CFBB702}"/>
+              </a:ext>
+            </a:extLst>
+          </p:cNvPr>
+          <p:cNvSpPr/>
+          <p:nvPr/>
+        </p:nvSpPr>
+        <p:spPr>
+          <a:xfrm flipV="1">
+            <a:off x="4100320" y="5028295"/>
+            <a:ext cx="2642195" cy="101600"/>
+          </a:xfrm>
+          <a:custGeom>
+            <a:avLst/>
+            <a:gdLst>
+              <a:gd name="connsiteX0" fmla="*/ 0 w 3048000"/>
+              <a:gd name="connsiteY0" fmla="*/ 203200 h 203200"/>
+              <a:gd name="connsiteX1" fmla="*/ 221673 w 3048000"/>
+              <a:gd name="connsiteY1" fmla="*/ 0 h 203200"/>
+              <a:gd name="connsiteX2" fmla="*/ 3048000 w 3048000"/>
+              <a:gd name="connsiteY2" fmla="*/ 0 h 203200"/>
+            </a:gdLst>
+            <a:ahLst/>
+            <a:cxnLst>
+              <a:cxn ang="0">
+                <a:pos x="connsiteX0" y="connsiteY0"/>
+              </a:cxn>
+              <a:cxn ang="0">
+                <a:pos x="connsiteX1" y="connsiteY1"/>
+              </a:cxn>
+              <a:cxn ang="0">
+                <a:pos x="connsiteX2" y="connsiteY2"/>
+              </a:cxn>
+            </a:cxnLst>
+            <a:rect l="l" t="t" r="r" b="b"/>
+            <a:pathLst>
+              <a:path w="3048000" h="203200">
+                <a:moveTo>
+                  <a:pt x="0" y="203200"/>
+                </a:moveTo>
+                <a:lnTo>
+                  <a:pt x="221673" y="0"/>
+                </a:lnTo>
+                <a:lnTo>
+                  <a:pt x="3048000" y="0"/>
+                </a:lnTo>
+              </a:path>
+            </a:pathLst>
+          </a:custGeom>
+          <a:noFill/>
+          <a:ln w="19050">
+            <a:solidFill>
+              <a:schemeClr val="accent3"/>
+            </a:solidFill>
+            <a:prstDash val="sysDot"/>
+            <a:headEnd type="none" w="med" len="med"/>
+            <a:tailEnd type="arrow" w="med" len="med"/>
+          </a:ln>
+          <a:effectLst/>
+        </p:spPr>
+        <p:style>
+          <a:lnRef idx="1">
+            <a:schemeClr val="accent2"/>
+          </a:lnRef>
+          <a:fillRef idx="2">
+            <a:schemeClr val="accent2"/>
+          </a:fillRef>
+          <a:effectRef idx="1">
+            <a:schemeClr val="accent2"/>
+          </a:effectRef>
+          <a:fontRef idx="minor">
+            <a:schemeClr val="dk1"/>
+          </a:fontRef>
+        </p:style>
+        <p:txBody>
+          <a:bodyPr rtlCol="0" anchor="ctr"/>
+          <a:lstStyle/>
+          <a:p>
+            <a:pPr algn="ctr"/>
+            <a:endParaRPr lang="en-SG"/>
+          </a:p>
+        </p:txBody>
+      </p:sp>
+      <p:cxnSp>
+        <p:nvCxnSpPr>
+          <p:cNvPr id="72" name="Elbow Connector 63">
+            <a:extLst>
+              <a:ext uri="{FF2B5EF4-FFF2-40B4-BE49-F238E27FC236}">
+                <a16:creationId xmlns:a16="http://schemas.microsoft.com/office/drawing/2014/main" id="{E4639CE1-4699-4416-9144-302F6536FF53}"/>
+              </a:ext>
+            </a:extLst>
+          </p:cNvPr>
+          <p:cNvCxnSpPr>
+            <a:cxnSpLocks/>
+          </p:cNvCxnSpPr>
+          <p:nvPr/>
+        </p:nvCxnSpPr>
+        <p:spPr>
+          <a:xfrm rot="16200000" flipH="1">
+            <a:off x="1646571" y="3614926"/>
+            <a:ext cx="1723820" cy="181216"/>
+          </a:xfrm>
+          <a:prstGeom prst="bentConnector2">
+            <a:avLst/>
+          </a:prstGeom>
+          <a:ln w="19050">
+            <a:solidFill>
+              <a:schemeClr val="accent3"/>
+            </a:solidFill>
+            <a:headEnd type="none" w="med" len="med"/>
+            <a:tailEnd type="arrow" w="med" len="med"/>
+          </a:ln>
+          <a:effectLst/>
+        </p:spPr>
+        <p:style>
+          <a:lnRef idx="1">
+            <a:schemeClr val="accent2"/>
+          </a:lnRef>
+          <a:fillRef idx="2">
+            <a:schemeClr val="accent2"/>
+          </a:fillRef>
+          <a:effectRef idx="1">
+            <a:schemeClr val="accent2"/>
+          </a:effectRef>
+          <a:fontRef idx="minor">
+            <a:schemeClr val="dk1"/>
+          </a:fontRef>
+        </p:style>
+      </p:cxnSp>
+      <p:sp>
+        <p:nvSpPr>
+          <p:cNvPr id="75" name="Rectangle 11">
+            <a:extLst>
+              <a:ext uri="{FF2B5EF4-FFF2-40B4-BE49-F238E27FC236}">
+                <a16:creationId xmlns:a16="http://schemas.microsoft.com/office/drawing/2014/main" id="{7405F62A-36B7-4E38-8F17-8F64AB703999}"/>
+              </a:ext>
+            </a:extLst>
+          </p:cNvPr>
+          <p:cNvSpPr/>
+          <p:nvPr/>
+        </p:nvSpPr>
+        <p:spPr>
+          <a:xfrm>
+            <a:off x="2564177" y="5082775"/>
+            <a:ext cx="1502240" cy="236841"/>
+          </a:xfrm>
+          <a:prstGeom prst="rect">
+            <a:avLst/>
+          </a:prstGeom>
+          <a:ln w="19050">
+            <a:solidFill>
+              <a:schemeClr val="accent3"/>
+            </a:solidFill>
+          </a:ln>
+          <a:effectLst/>
+        </p:spPr>
+        <p:style>
+          <a:lnRef idx="1">
+            <a:schemeClr val="accent3"/>
+          </a:lnRef>
+          <a:fillRef idx="2">
+            <a:schemeClr val="accent3"/>
+          </a:fillRef>
+          <a:effectRef idx="1">
+            <a:schemeClr val="accent3"/>
+          </a:effectRef>
+          <a:fontRef idx="minor">
+            <a:schemeClr val="dk1"/>
+          </a:fontRef>
+        </p:style>
+        <p:txBody>
+          <a:bodyPr rtlCol="0" anchor="ctr"/>
+          <a:lstStyle/>
+          <a:p>
+            <a:pPr algn="ctr"/>
+            <a:r>
+              <a:rPr lang="en-US" sz="1050" b="1" dirty="0">
+                <a:solidFill>
+                  <a:schemeClr val="accent3">
+                    <a:lumMod val="75000"/>
+                  </a:schemeClr>
+                </a:solidFill>
+              </a:rPr>
+              <a:t>GroupPerosnListPanel</a:t>
+            </a:r>
+            <a:endParaRPr lang="en-SG" sz="1050" b="1" dirty="0">
+              <a:solidFill>
+                <a:schemeClr val="accent3">
+                  <a:lumMod val="75000"/>
+                </a:schemeClr>
+              </a:solidFill>
+            </a:endParaRPr>
+          </a:p>
+        </p:txBody>
+      </p:sp>
+      <p:cxnSp>
+        <p:nvCxnSpPr>
+          <p:cNvPr id="76" name="Elbow Connector 136">
+            <a:extLst>
+              <a:ext uri="{FF2B5EF4-FFF2-40B4-BE49-F238E27FC236}">
+                <a16:creationId xmlns:a16="http://schemas.microsoft.com/office/drawing/2014/main" id="{74D7C997-9861-44EE-A148-CD3C5EC114CD}"/>
+              </a:ext>
+            </a:extLst>
+          </p:cNvPr>
+          <p:cNvCxnSpPr/>
+          <p:nvPr/>
+        </p:nvCxnSpPr>
+        <p:spPr>
+          <a:xfrm rot="16200000" flipH="1">
+            <a:off x="3439831" y="5057812"/>
+            <a:ext cx="118421" cy="699979"/>
+          </a:xfrm>
+          <a:prstGeom prst="bentConnector2">
+            <a:avLst/>
+          </a:prstGeom>
+          <a:ln w="19050">
+            <a:solidFill>
+              <a:schemeClr val="accent3"/>
+            </a:solidFill>
+            <a:headEnd type="none" w="med" len="med"/>
+            <a:tailEnd type="arrow" w="med" len="med"/>
+          </a:ln>
+          <a:effectLst/>
+        </p:spPr>
+        <p:style>
+          <a:lnRef idx="1">
+            <a:schemeClr val="accent2"/>
+          </a:lnRef>
+          <a:fillRef idx="2">
+            <a:schemeClr val="accent2"/>
+          </a:fillRef>
+          <a:effectRef idx="1">
+            <a:schemeClr val="accent2"/>
+          </a:effectRef>
+          <a:fontRef idx="minor">
+            <a:schemeClr val="dk1"/>
+          </a:fontRef>
+        </p:style>
+      </p:cxnSp>
+      <p:sp>
+        <p:nvSpPr>
+          <p:cNvPr id="78" name="Rectangle 11">
+            <a:extLst>
+              <a:ext uri="{FF2B5EF4-FFF2-40B4-BE49-F238E27FC236}">
+                <a16:creationId xmlns:a16="http://schemas.microsoft.com/office/drawing/2014/main" id="{296279F6-3823-4EF3-867C-827E5629DFF3}"/>
+              </a:ext>
+            </a:extLst>
+          </p:cNvPr>
+          <p:cNvSpPr/>
+          <p:nvPr/>
+        </p:nvSpPr>
+        <p:spPr>
+          <a:xfrm>
+            <a:off x="3828338" y="5366092"/>
+            <a:ext cx="1040906" cy="236841"/>
+          </a:xfrm>
+          <a:prstGeom prst="rect">
+            <a:avLst/>
+          </a:prstGeom>
+          <a:ln w="19050">
+            <a:solidFill>
+              <a:schemeClr val="accent3"/>
+            </a:solidFill>
+          </a:ln>
+          <a:effectLst/>
+        </p:spPr>
+        <p:style>
+          <a:lnRef idx="1">
+            <a:schemeClr val="accent3"/>
+          </a:lnRef>
+          <a:fillRef idx="2">
+            <a:schemeClr val="accent3"/>
+          </a:fillRef>
+          <a:effectRef idx="1">
+            <a:schemeClr val="accent3"/>
+          </a:effectRef>
+          <a:fontRef idx="minor">
+            <a:schemeClr val="dk1"/>
+          </a:fontRef>
+        </p:style>
+        <p:txBody>
+          <a:bodyPr rtlCol="0" anchor="ctr"/>
+          <a:lstStyle/>
+          <a:p>
+            <a:pPr algn="ctr"/>
+            <a:r>
+              <a:rPr lang="en-US" sz="1050" b="1" dirty="0">
+                <a:solidFill>
+                  <a:schemeClr val="accent3">
+                    <a:lumMod val="75000"/>
+                  </a:schemeClr>
+                </a:solidFill>
+              </a:rPr>
+              <a:t>PersonCard</a:t>
+            </a:r>
+            <a:endParaRPr lang="en-SG" sz="1050" b="1" dirty="0">
+              <a:solidFill>
+                <a:schemeClr val="accent3">
+                  <a:lumMod val="75000"/>
+                </a:schemeClr>
+              </a:solidFill>
+            </a:endParaRPr>
+          </a:p>
+        </p:txBody>
+      </p:sp>
+      <p:sp>
+        <p:nvSpPr>
+          <p:cNvPr id="79" name="Freeform 117">
+            <a:extLst>
+              <a:ext uri="{FF2B5EF4-FFF2-40B4-BE49-F238E27FC236}">
+                <a16:creationId xmlns:a16="http://schemas.microsoft.com/office/drawing/2014/main" id="{646C37F9-851C-4919-A86C-FEE86772657B}"/>
+              </a:ext>
+            </a:extLst>
+          </p:cNvPr>
+          <p:cNvSpPr/>
+          <p:nvPr/>
+        </p:nvSpPr>
+        <p:spPr>
+          <a:xfrm flipV="1">
+            <a:off x="4093320" y="5593499"/>
             <a:ext cx="2642195" cy="101600"/>
           </a:xfrm>
           <a:custGeom>

</xml_diff>

<commit_message>
Updated UI class diagram
</commit_message>
<xml_diff>
--- a/docs/diagrams/UiComponentClassDiagram.pptx
+++ b/docs/diagrams/UiComponentClassDiagram.pptx
@@ -6414,56 +6414,6 @@
           </a:effectRef>
           <a:fontRef idx="minor">
             <a:schemeClr val="tx1"/>
-          </a:fontRef>
-        </p:style>
-      </p:cxnSp>
-      <p:cxnSp>
-        <p:nvCxnSpPr>
-          <p:cNvPr id="186" name="Elbow Connector 63">
-            <a:extLst>
-              <a:ext uri="{FF2B5EF4-FFF2-40B4-BE49-F238E27FC236}">
-                <a16:creationId xmlns:a16="http://schemas.microsoft.com/office/drawing/2014/main" id="{CDB66CB0-D1D2-4C79-8532-E31229836F81}"/>
-              </a:ext>
-            </a:extLst>
-          </p:cNvPr>
-          <p:cNvCxnSpPr>
-            <a:cxnSpLocks/>
-            <a:stCxn id="45" idx="3"/>
-            <a:endCxn id="101" idx="1"/>
-          </p:cNvCxnSpPr>
-          <p:nvPr/>
-        </p:nvCxnSpPr>
-        <p:spPr>
-          <a:xfrm>
-            <a:off x="3641870" y="4151227"/>
-            <a:ext cx="610199" cy="1168543"/>
-          </a:xfrm>
-          <a:prstGeom prst="bentConnector3">
-            <a:avLst>
-              <a:gd name="adj1" fmla="val 50000"/>
-            </a:avLst>
-          </a:prstGeom>
-          <a:ln w="19050">
-            <a:solidFill>
-              <a:schemeClr val="accent3"/>
-            </a:solidFill>
-            <a:headEnd type="none" w="med" len="med"/>
-            <a:tailEnd type="arrow" w="med" len="med"/>
-          </a:ln>
-          <a:effectLst/>
-        </p:spPr>
-        <p:style>
-          <a:lnRef idx="1">
-            <a:schemeClr val="accent2"/>
-          </a:lnRef>
-          <a:fillRef idx="2">
-            <a:schemeClr val="accent2"/>
-          </a:fillRef>
-          <a:effectRef idx="1">
-            <a:schemeClr val="accent2"/>
-          </a:effectRef>
-          <a:fontRef idx="minor">
-            <a:schemeClr val="dk1"/>
           </a:fontRef>
         </p:style>
       </p:cxnSp>

</xml_diff>

<commit_message>
Updated UG,DG and PPP to fix existing UG bugs and update design section of DG
</commit_message>
<xml_diff>
--- a/docs/diagrams/UiComponentClassDiagram.pptx
+++ b/docs/diagrams/UiComponentClassDiagram.pptx
@@ -208,7 +208,7 @@
           <a:p>
             <a:fld id="{F5CC4B3F-88C1-4FFA-B1B6-F41C21DC6924}" type="datetimeFigureOut">
               <a:rPr lang="en-US" smtClean="0"/>
-              <a:t>10/16/2018</a:t>
+              <a:t>11/4/2018</a:t>
             </a:fld>
             <a:endParaRPr lang="en-US"/>
           </a:p>
@@ -654,7 +654,7 @@
           <a:p>
             <a:fld id="{78C97017-6FC3-485B-9764-EAC9E56C1D49}" type="datetimeFigureOut">
               <a:rPr lang="en-US" smtClean="0"/>
-              <a:t>10/16/2018</a:t>
+              <a:t>11/4/2018</a:t>
             </a:fld>
             <a:endParaRPr lang="en-US"/>
           </a:p>
@@ -822,7 +822,7 @@
           <a:p>
             <a:fld id="{78C97017-6FC3-485B-9764-EAC9E56C1D49}" type="datetimeFigureOut">
               <a:rPr lang="en-US" smtClean="0"/>
-              <a:t>10/16/2018</a:t>
+              <a:t>11/4/2018</a:t>
             </a:fld>
             <a:endParaRPr lang="en-US"/>
           </a:p>
@@ -1000,7 +1000,7 @@
           <a:p>
             <a:fld id="{78C97017-6FC3-485B-9764-EAC9E56C1D49}" type="datetimeFigureOut">
               <a:rPr lang="en-US" smtClean="0"/>
-              <a:t>10/16/2018</a:t>
+              <a:t>11/4/2018</a:t>
             </a:fld>
             <a:endParaRPr lang="en-US"/>
           </a:p>
@@ -1168,7 +1168,7 @@
           <a:p>
             <a:fld id="{78C97017-6FC3-485B-9764-EAC9E56C1D49}" type="datetimeFigureOut">
               <a:rPr lang="en-US" smtClean="0"/>
-              <a:t>10/16/2018</a:t>
+              <a:t>11/4/2018</a:t>
             </a:fld>
             <a:endParaRPr lang="en-US"/>
           </a:p>
@@ -1413,7 +1413,7 @@
           <a:p>
             <a:fld id="{78C97017-6FC3-485B-9764-EAC9E56C1D49}" type="datetimeFigureOut">
               <a:rPr lang="en-US" smtClean="0"/>
-              <a:t>10/16/2018</a:t>
+              <a:t>11/4/2018</a:t>
             </a:fld>
             <a:endParaRPr lang="en-US"/>
           </a:p>
@@ -1698,7 +1698,7 @@
           <a:p>
             <a:fld id="{78C97017-6FC3-485B-9764-EAC9E56C1D49}" type="datetimeFigureOut">
               <a:rPr lang="en-US" smtClean="0"/>
-              <a:t>10/16/2018</a:t>
+              <a:t>11/4/2018</a:t>
             </a:fld>
             <a:endParaRPr lang="en-US"/>
           </a:p>
@@ -2117,7 +2117,7 @@
           <a:p>
             <a:fld id="{78C97017-6FC3-485B-9764-EAC9E56C1D49}" type="datetimeFigureOut">
               <a:rPr lang="en-US" smtClean="0"/>
-              <a:t>10/16/2018</a:t>
+              <a:t>11/4/2018</a:t>
             </a:fld>
             <a:endParaRPr lang="en-US"/>
           </a:p>
@@ -2234,7 +2234,7 @@
           <a:p>
             <a:fld id="{78C97017-6FC3-485B-9764-EAC9E56C1D49}" type="datetimeFigureOut">
               <a:rPr lang="en-US" smtClean="0"/>
-              <a:t>10/16/2018</a:t>
+              <a:t>11/4/2018</a:t>
             </a:fld>
             <a:endParaRPr lang="en-US"/>
           </a:p>
@@ -2329,7 +2329,7 @@
           <a:p>
             <a:fld id="{78C97017-6FC3-485B-9764-EAC9E56C1D49}" type="datetimeFigureOut">
               <a:rPr lang="en-US" smtClean="0"/>
-              <a:t>10/16/2018</a:t>
+              <a:t>11/4/2018</a:t>
             </a:fld>
             <a:endParaRPr lang="en-US"/>
           </a:p>
@@ -2604,7 +2604,7 @@
           <a:p>
             <a:fld id="{78C97017-6FC3-485B-9764-EAC9E56C1D49}" type="datetimeFigureOut">
               <a:rPr lang="en-US" smtClean="0"/>
-              <a:t>10/16/2018</a:t>
+              <a:t>11/4/2018</a:t>
             </a:fld>
             <a:endParaRPr lang="en-US"/>
           </a:p>
@@ -2856,7 +2856,7 @@
           <a:p>
             <a:fld id="{78C97017-6FC3-485B-9764-EAC9E56C1D49}" type="datetimeFigureOut">
               <a:rPr lang="en-US" smtClean="0"/>
-              <a:t>10/16/2018</a:t>
+              <a:t>11/4/2018</a:t>
             </a:fld>
             <a:endParaRPr lang="en-US"/>
           </a:p>
@@ -3067,7 +3067,7 @@
           <a:p>
             <a:fld id="{78C97017-6FC3-485B-9764-EAC9E56C1D49}" type="datetimeFigureOut">
               <a:rPr lang="en-US" smtClean="0"/>
-              <a:t>10/16/2018</a:t>
+              <a:t>11/4/2018</a:t>
             </a:fld>
             <a:endParaRPr lang="en-US"/>
           </a:p>
@@ -5624,6 +5624,94 @@
                 </a:schemeClr>
               </a:solidFill>
             </a:endParaRPr>
+          </a:p>
+        </p:txBody>
+      </p:sp>
+      <p:sp>
+        <p:nvSpPr>
+          <p:cNvPr id="45" name="Freeform 115">
+            <a:extLst>
+              <a:ext uri="{FF2B5EF4-FFF2-40B4-BE49-F238E27FC236}">
+                <a16:creationId xmlns:a16="http://schemas.microsoft.com/office/drawing/2014/main" id="{5C35D14F-89D6-4FD3-8081-E0386D1DA101}"/>
+              </a:ext>
+            </a:extLst>
+          </p:cNvPr>
+          <p:cNvSpPr/>
+          <p:nvPr/>
+        </p:nvSpPr>
+        <p:spPr>
+          <a:xfrm>
+            <a:off x="3687515" y="2581634"/>
+            <a:ext cx="3048000" cy="203200"/>
+          </a:xfrm>
+          <a:custGeom>
+            <a:avLst/>
+            <a:gdLst>
+              <a:gd name="connsiteX0" fmla="*/ 0 w 3048000"/>
+              <a:gd name="connsiteY0" fmla="*/ 203200 h 203200"/>
+              <a:gd name="connsiteX1" fmla="*/ 221673 w 3048000"/>
+              <a:gd name="connsiteY1" fmla="*/ 0 h 203200"/>
+              <a:gd name="connsiteX2" fmla="*/ 3048000 w 3048000"/>
+              <a:gd name="connsiteY2" fmla="*/ 0 h 203200"/>
+            </a:gdLst>
+            <a:ahLst/>
+            <a:cxnLst>
+              <a:cxn ang="0">
+                <a:pos x="connsiteX0" y="connsiteY0"/>
+              </a:cxn>
+              <a:cxn ang="0">
+                <a:pos x="connsiteX1" y="connsiteY1"/>
+              </a:cxn>
+              <a:cxn ang="0">
+                <a:pos x="connsiteX2" y="connsiteY2"/>
+              </a:cxn>
+            </a:cxnLst>
+            <a:rect l="l" t="t" r="r" b="b"/>
+            <a:pathLst>
+              <a:path w="3048000" h="203200">
+                <a:moveTo>
+                  <a:pt x="0" y="203200"/>
+                </a:moveTo>
+                <a:lnTo>
+                  <a:pt x="221673" y="0"/>
+                </a:lnTo>
+                <a:lnTo>
+                  <a:pt x="3048000" y="0"/>
+                </a:lnTo>
+              </a:path>
+            </a:pathLst>
+          </a:custGeom>
+          <a:noFill/>
+          <a:ln w="19050">
+            <a:solidFill>
+              <a:schemeClr val="accent3"/>
+            </a:solidFill>
+            <a:prstDash val="solid"/>
+            <a:headEnd type="none" w="med" len="med"/>
+            <a:tailEnd type="arrow" w="med" len="med"/>
+          </a:ln>
+          <a:effectLst/>
+        </p:spPr>
+        <p:style>
+          <a:lnRef idx="1">
+            <a:schemeClr val="accent2"/>
+          </a:lnRef>
+          <a:fillRef idx="2">
+            <a:schemeClr val="accent2"/>
+          </a:fillRef>
+          <a:effectRef idx="1">
+            <a:schemeClr val="accent2"/>
+          </a:effectRef>
+          <a:fontRef idx="minor">
+            <a:schemeClr val="dk1"/>
+          </a:fontRef>
+        </p:style>
+        <p:txBody>
+          <a:bodyPr rtlCol="0" anchor="ctr"/>
+          <a:lstStyle/>
+          <a:p>
+            <a:pPr algn="ctr"/>
+            <a:endParaRPr lang="en-SG"/>
           </a:p>
         </p:txBody>
       </p:sp>

</xml_diff>

<commit_message>
updated UGDG & PPP, added diagrams. shortlist allows sort, find, filter. deleteShortlist allows sort, find, filter. both updates filtered lists to show all candidates, companies, job offers.
</commit_message>
<xml_diff>
--- a/docs/diagrams/UiComponentClassDiagram.pptx
+++ b/docs/diagrams/UiComponentClassDiagram.pptx
@@ -208,7 +208,7 @@
           <a:p>
             <a:fld id="{F5CC4B3F-88C1-4FFA-B1B6-F41C21DC6924}" type="datetimeFigureOut">
               <a:rPr lang="en-US" smtClean="0"/>
-              <a:t>10/26/2018</a:t>
+              <a:t>11/7/2018</a:t>
             </a:fld>
             <a:endParaRPr lang="en-US"/>
           </a:p>
@@ -738,7 +738,7 @@
           <a:p>
             <a:fld id="{78C97017-6FC3-485B-9764-EAC9E56C1D49}" type="datetimeFigureOut">
               <a:rPr lang="en-US" smtClean="0"/>
-              <a:t>10/26/2018</a:t>
+              <a:t>11/7/2018</a:t>
             </a:fld>
             <a:endParaRPr lang="en-US"/>
           </a:p>
@@ -906,7 +906,7 @@
           <a:p>
             <a:fld id="{78C97017-6FC3-485B-9764-EAC9E56C1D49}" type="datetimeFigureOut">
               <a:rPr lang="en-US" smtClean="0"/>
-              <a:t>10/26/2018</a:t>
+              <a:t>11/7/2018</a:t>
             </a:fld>
             <a:endParaRPr lang="en-US"/>
           </a:p>
@@ -1084,7 +1084,7 @@
           <a:p>
             <a:fld id="{78C97017-6FC3-485B-9764-EAC9E56C1D49}" type="datetimeFigureOut">
               <a:rPr lang="en-US" smtClean="0"/>
-              <a:t>10/26/2018</a:t>
+              <a:t>11/7/2018</a:t>
             </a:fld>
             <a:endParaRPr lang="en-US"/>
           </a:p>
@@ -1252,7 +1252,7 @@
           <a:p>
             <a:fld id="{78C97017-6FC3-485B-9764-EAC9E56C1D49}" type="datetimeFigureOut">
               <a:rPr lang="en-US" smtClean="0"/>
-              <a:t>10/26/2018</a:t>
+              <a:t>11/7/2018</a:t>
             </a:fld>
             <a:endParaRPr lang="en-US"/>
           </a:p>
@@ -1497,7 +1497,7 @@
           <a:p>
             <a:fld id="{78C97017-6FC3-485B-9764-EAC9E56C1D49}" type="datetimeFigureOut">
               <a:rPr lang="en-US" smtClean="0"/>
-              <a:t>10/26/2018</a:t>
+              <a:t>11/7/2018</a:t>
             </a:fld>
             <a:endParaRPr lang="en-US"/>
           </a:p>
@@ -1782,7 +1782,7 @@
           <a:p>
             <a:fld id="{78C97017-6FC3-485B-9764-EAC9E56C1D49}" type="datetimeFigureOut">
               <a:rPr lang="en-US" smtClean="0"/>
-              <a:t>10/26/2018</a:t>
+              <a:t>11/7/2018</a:t>
             </a:fld>
             <a:endParaRPr lang="en-US"/>
           </a:p>
@@ -2201,7 +2201,7 @@
           <a:p>
             <a:fld id="{78C97017-6FC3-485B-9764-EAC9E56C1D49}" type="datetimeFigureOut">
               <a:rPr lang="en-US" smtClean="0"/>
-              <a:t>10/26/2018</a:t>
+              <a:t>11/7/2018</a:t>
             </a:fld>
             <a:endParaRPr lang="en-US"/>
           </a:p>
@@ -2318,7 +2318,7 @@
           <a:p>
             <a:fld id="{78C97017-6FC3-485B-9764-EAC9E56C1D49}" type="datetimeFigureOut">
               <a:rPr lang="en-US" smtClean="0"/>
-              <a:t>10/26/2018</a:t>
+              <a:t>11/7/2018</a:t>
             </a:fld>
             <a:endParaRPr lang="en-US"/>
           </a:p>
@@ -2413,7 +2413,7 @@
           <a:p>
             <a:fld id="{78C97017-6FC3-485B-9764-EAC9E56C1D49}" type="datetimeFigureOut">
               <a:rPr lang="en-US" smtClean="0"/>
-              <a:t>10/26/2018</a:t>
+              <a:t>11/7/2018</a:t>
             </a:fld>
             <a:endParaRPr lang="en-US"/>
           </a:p>
@@ -2688,7 +2688,7 @@
           <a:p>
             <a:fld id="{78C97017-6FC3-485B-9764-EAC9E56C1D49}" type="datetimeFigureOut">
               <a:rPr lang="en-US" smtClean="0"/>
-              <a:t>10/26/2018</a:t>
+              <a:t>11/7/2018</a:t>
             </a:fld>
             <a:endParaRPr lang="en-US"/>
           </a:p>
@@ -2940,7 +2940,7 @@
           <a:p>
             <a:fld id="{78C97017-6FC3-485B-9764-EAC9E56C1D49}" type="datetimeFigureOut">
               <a:rPr lang="en-US" smtClean="0"/>
-              <a:t>10/26/2018</a:t>
+              <a:t>11/7/2018</a:t>
             </a:fld>
             <a:endParaRPr lang="en-US"/>
           </a:p>
@@ -3151,7 +3151,7 @@
           <a:p>
             <a:fld id="{78C97017-6FC3-485B-9764-EAC9E56C1D49}" type="datetimeFigureOut">
               <a:rPr lang="en-US" smtClean="0"/>
-              <a:t>10/26/2018</a:t>
+              <a:t>11/7/2018</a:t>
             </a:fld>
             <a:endParaRPr lang="en-US"/>
           </a:p>
@@ -3534,8 +3534,8 @@
         </p:nvSpPr>
         <p:spPr>
           <a:xfrm>
-            <a:off x="1217465" y="1447799"/>
-            <a:ext cx="4917083" cy="4724400"/>
+            <a:off x="1217465" y="1467676"/>
+            <a:ext cx="4917083" cy="5364483"/>
           </a:xfrm>
           <a:prstGeom prst="roundRect">
             <a:avLst>
@@ -3909,7 +3909,7 @@
         </p:nvSpPr>
         <p:spPr>
           <a:xfrm rot="16200000">
-            <a:off x="5703829" y="2464877"/>
+            <a:off x="5703829" y="2435060"/>
             <a:ext cx="2362201" cy="328045"/>
           </a:xfrm>
           <a:prstGeom prst="roundRect">
@@ -3969,8 +3969,8 @@
         </p:nvSpPr>
         <p:spPr>
           <a:xfrm>
-            <a:off x="2592527" y="5554359"/>
-            <a:ext cx="1093635" cy="236841"/>
+            <a:off x="2592527" y="5650706"/>
+            <a:ext cx="1369873" cy="216694"/>
           </a:xfrm>
           <a:prstGeom prst="rect">
             <a:avLst/>
@@ -4002,16 +4002,16 @@
           <a:p>
             <a:pPr algn="ctr"/>
             <a:r>
-              <a:rPr lang="en-US" sz="1050" b="1" dirty="0" err="1">
+              <a:rPr lang="en-US" sz="800" b="1" dirty="0" err="1">
                 <a:solidFill>
                   <a:schemeClr val="accent3">
                     <a:lumMod val="75000"/>
                   </a:schemeClr>
                 </a:solidFill>
               </a:rPr>
-              <a:t>StatusBarFooter</a:t>
-            </a:r>
-            <a:endParaRPr lang="en-SG" sz="1050" b="1" dirty="0">
+              <a:t>MasterCandidateListPanel</a:t>
+            </a:r>
+            <a:endParaRPr lang="en-SG" sz="800" b="1" dirty="0">
               <a:solidFill>
                 <a:schemeClr val="accent3">
                   <a:lumMod val="75000"/>
@@ -4029,7 +4029,7 @@
         </p:nvSpPr>
         <p:spPr>
           <a:xfrm>
-            <a:off x="2592528" y="5859159"/>
+            <a:off x="2592528" y="6544959"/>
             <a:ext cx="1093635" cy="236841"/>
           </a:xfrm>
           <a:prstGeom prst="rect">
@@ -4234,6 +4234,7 @@
         <p:nvCxnSpPr>
           <p:cNvPr id="50" name="Elbow Connector 63"/>
           <p:cNvCxnSpPr>
+            <a:cxnSpLocks/>
             <a:stCxn id="39" idx="2"/>
             <a:endCxn id="35" idx="1"/>
           </p:cNvCxnSpPr>
@@ -4241,8 +4242,8 @@
         </p:nvCxnSpPr>
         <p:spPr>
           <a:xfrm rot="16200000" flipH="1">
-            <a:off x="1101949" y="4182201"/>
-            <a:ext cx="2804755" cy="176401"/>
+            <a:off x="1058812" y="4225338"/>
+            <a:ext cx="2891028" cy="176401"/>
           </a:xfrm>
           <a:prstGeom prst="bentConnector2">
             <a:avLst/>
@@ -4282,8 +4283,8 @@
         </p:nvCxnSpPr>
         <p:spPr>
           <a:xfrm rot="16200000" flipH="1">
-            <a:off x="753196" y="4138248"/>
-            <a:ext cx="3295936" cy="382728"/>
+            <a:off x="425444" y="4496295"/>
+            <a:ext cx="3987407" cy="346761"/>
           </a:xfrm>
           <a:prstGeom prst="bentConnector2">
             <a:avLst/>
@@ -4569,8 +4570,8 @@
         </p:nvCxnSpPr>
         <p:spPr>
           <a:xfrm rot="5400000">
-            <a:off x="2914676" y="3057487"/>
-            <a:ext cx="3386780" cy="1843807"/>
+            <a:off x="3009659" y="3238742"/>
+            <a:ext cx="3473053" cy="1567569"/>
           </a:xfrm>
           <a:prstGeom prst="bentConnector2">
             <a:avLst/>
@@ -4610,8 +4611,8 @@
         </p:nvCxnSpPr>
         <p:spPr>
           <a:xfrm rot="5400000">
-            <a:off x="2762276" y="3209887"/>
-            <a:ext cx="3691580" cy="1843806"/>
+            <a:off x="2419376" y="3552787"/>
+            <a:ext cx="4377380" cy="1843806"/>
           </a:xfrm>
           <a:prstGeom prst="bentConnector2">
             <a:avLst/>
@@ -5776,16 +5777,21 @@
               </a:ext>
             </a:extLst>
           </p:cNvPr>
-          <p:cNvCxnSpPr/>
+          <p:cNvCxnSpPr>
+            <a:cxnSpLocks/>
+            <a:endCxn id="42" idx="1"/>
+          </p:cNvCxnSpPr>
           <p:nvPr/>
         </p:nvCxnSpPr>
         <p:spPr>
-          <a:xfrm rot="16200000" flipH="1">
-            <a:off x="3967015" y="3601830"/>
-            <a:ext cx="118421" cy="699979"/>
-          </a:xfrm>
-          <a:prstGeom prst="bentConnector2">
-            <a:avLst/>
+          <a:xfrm>
+            <a:off x="3676236" y="3892609"/>
+            <a:ext cx="684346" cy="45950"/>
+          </a:xfrm>
+          <a:prstGeom prst="bentConnector3">
+            <a:avLst>
+              <a:gd name="adj1" fmla="val 50000"/>
+            </a:avLst>
           </a:prstGeom>
           <a:ln w="19050">
             <a:solidFill>
@@ -6352,6 +6358,334 @@
             </a:solidFill>
             <a:headEnd type="none" w="med" len="med"/>
             <a:tailEnd type="none" w="med" len="med"/>
+          </a:ln>
+          <a:effectLst/>
+        </p:spPr>
+        <p:style>
+          <a:lnRef idx="1">
+            <a:schemeClr val="accent2"/>
+          </a:lnRef>
+          <a:fillRef idx="2">
+            <a:schemeClr val="accent2"/>
+          </a:fillRef>
+          <a:effectRef idx="1">
+            <a:schemeClr val="accent2"/>
+          </a:effectRef>
+          <a:fontRef idx="minor">
+            <a:schemeClr val="dk1"/>
+          </a:fontRef>
+        </p:style>
+      </p:cxnSp>
+      <p:sp>
+        <p:nvSpPr>
+          <p:cNvPr id="63" name="Rectangle 11">
+            <a:extLst>
+              <a:ext uri="{FF2B5EF4-FFF2-40B4-BE49-F238E27FC236}">
+                <a16:creationId xmlns:a16="http://schemas.microsoft.com/office/drawing/2014/main" id="{4D8820CF-CB00-4F35-AC47-FCE86559C2E5}"/>
+              </a:ext>
+            </a:extLst>
+          </p:cNvPr>
+          <p:cNvSpPr/>
+          <p:nvPr/>
+        </p:nvSpPr>
+        <p:spPr>
+          <a:xfrm>
+            <a:off x="2591661" y="6240159"/>
+            <a:ext cx="1093635" cy="236841"/>
+          </a:xfrm>
+          <a:prstGeom prst="rect">
+            <a:avLst/>
+          </a:prstGeom>
+          <a:ln w="19050">
+            <a:solidFill>
+              <a:schemeClr val="accent3"/>
+            </a:solidFill>
+          </a:ln>
+          <a:effectLst/>
+        </p:spPr>
+        <p:style>
+          <a:lnRef idx="1">
+            <a:schemeClr val="accent3"/>
+          </a:lnRef>
+          <a:fillRef idx="2">
+            <a:schemeClr val="accent3"/>
+          </a:fillRef>
+          <a:effectRef idx="1">
+            <a:schemeClr val="accent3"/>
+          </a:effectRef>
+          <a:fontRef idx="minor">
+            <a:schemeClr val="dk1"/>
+          </a:fontRef>
+        </p:style>
+        <p:txBody>
+          <a:bodyPr rtlCol="0" anchor="ctr"/>
+          <a:lstStyle/>
+          <a:p>
+            <a:pPr algn="ctr"/>
+            <a:r>
+              <a:rPr lang="en-US" sz="1050" b="1" dirty="0" err="1">
+                <a:solidFill>
+                  <a:schemeClr val="accent3">
+                    <a:lumMod val="75000"/>
+                  </a:schemeClr>
+                </a:solidFill>
+              </a:rPr>
+              <a:t>StatusBarFooter</a:t>
+            </a:r>
+            <a:endParaRPr lang="en-SG" sz="1050" b="1" dirty="0">
+              <a:solidFill>
+                <a:schemeClr val="accent3">
+                  <a:lumMod val="75000"/>
+                </a:schemeClr>
+              </a:solidFill>
+            </a:endParaRPr>
+          </a:p>
+        </p:txBody>
+      </p:sp>
+      <p:sp>
+        <p:nvSpPr>
+          <p:cNvPr id="68" name="Rectangle 11">
+            <a:extLst>
+              <a:ext uri="{FF2B5EF4-FFF2-40B4-BE49-F238E27FC236}">
+                <a16:creationId xmlns:a16="http://schemas.microsoft.com/office/drawing/2014/main" id="{64F1239F-575B-494D-8CBB-B83B17125A23}"/>
+              </a:ext>
+            </a:extLst>
+          </p:cNvPr>
+          <p:cNvSpPr/>
+          <p:nvPr/>
+        </p:nvSpPr>
+        <p:spPr>
+          <a:xfrm>
+            <a:off x="2589381" y="5943600"/>
+            <a:ext cx="1093635" cy="236841"/>
+          </a:xfrm>
+          <a:prstGeom prst="rect">
+            <a:avLst/>
+          </a:prstGeom>
+          <a:ln w="19050">
+            <a:solidFill>
+              <a:schemeClr val="accent3"/>
+            </a:solidFill>
+          </a:ln>
+          <a:effectLst/>
+        </p:spPr>
+        <p:style>
+          <a:lnRef idx="1">
+            <a:schemeClr val="accent3"/>
+          </a:lnRef>
+          <a:fillRef idx="2">
+            <a:schemeClr val="accent3"/>
+          </a:fillRef>
+          <a:effectRef idx="1">
+            <a:schemeClr val="accent3"/>
+          </a:effectRef>
+          <a:fontRef idx="minor">
+            <a:schemeClr val="dk1"/>
+          </a:fontRef>
+        </p:style>
+        <p:txBody>
+          <a:bodyPr rtlCol="0" anchor="ctr"/>
+          <a:lstStyle/>
+          <a:p>
+            <a:pPr algn="ctr"/>
+            <a:r>
+              <a:rPr lang="en-US" sz="800" b="1" dirty="0" err="1">
+                <a:solidFill>
+                  <a:schemeClr val="accent3">
+                    <a:lumMod val="75000"/>
+                  </a:schemeClr>
+                </a:solidFill>
+              </a:rPr>
+              <a:t>MasterJobListPanel</a:t>
+            </a:r>
+            <a:endParaRPr lang="en-SG" sz="800" b="1" dirty="0">
+              <a:solidFill>
+                <a:schemeClr val="accent3">
+                  <a:lumMod val="75000"/>
+                </a:schemeClr>
+              </a:solidFill>
+            </a:endParaRPr>
+          </a:p>
+        </p:txBody>
+      </p:sp>
+      <p:cxnSp>
+        <p:nvCxnSpPr>
+          <p:cNvPr id="71" name="Elbow Connector 63">
+            <a:extLst>
+              <a:ext uri="{FF2B5EF4-FFF2-40B4-BE49-F238E27FC236}">
+                <a16:creationId xmlns:a16="http://schemas.microsoft.com/office/drawing/2014/main" id="{3D46D389-F7B4-4CE8-8E1B-4D26551DE898}"/>
+              </a:ext>
+            </a:extLst>
+          </p:cNvPr>
+          <p:cNvCxnSpPr>
+            <a:cxnSpLocks/>
+            <a:stCxn id="39" idx="2"/>
+            <a:endCxn id="63" idx="1"/>
+          </p:cNvCxnSpPr>
+          <p:nvPr/>
+        </p:nvCxnSpPr>
+        <p:spPr>
+          <a:xfrm rot="16200000" flipH="1">
+            <a:off x="758616" y="4525534"/>
+            <a:ext cx="3490555" cy="175535"/>
+          </a:xfrm>
+          <a:prstGeom prst="bentConnector2">
+            <a:avLst/>
+          </a:prstGeom>
+          <a:ln w="19050">
+            <a:solidFill>
+              <a:schemeClr val="accent3"/>
+            </a:solidFill>
+            <a:headEnd type="none" w="med" len="med"/>
+            <a:tailEnd type="arrow" w="med" len="med"/>
+          </a:ln>
+          <a:effectLst/>
+        </p:spPr>
+        <p:style>
+          <a:lnRef idx="1">
+            <a:schemeClr val="accent2"/>
+          </a:lnRef>
+          <a:fillRef idx="2">
+            <a:schemeClr val="accent2"/>
+          </a:fillRef>
+          <a:effectRef idx="1">
+            <a:schemeClr val="accent2"/>
+          </a:effectRef>
+          <a:fontRef idx="minor">
+            <a:schemeClr val="dk1"/>
+          </a:fontRef>
+        </p:style>
+      </p:cxnSp>
+      <p:cxnSp>
+        <p:nvCxnSpPr>
+          <p:cNvPr id="75" name="Elbow Connector 63">
+            <a:extLst>
+              <a:ext uri="{FF2B5EF4-FFF2-40B4-BE49-F238E27FC236}">
+                <a16:creationId xmlns:a16="http://schemas.microsoft.com/office/drawing/2014/main" id="{F98A5578-91C3-4658-8769-B02CD4BEF018}"/>
+              </a:ext>
+            </a:extLst>
+          </p:cNvPr>
+          <p:cNvCxnSpPr>
+            <a:cxnSpLocks/>
+            <a:stCxn id="39" idx="2"/>
+            <a:endCxn id="68" idx="1"/>
+          </p:cNvCxnSpPr>
+          <p:nvPr/>
+        </p:nvCxnSpPr>
+        <p:spPr>
+          <a:xfrm rot="16200000" flipH="1">
+            <a:off x="905755" y="4378395"/>
+            <a:ext cx="3193996" cy="173255"/>
+          </a:xfrm>
+          <a:prstGeom prst="bentConnector2">
+            <a:avLst/>
+          </a:prstGeom>
+          <a:ln w="19050">
+            <a:solidFill>
+              <a:schemeClr val="accent3"/>
+            </a:solidFill>
+            <a:headEnd type="none" w="med" len="med"/>
+            <a:tailEnd type="arrow" w="med" len="med"/>
+          </a:ln>
+          <a:effectLst/>
+        </p:spPr>
+        <p:style>
+          <a:lnRef idx="1">
+            <a:schemeClr val="accent2"/>
+          </a:lnRef>
+          <a:fillRef idx="2">
+            <a:schemeClr val="accent2"/>
+          </a:fillRef>
+          <a:effectRef idx="1">
+            <a:schemeClr val="accent2"/>
+          </a:effectRef>
+          <a:fontRef idx="minor">
+            <a:schemeClr val="dk1"/>
+          </a:fontRef>
+        </p:style>
+      </p:cxnSp>
+      <p:cxnSp>
+        <p:nvCxnSpPr>
+          <p:cNvPr id="78" name="Elbow Connector 136">
+            <a:extLst>
+              <a:ext uri="{FF2B5EF4-FFF2-40B4-BE49-F238E27FC236}">
+                <a16:creationId xmlns:a16="http://schemas.microsoft.com/office/drawing/2014/main" id="{BE6BB732-CF4F-459C-89DD-1CFD5EC9E9C7}"/>
+              </a:ext>
+            </a:extLst>
+          </p:cNvPr>
+          <p:cNvCxnSpPr>
+            <a:cxnSpLocks/>
+            <a:stCxn id="35" idx="3"/>
+            <a:endCxn id="42" idx="3"/>
+          </p:cNvCxnSpPr>
+          <p:nvPr/>
+        </p:nvCxnSpPr>
+        <p:spPr>
+          <a:xfrm flipV="1">
+            <a:off x="3962400" y="3938559"/>
+            <a:ext cx="1439088" cy="1820494"/>
+          </a:xfrm>
+          <a:prstGeom prst="bentConnector3">
+            <a:avLst>
+              <a:gd name="adj1" fmla="val 115885"/>
+            </a:avLst>
+          </a:prstGeom>
+          <a:ln w="19050">
+            <a:solidFill>
+              <a:schemeClr val="accent3"/>
+            </a:solidFill>
+            <a:headEnd type="none" w="med" len="med"/>
+            <a:tailEnd type="arrow" w="med" len="med"/>
+          </a:ln>
+          <a:effectLst/>
+        </p:spPr>
+        <p:style>
+          <a:lnRef idx="1">
+            <a:schemeClr val="accent2"/>
+          </a:lnRef>
+          <a:fillRef idx="2">
+            <a:schemeClr val="accent2"/>
+          </a:fillRef>
+          <a:effectRef idx="1">
+            <a:schemeClr val="accent2"/>
+          </a:effectRef>
+          <a:fontRef idx="minor">
+            <a:schemeClr val="dk1"/>
+          </a:fontRef>
+        </p:style>
+      </p:cxnSp>
+      <p:cxnSp>
+        <p:nvCxnSpPr>
+          <p:cNvPr id="83" name="Elbow Connector 136">
+            <a:extLst>
+              <a:ext uri="{FF2B5EF4-FFF2-40B4-BE49-F238E27FC236}">
+                <a16:creationId xmlns:a16="http://schemas.microsoft.com/office/drawing/2014/main" id="{79CD085A-C363-48D4-A386-DEFFA6D76935}"/>
+              </a:ext>
+            </a:extLst>
+          </p:cNvPr>
+          <p:cNvCxnSpPr>
+            <a:cxnSpLocks/>
+            <a:stCxn id="68" idx="3"/>
+            <a:endCxn id="51" idx="1"/>
+          </p:cNvCxnSpPr>
+          <p:nvPr/>
+        </p:nvCxnSpPr>
+        <p:spPr>
+          <a:xfrm flipV="1">
+            <a:off x="3683016" y="4834580"/>
+            <a:ext cx="699175" cy="1227441"/>
+          </a:xfrm>
+          <a:prstGeom prst="bentConnector3">
+            <a:avLst>
+              <a:gd name="adj1" fmla="val 50000"/>
+            </a:avLst>
+          </a:prstGeom>
+          <a:ln w="19050">
+            <a:solidFill>
+              <a:schemeClr val="accent3"/>
+            </a:solidFill>
+            <a:headEnd type="none" w="med" len="med"/>
+            <a:tailEnd type="arrow" w="med" len="med"/>
           </a:ln>
           <a:effectLst/>
         </p:spPr>

</xml_diff>

<commit_message>
* Update the UI Component of developer guide
</commit_message>
<xml_diff>
--- a/docs/diagrams/UiComponentClassDiagram.pptx
+++ b/docs/diagrams/UiComponentClassDiagram.pptx
@@ -208,7 +208,7 @@
           <a:p>
             <a:fld id="{F5CC4B3F-88C1-4FFA-B1B6-F41C21DC6924}" type="datetimeFigureOut">
               <a:rPr lang="en-US" smtClean="0"/>
-              <a:t>1/7/2017</a:t>
+              <a:t>11/9/2018</a:t>
             </a:fld>
             <a:endParaRPr lang="en-US"/>
           </a:p>
@@ -654,7 +654,7 @@
           <a:p>
             <a:fld id="{78C97017-6FC3-485B-9764-EAC9E56C1D49}" type="datetimeFigureOut">
               <a:rPr lang="en-US" smtClean="0"/>
-              <a:t>1/7/2017</a:t>
+              <a:t>11/9/2018</a:t>
             </a:fld>
             <a:endParaRPr lang="en-US"/>
           </a:p>
@@ -822,7 +822,7 @@
           <a:p>
             <a:fld id="{78C97017-6FC3-485B-9764-EAC9E56C1D49}" type="datetimeFigureOut">
               <a:rPr lang="en-US" smtClean="0"/>
-              <a:t>1/7/2017</a:t>
+              <a:t>11/9/2018</a:t>
             </a:fld>
             <a:endParaRPr lang="en-US"/>
           </a:p>
@@ -1000,7 +1000,7 @@
           <a:p>
             <a:fld id="{78C97017-6FC3-485B-9764-EAC9E56C1D49}" type="datetimeFigureOut">
               <a:rPr lang="en-US" smtClean="0"/>
-              <a:t>1/7/2017</a:t>
+              <a:t>11/9/2018</a:t>
             </a:fld>
             <a:endParaRPr lang="en-US"/>
           </a:p>
@@ -1168,7 +1168,7 @@
           <a:p>
             <a:fld id="{78C97017-6FC3-485B-9764-EAC9E56C1D49}" type="datetimeFigureOut">
               <a:rPr lang="en-US" smtClean="0"/>
-              <a:t>1/7/2017</a:t>
+              <a:t>11/9/2018</a:t>
             </a:fld>
             <a:endParaRPr lang="en-US"/>
           </a:p>
@@ -1413,7 +1413,7 @@
           <a:p>
             <a:fld id="{78C97017-6FC3-485B-9764-EAC9E56C1D49}" type="datetimeFigureOut">
               <a:rPr lang="en-US" smtClean="0"/>
-              <a:t>1/7/2017</a:t>
+              <a:t>11/9/2018</a:t>
             </a:fld>
             <a:endParaRPr lang="en-US"/>
           </a:p>
@@ -1698,7 +1698,7 @@
           <a:p>
             <a:fld id="{78C97017-6FC3-485B-9764-EAC9E56C1D49}" type="datetimeFigureOut">
               <a:rPr lang="en-US" smtClean="0"/>
-              <a:t>1/7/2017</a:t>
+              <a:t>11/9/2018</a:t>
             </a:fld>
             <a:endParaRPr lang="en-US"/>
           </a:p>
@@ -2117,7 +2117,7 @@
           <a:p>
             <a:fld id="{78C97017-6FC3-485B-9764-EAC9E56C1D49}" type="datetimeFigureOut">
               <a:rPr lang="en-US" smtClean="0"/>
-              <a:t>1/7/2017</a:t>
+              <a:t>11/9/2018</a:t>
             </a:fld>
             <a:endParaRPr lang="en-US"/>
           </a:p>
@@ -2234,7 +2234,7 @@
           <a:p>
             <a:fld id="{78C97017-6FC3-485B-9764-EAC9E56C1D49}" type="datetimeFigureOut">
               <a:rPr lang="en-US" smtClean="0"/>
-              <a:t>1/7/2017</a:t>
+              <a:t>11/9/2018</a:t>
             </a:fld>
             <a:endParaRPr lang="en-US"/>
           </a:p>
@@ -2329,7 +2329,7 @@
           <a:p>
             <a:fld id="{78C97017-6FC3-485B-9764-EAC9E56C1D49}" type="datetimeFigureOut">
               <a:rPr lang="en-US" smtClean="0"/>
-              <a:t>1/7/2017</a:t>
+              <a:t>11/9/2018</a:t>
             </a:fld>
             <a:endParaRPr lang="en-US"/>
           </a:p>
@@ -2604,7 +2604,7 @@
           <a:p>
             <a:fld id="{78C97017-6FC3-485B-9764-EAC9E56C1D49}" type="datetimeFigureOut">
               <a:rPr lang="en-US" smtClean="0"/>
-              <a:t>1/7/2017</a:t>
+              <a:t>11/9/2018</a:t>
             </a:fld>
             <a:endParaRPr lang="en-US"/>
           </a:p>
@@ -2856,7 +2856,7 @@
           <a:p>
             <a:fld id="{78C97017-6FC3-485B-9764-EAC9E56C1D49}" type="datetimeFigureOut">
               <a:rPr lang="en-US" smtClean="0"/>
-              <a:t>1/7/2017</a:t>
+              <a:t>11/9/2018</a:t>
             </a:fld>
             <a:endParaRPr lang="en-US"/>
           </a:p>
@@ -3067,7 +3067,7 @@
           <a:p>
             <a:fld id="{78C97017-6FC3-485B-9764-EAC9E56C1D49}" type="datetimeFigureOut">
               <a:rPr lang="en-US" smtClean="0"/>
-              <a:t>1/7/2017</a:t>
+              <a:t>11/9/2018</a:t>
             </a:fld>
             <a:endParaRPr lang="en-US"/>
           </a:p>
@@ -3825,8 +3825,8 @@
         </p:nvSpPr>
         <p:spPr>
           <a:xfrm rot="16200000">
-            <a:off x="5703829" y="2464877"/>
-            <a:ext cx="2362201" cy="328045"/>
+            <a:off x="5007409" y="3161296"/>
+            <a:ext cx="3755042" cy="328045"/>
           </a:xfrm>
           <a:prstGeom prst="roundRect">
             <a:avLst/>
@@ -3999,14 +3999,14 @@
       </p:sp>
       <p:sp>
         <p:nvSpPr>
-          <p:cNvPr id="36" name="Rectangle 11"/>
+          <p:cNvPr id="37" name="Rectangle 11"/>
           <p:cNvSpPr/>
           <p:nvPr/>
         </p:nvSpPr>
         <p:spPr>
           <a:xfrm>
-            <a:off x="2592526" y="3991960"/>
-            <a:ext cx="1093635" cy="236841"/>
+            <a:off x="3675512" y="3947563"/>
+            <a:ext cx="1304625" cy="182786"/>
           </a:xfrm>
           <a:prstGeom prst="rect">
             <a:avLst/>
@@ -4038,74 +4038,14 @@
           <a:p>
             <a:pPr algn="ctr"/>
             <a:r>
-              <a:rPr lang="en-US" sz="1050" b="1" dirty="0" err="1">
+              <a:rPr lang="en-SG" sz="1050" b="1" dirty="0" err="1">
                 <a:solidFill>
                   <a:schemeClr val="accent3">
                     <a:lumMod val="75000"/>
                   </a:schemeClr>
                 </a:solidFill>
               </a:rPr>
-              <a:t>PersonListPanel</a:t>
-            </a:r>
-            <a:endParaRPr lang="en-SG" sz="1050" b="1" dirty="0">
-              <a:solidFill>
-                <a:schemeClr val="accent3">
-                  <a:lumMod val="75000"/>
-                </a:schemeClr>
-              </a:solidFill>
-            </a:endParaRPr>
-          </a:p>
-        </p:txBody>
-      </p:sp>
-      <p:sp>
-        <p:nvSpPr>
-          <p:cNvPr id="37" name="Rectangle 11"/>
-          <p:cNvSpPr/>
-          <p:nvPr/>
-        </p:nvSpPr>
-        <p:spPr>
-          <a:xfrm>
-            <a:off x="3839323" y="4228801"/>
-            <a:ext cx="1040906" cy="236841"/>
-          </a:xfrm>
-          <a:prstGeom prst="rect">
-            <a:avLst/>
-          </a:prstGeom>
-          <a:ln w="19050">
-            <a:solidFill>
-              <a:schemeClr val="accent3"/>
-            </a:solidFill>
-          </a:ln>
-          <a:effectLst/>
-        </p:spPr>
-        <p:style>
-          <a:lnRef idx="1">
-            <a:schemeClr val="accent3"/>
-          </a:lnRef>
-          <a:fillRef idx="2">
-            <a:schemeClr val="accent3"/>
-          </a:fillRef>
-          <a:effectRef idx="1">
-            <a:schemeClr val="accent3"/>
-          </a:effectRef>
-          <a:fontRef idx="minor">
-            <a:schemeClr val="dk1"/>
-          </a:fontRef>
-        </p:style>
-        <p:txBody>
-          <a:bodyPr rtlCol="0" anchor="ctr"/>
-          <a:lstStyle/>
-          <a:p>
-            <a:pPr algn="ctr"/>
-            <a:r>
-              <a:rPr lang="en-US" sz="1050" b="1" dirty="0" err="1">
-                <a:solidFill>
-                  <a:schemeClr val="accent3">
-                    <a:lumMod val="75000"/>
-                  </a:schemeClr>
-                </a:solidFill>
-              </a:rPr>
-              <a:t>PersonCard</a:t>
+              <a:t>HtmlTableProcessor</a:t>
             </a:r>
             <a:endParaRPr lang="en-SG" sz="1050" b="1" dirty="0">
               <a:solidFill>
@@ -4369,47 +4309,6 @@
       </p:cxnSp>
       <p:cxnSp>
         <p:nvCxnSpPr>
-          <p:cNvPr id="47" name="Elbow Connector 63"/>
-          <p:cNvCxnSpPr>
-            <a:stCxn id="39" idx="2"/>
-            <a:endCxn id="36" idx="1"/>
-          </p:cNvCxnSpPr>
-          <p:nvPr/>
-        </p:nvCxnSpPr>
-        <p:spPr>
-          <a:xfrm rot="16200000" flipH="1">
-            <a:off x="1883148" y="3401003"/>
-            <a:ext cx="1242356" cy="176400"/>
-          </a:xfrm>
-          <a:prstGeom prst="bentConnector2">
-            <a:avLst/>
-          </a:prstGeom>
-          <a:ln w="19050">
-            <a:solidFill>
-              <a:schemeClr val="accent3"/>
-            </a:solidFill>
-            <a:headEnd type="none" w="med" len="med"/>
-            <a:tailEnd type="arrow" w="med" len="med"/>
-          </a:ln>
-          <a:effectLst/>
-        </p:spPr>
-        <p:style>
-          <a:lnRef idx="1">
-            <a:schemeClr val="accent2"/>
-          </a:lnRef>
-          <a:fillRef idx="2">
-            <a:schemeClr val="accent2"/>
-          </a:fillRef>
-          <a:effectRef idx="1">
-            <a:schemeClr val="accent2"/>
-          </a:effectRef>
-          <a:fontRef idx="minor">
-            <a:schemeClr val="dk1"/>
-          </a:fontRef>
-        </p:style>
-      </p:cxnSp>
-      <p:cxnSp>
-        <p:nvCxnSpPr>
           <p:cNvPr id="50" name="Elbow Connector 63"/>
           <p:cNvCxnSpPr>
             <a:stCxn id="39" idx="2"/>
@@ -4581,47 +4480,6 @@
           <a:xfrm flipV="1">
             <a:off x="3686160" y="2286000"/>
             <a:ext cx="1843809" cy="1136729"/>
-          </a:xfrm>
-          <a:prstGeom prst="bentConnector2">
-            <a:avLst/>
-          </a:prstGeom>
-          <a:ln w="6350">
-            <a:solidFill>
-              <a:schemeClr val="accent3"/>
-            </a:solidFill>
-            <a:headEnd type="none" w="med" len="med"/>
-            <a:tailEnd type="none" w="med" len="med"/>
-          </a:ln>
-          <a:effectLst/>
-        </p:spPr>
-        <p:style>
-          <a:lnRef idx="1">
-            <a:schemeClr val="accent2"/>
-          </a:lnRef>
-          <a:fillRef idx="2">
-            <a:schemeClr val="accent2"/>
-          </a:fillRef>
-          <a:effectRef idx="1">
-            <a:schemeClr val="accent2"/>
-          </a:effectRef>
-          <a:fontRef idx="minor">
-            <a:schemeClr val="dk1"/>
-          </a:fontRef>
-        </p:style>
-      </p:cxnSp>
-      <p:cxnSp>
-        <p:nvCxnSpPr>
-          <p:cNvPr id="77" name="Elbow Connector 63"/>
-          <p:cNvCxnSpPr>
-            <a:stCxn id="16" idx="3"/>
-            <a:endCxn id="37" idx="3"/>
-          </p:cNvCxnSpPr>
-          <p:nvPr/>
-        </p:nvCxnSpPr>
-        <p:spPr>
-          <a:xfrm rot="5400000">
-            <a:off x="4174488" y="2991741"/>
-            <a:ext cx="2061222" cy="649740"/>
           </a:xfrm>
           <a:prstGeom prst="bentConnector2">
             <a:avLst/>
@@ -4736,14 +4594,13 @@
         <p:nvCxnSpPr>
           <p:cNvPr id="91" name="Elbow Connector 63"/>
           <p:cNvCxnSpPr>
-            <a:stCxn id="16" idx="3"/>
-            <a:endCxn id="35" idx="3"/>
+            <a:cxnSpLocks/>
           </p:cNvCxnSpPr>
           <p:nvPr/>
         </p:nvCxnSpPr>
         <p:spPr>
           <a:xfrm rot="5400000">
-            <a:off x="3409976" y="2562187"/>
+            <a:off x="3409976" y="2562189"/>
             <a:ext cx="2396180" cy="1843807"/>
           </a:xfrm>
           <a:prstGeom prst="bentConnector2">
@@ -4857,66 +4714,6 @@
       </p:cxnSp>
       <p:sp>
         <p:nvSpPr>
-          <p:cNvPr id="117" name="Rectangle 65"/>
-          <p:cNvSpPr/>
-          <p:nvPr/>
-        </p:nvSpPr>
-        <p:spPr>
-          <a:xfrm rot="16200000">
-            <a:off x="6213739" y="4560376"/>
-            <a:ext cx="1371599" cy="328045"/>
-          </a:xfrm>
-          <a:prstGeom prst="roundRect">
-            <a:avLst/>
-          </a:prstGeom>
-          <a:solidFill>
-            <a:schemeClr val="accent4">
-              <a:lumMod val="20000"/>
-              <a:lumOff val="80000"/>
-            </a:schemeClr>
-          </a:solidFill>
-          <a:ln w="19050">
-            <a:noFill/>
-          </a:ln>
-          <a:effectLst/>
-        </p:spPr>
-        <p:style>
-          <a:lnRef idx="1">
-            <a:schemeClr val="accent2"/>
-          </a:lnRef>
-          <a:fillRef idx="2">
-            <a:schemeClr val="accent2"/>
-          </a:fillRef>
-          <a:effectRef idx="1">
-            <a:schemeClr val="accent2"/>
-          </a:effectRef>
-          <a:fontRef idx="minor">
-            <a:schemeClr val="dk1"/>
-          </a:fontRef>
-        </p:style>
-        <p:txBody>
-          <a:bodyPr rtlCol="0" anchor="ctr"/>
-          <a:lstStyle/>
-          <a:p>
-            <a:pPr algn="ctr"/>
-            <a:r>
-              <a:rPr lang="en-US" sz="1100" b="1" dirty="0">
-                <a:solidFill>
-                  <a:schemeClr val="bg1"/>
-                </a:solidFill>
-              </a:rPr>
-              <a:t>Model</a:t>
-            </a:r>
-            <a:endParaRPr lang="en-SG" sz="1100" b="1" dirty="0">
-              <a:solidFill>
-                <a:schemeClr val="bg1"/>
-              </a:solidFill>
-            </a:endParaRPr>
-          </a:p>
-        </p:txBody>
-      </p:sp>
-      <p:sp>
-        <p:nvSpPr>
           <p:cNvPr id="119" name="Rectangle 62"/>
           <p:cNvSpPr/>
           <p:nvPr/>
@@ -5120,97 +4917,14 @@
         <p:nvCxnSpPr>
           <p:cNvPr id="132" name="Elbow Connector 63"/>
           <p:cNvCxnSpPr>
-            <a:stCxn id="16" idx="3"/>
-            <a:endCxn id="3" idx="3"/>
+            <a:cxnSpLocks/>
           </p:cNvCxnSpPr>
           <p:nvPr/>
         </p:nvCxnSpPr>
         <p:spPr>
           <a:xfrm rot="5400000">
-            <a:off x="4205956" y="1766207"/>
+            <a:off x="4205956" y="1766208"/>
             <a:ext cx="804221" cy="1843806"/>
-          </a:xfrm>
-          <a:prstGeom prst="bentConnector2">
-            <a:avLst/>
-          </a:prstGeom>
-          <a:ln w="6350">
-            <a:solidFill>
-              <a:schemeClr val="accent3"/>
-            </a:solidFill>
-            <a:headEnd type="none" w="med" len="med"/>
-            <a:tailEnd type="none" w="med" len="med"/>
-          </a:ln>
-          <a:effectLst/>
-        </p:spPr>
-        <p:style>
-          <a:lnRef idx="1">
-            <a:schemeClr val="accent2"/>
-          </a:lnRef>
-          <a:fillRef idx="2">
-            <a:schemeClr val="accent2"/>
-          </a:fillRef>
-          <a:effectRef idx="1">
-            <a:schemeClr val="accent2"/>
-          </a:effectRef>
-          <a:fontRef idx="minor">
-            <a:schemeClr val="dk1"/>
-          </a:fontRef>
-        </p:style>
-      </p:cxnSp>
-      <p:cxnSp>
-        <p:nvCxnSpPr>
-          <p:cNvPr id="137" name="Elbow Connector 136"/>
-          <p:cNvCxnSpPr>
-            <a:stCxn id="36" idx="2"/>
-            <a:endCxn id="37" idx="1"/>
-          </p:cNvCxnSpPr>
-          <p:nvPr/>
-        </p:nvCxnSpPr>
-        <p:spPr>
-          <a:xfrm rot="16200000" flipH="1">
-            <a:off x="3430123" y="3938021"/>
-            <a:ext cx="118421" cy="699979"/>
-          </a:xfrm>
-          <a:prstGeom prst="bentConnector2">
-            <a:avLst/>
-          </a:prstGeom>
-          <a:ln w="19050">
-            <a:solidFill>
-              <a:schemeClr val="accent3"/>
-            </a:solidFill>
-            <a:headEnd type="none" w="med" len="med"/>
-            <a:tailEnd type="arrow" w="med" len="med"/>
-          </a:ln>
-          <a:effectLst/>
-        </p:spPr>
-        <p:style>
-          <a:lnRef idx="1">
-            <a:schemeClr val="accent2"/>
-          </a:lnRef>
-          <a:fillRef idx="2">
-            <a:schemeClr val="accent2"/>
-          </a:fillRef>
-          <a:effectRef idx="1">
-            <a:schemeClr val="accent2"/>
-          </a:effectRef>
-          <a:fontRef idx="minor">
-            <a:schemeClr val="dk1"/>
-          </a:fontRef>
-        </p:style>
-      </p:cxnSp>
-      <p:cxnSp>
-        <p:nvCxnSpPr>
-          <p:cNvPr id="140" name="Elbow Connector 63"/>
-          <p:cNvCxnSpPr>
-            <a:stCxn id="16" idx="3"/>
-            <a:endCxn id="36" idx="3"/>
-          </p:cNvCxnSpPr>
-          <p:nvPr/>
-        </p:nvCxnSpPr>
-        <p:spPr>
-          <a:xfrm rot="5400000">
-            <a:off x="3695875" y="2276286"/>
-            <a:ext cx="1824381" cy="1843808"/>
           </a:xfrm>
           <a:prstGeom prst="bentConnector2">
             <a:avLst/>
@@ -5374,113 +5088,35 @@
           </a:p>
         </p:txBody>
       </p:sp>
-      <p:sp>
-        <p:nvSpPr>
-          <p:cNvPr id="144" name="Rectangle 143"/>
-          <p:cNvSpPr/>
+      <p:cxnSp>
+        <p:nvCxnSpPr>
+          <p:cNvPr id="51" name="Elbow Connector 136">
+            <a:extLst>
+              <a:ext uri="{FF2B5EF4-FFF2-40B4-BE49-F238E27FC236}">
+                <a16:creationId xmlns:a16="http://schemas.microsoft.com/office/drawing/2014/main" id="{ACF87068-A983-418E-89F4-E4F675A3AE19}"/>
+              </a:ext>
+            </a:extLst>
+          </p:cNvPr>
+          <p:cNvCxnSpPr>
+            <a:cxnSpLocks/>
+            <a:endCxn id="37" idx="1"/>
+          </p:cNvCxnSpPr>
           <p:nvPr/>
-        </p:nvSpPr>
+        </p:nvCxnSpPr>
         <p:spPr>
           <a:xfrm>
-            <a:off x="5431573" y="4488138"/>
-            <a:ext cx="229325" cy="160062"/>
-          </a:xfrm>
-          <a:prstGeom prst="rect">
-            <a:avLst/>
+            <a:off x="3065763" y="3899691"/>
+            <a:ext cx="609749" cy="139265"/>
+          </a:xfrm>
+          <a:prstGeom prst="bentConnector3">
+            <a:avLst>
+              <a:gd name="adj1" fmla="val 670"/>
+            </a:avLst>
           </a:prstGeom>
-          <a:solidFill>
-            <a:schemeClr val="accent3">
-              <a:lumMod val="20000"/>
-              <a:lumOff val="80000"/>
-              <a:alpha val="80000"/>
-            </a:schemeClr>
-          </a:solidFill>
-          <a:ln>
-            <a:noFill/>
-          </a:ln>
-          <a:effectLst>
-            <a:softEdge rad="31750"/>
-          </a:effectLst>
-        </p:spPr>
-        <p:style>
-          <a:lnRef idx="2">
-            <a:schemeClr val="accent1">
-              <a:shade val="50000"/>
-            </a:schemeClr>
-          </a:lnRef>
-          <a:fillRef idx="1">
-            <a:schemeClr val="accent1"/>
-          </a:fillRef>
-          <a:effectRef idx="0">
-            <a:schemeClr val="accent1"/>
-          </a:effectRef>
-          <a:fontRef idx="minor">
-            <a:schemeClr val="lt1"/>
-          </a:fontRef>
-        </p:style>
-        <p:txBody>
-          <a:bodyPr rtlCol="0" anchor="ctr"/>
-          <a:lstStyle/>
-          <a:p>
-            <a:pPr algn="ctr"/>
-            <a:endParaRPr lang="en-SG"/>
-          </a:p>
-        </p:txBody>
-      </p:sp>
-      <p:sp>
-        <p:nvSpPr>
-          <p:cNvPr id="118" name="Freeform 117"/>
-          <p:cNvSpPr/>
-          <p:nvPr/>
-        </p:nvSpPr>
-        <p:spPr>
-          <a:xfrm flipV="1">
-            <a:off x="4114799" y="4472708"/>
-            <a:ext cx="2642195" cy="101600"/>
-          </a:xfrm>
-          <a:custGeom>
-            <a:avLst/>
-            <a:gdLst>
-              <a:gd name="connsiteX0" fmla="*/ 0 w 3048000"/>
-              <a:gd name="connsiteY0" fmla="*/ 203200 h 203200"/>
-              <a:gd name="connsiteX1" fmla="*/ 221673 w 3048000"/>
-              <a:gd name="connsiteY1" fmla="*/ 0 h 203200"/>
-              <a:gd name="connsiteX2" fmla="*/ 3048000 w 3048000"/>
-              <a:gd name="connsiteY2" fmla="*/ 0 h 203200"/>
-            </a:gdLst>
-            <a:ahLst/>
-            <a:cxnLst>
-              <a:cxn ang="0">
-                <a:pos x="connsiteX0" y="connsiteY0"/>
-              </a:cxn>
-              <a:cxn ang="0">
-                <a:pos x="connsiteX1" y="connsiteY1"/>
-              </a:cxn>
-              <a:cxn ang="0">
-                <a:pos x="connsiteX2" y="connsiteY2"/>
-              </a:cxn>
-            </a:cxnLst>
-            <a:rect l="l" t="t" r="r" b="b"/>
-            <a:pathLst>
-              <a:path w="3048000" h="203200">
-                <a:moveTo>
-                  <a:pt x="0" y="203200"/>
-                </a:moveTo>
-                <a:lnTo>
-                  <a:pt x="221673" y="0"/>
-                </a:lnTo>
-                <a:lnTo>
-                  <a:pt x="3048000" y="0"/>
-                </a:lnTo>
-              </a:path>
-            </a:pathLst>
-          </a:custGeom>
-          <a:noFill/>
           <a:ln w="19050">
             <a:solidFill>
               <a:schemeClr val="accent3"/>
             </a:solidFill>
-            <a:prstDash val="sysDot"/>
             <a:headEnd type="none" w="med" len="med"/>
             <a:tailEnd type="arrow" w="med" len="med"/>
           </a:ln>
@@ -5500,15 +5136,218 @@
             <a:schemeClr val="dk1"/>
           </a:fontRef>
         </p:style>
+      </p:cxnSp>
+      <p:sp>
+        <p:nvSpPr>
+          <p:cNvPr id="59" name="Rectangle 11">
+            <a:extLst>
+              <a:ext uri="{FF2B5EF4-FFF2-40B4-BE49-F238E27FC236}">
+                <a16:creationId xmlns:a16="http://schemas.microsoft.com/office/drawing/2014/main" id="{A4F65A7E-1154-4AA4-84F0-62F0BC8C928A}"/>
+              </a:ext>
+            </a:extLst>
+          </p:cNvPr>
+          <p:cNvSpPr/>
+          <p:nvPr/>
+        </p:nvSpPr>
+        <p:spPr>
+          <a:xfrm>
+            <a:off x="3673192" y="4183451"/>
+            <a:ext cx="1304625" cy="182786"/>
+          </a:xfrm>
+          <a:prstGeom prst="rect">
+            <a:avLst/>
+          </a:prstGeom>
+          <a:ln w="19050">
+            <a:solidFill>
+              <a:schemeClr val="accent3"/>
+            </a:solidFill>
+          </a:ln>
+          <a:effectLst/>
+        </p:spPr>
+        <p:style>
+          <a:lnRef idx="1">
+            <a:schemeClr val="accent3"/>
+          </a:lnRef>
+          <a:fillRef idx="2">
+            <a:schemeClr val="accent3"/>
+          </a:fillRef>
+          <a:effectRef idx="1">
+            <a:schemeClr val="accent3"/>
+          </a:effectRef>
+          <a:fontRef idx="minor">
+            <a:schemeClr val="dk1"/>
+          </a:fontRef>
+        </p:style>
         <p:txBody>
           <a:bodyPr rtlCol="0" anchor="ctr"/>
           <a:lstStyle/>
           <a:p>
             <a:pPr algn="ctr"/>
-            <a:endParaRPr lang="en-SG"/>
-          </a:p>
-        </p:txBody>
-      </p:sp>
+            <a:r>
+              <a:rPr lang="en-SG" sz="1050" b="1" dirty="0" err="1">
+                <a:solidFill>
+                  <a:schemeClr val="accent3">
+                    <a:lumMod val="75000"/>
+                  </a:schemeClr>
+                </a:solidFill>
+              </a:rPr>
+              <a:t>HtmlCardProcessor</a:t>
+            </a:r>
+            <a:endParaRPr lang="en-SG" sz="1050" b="1" dirty="0">
+              <a:solidFill>
+                <a:schemeClr val="accent3">
+                  <a:lumMod val="75000"/>
+                </a:schemeClr>
+              </a:solidFill>
+            </a:endParaRPr>
+          </a:p>
+        </p:txBody>
+      </p:sp>
+      <p:cxnSp>
+        <p:nvCxnSpPr>
+          <p:cNvPr id="60" name="Elbow Connector 136">
+            <a:extLst>
+              <a:ext uri="{FF2B5EF4-FFF2-40B4-BE49-F238E27FC236}">
+                <a16:creationId xmlns:a16="http://schemas.microsoft.com/office/drawing/2014/main" id="{89D789E0-20B5-4F09-A289-6E517019204D}"/>
+              </a:ext>
+            </a:extLst>
+          </p:cNvPr>
+          <p:cNvCxnSpPr>
+            <a:cxnSpLocks/>
+            <a:endCxn id="59" idx="1"/>
+          </p:cNvCxnSpPr>
+          <p:nvPr/>
+        </p:nvCxnSpPr>
+        <p:spPr>
+          <a:xfrm>
+            <a:off x="2823535" y="3899630"/>
+            <a:ext cx="849657" cy="375214"/>
+          </a:xfrm>
+          <a:prstGeom prst="bentConnector3">
+            <a:avLst>
+              <a:gd name="adj1" fmla="val -978"/>
+            </a:avLst>
+          </a:prstGeom>
+          <a:ln w="19050">
+            <a:solidFill>
+              <a:schemeClr val="accent3"/>
+            </a:solidFill>
+            <a:headEnd type="none" w="med" len="med"/>
+            <a:tailEnd type="arrow" w="med" len="med"/>
+          </a:ln>
+          <a:effectLst/>
+        </p:spPr>
+        <p:style>
+          <a:lnRef idx="1">
+            <a:schemeClr val="accent2"/>
+          </a:lnRef>
+          <a:fillRef idx="2">
+            <a:schemeClr val="accent2"/>
+          </a:fillRef>
+          <a:effectRef idx="1">
+            <a:schemeClr val="accent2"/>
+          </a:effectRef>
+          <a:fontRef idx="minor">
+            <a:schemeClr val="dk1"/>
+          </a:fontRef>
+        </p:style>
+      </p:cxnSp>
+      <p:cxnSp>
+        <p:nvCxnSpPr>
+          <p:cNvPr id="87" name="Elbow Connector 63">
+            <a:extLst>
+              <a:ext uri="{FF2B5EF4-FFF2-40B4-BE49-F238E27FC236}">
+                <a16:creationId xmlns:a16="http://schemas.microsoft.com/office/drawing/2014/main" id="{AF100D8F-6704-45F7-952D-18C5C8B19D98}"/>
+              </a:ext>
+            </a:extLst>
+          </p:cNvPr>
+          <p:cNvCxnSpPr>
+            <a:cxnSpLocks/>
+          </p:cNvCxnSpPr>
+          <p:nvPr/>
+        </p:nvCxnSpPr>
+        <p:spPr>
+          <a:xfrm flipV="1">
+            <a:off x="4977817" y="4270020"/>
+            <a:ext cx="552152" cy="4825"/>
+          </a:xfrm>
+          <a:prstGeom prst="bentConnector3">
+            <a:avLst>
+              <a:gd name="adj1" fmla="val 50000"/>
+            </a:avLst>
+          </a:prstGeom>
+          <a:ln w="6350">
+            <a:solidFill>
+              <a:schemeClr val="accent3"/>
+            </a:solidFill>
+            <a:headEnd type="none" w="med" len="med"/>
+            <a:tailEnd type="none" w="med" len="med"/>
+          </a:ln>
+          <a:effectLst/>
+        </p:spPr>
+        <p:style>
+          <a:lnRef idx="1">
+            <a:schemeClr val="accent2"/>
+          </a:lnRef>
+          <a:fillRef idx="2">
+            <a:schemeClr val="accent2"/>
+          </a:fillRef>
+          <a:effectRef idx="1">
+            <a:schemeClr val="accent2"/>
+          </a:effectRef>
+          <a:fontRef idx="minor">
+            <a:schemeClr val="dk1"/>
+          </a:fontRef>
+        </p:style>
+      </p:cxnSp>
+      <p:cxnSp>
+        <p:nvCxnSpPr>
+          <p:cNvPr id="95" name="Elbow Connector 63">
+            <a:extLst>
+              <a:ext uri="{FF2B5EF4-FFF2-40B4-BE49-F238E27FC236}">
+                <a16:creationId xmlns:a16="http://schemas.microsoft.com/office/drawing/2014/main" id="{9D90D5E3-870A-4685-82DD-B17DBB7B5873}"/>
+              </a:ext>
+            </a:extLst>
+          </p:cNvPr>
+          <p:cNvCxnSpPr>
+            <a:cxnSpLocks/>
+          </p:cNvCxnSpPr>
+          <p:nvPr/>
+        </p:nvCxnSpPr>
+        <p:spPr>
+          <a:xfrm flipV="1">
+            <a:off x="4973910" y="4010215"/>
+            <a:ext cx="552152" cy="4825"/>
+          </a:xfrm>
+          <a:prstGeom prst="bentConnector3">
+            <a:avLst>
+              <a:gd name="adj1" fmla="val 50000"/>
+            </a:avLst>
+          </a:prstGeom>
+          <a:ln w="6350">
+            <a:solidFill>
+              <a:schemeClr val="accent3"/>
+            </a:solidFill>
+            <a:headEnd type="none" w="med" len="med"/>
+            <a:tailEnd type="none" w="med" len="med"/>
+          </a:ln>
+          <a:effectLst/>
+        </p:spPr>
+        <p:style>
+          <a:lnRef idx="1">
+            <a:schemeClr val="accent2"/>
+          </a:lnRef>
+          <a:fillRef idx="2">
+            <a:schemeClr val="accent2"/>
+          </a:fillRef>
+          <a:effectRef idx="1">
+            <a:schemeClr val="accent2"/>
+          </a:effectRef>
+          <a:fontRef idx="minor">
+            <a:schemeClr val="dk1"/>
+          </a:fontRef>
+        </p:style>
+      </p:cxnSp>
     </p:spTree>
     <p:extLst>
       <p:ext uri="{BB962C8B-B14F-4D97-AF65-F5344CB8AC3E}">

</xml_diff>

<commit_message>
UI class diagram in dev guide edited
</commit_message>
<xml_diff>
--- a/docs/diagrams/UiComponentClassDiagram.pptx
+++ b/docs/diagrams/UiComponentClassDiagram.pptx
@@ -208,7 +208,7 @@
           <a:p>
             <a:fld id="{F5CC4B3F-88C1-4FFA-B1B6-F41C21DC6924}" type="datetimeFigureOut">
               <a:rPr lang="en-US" smtClean="0"/>
-              <a:t>1/7/2017</a:t>
+              <a:t>11/11/18</a:t>
             </a:fld>
             <a:endParaRPr lang="en-US"/>
           </a:p>
@@ -654,7 +654,7 @@
           <a:p>
             <a:fld id="{78C97017-6FC3-485B-9764-EAC9E56C1D49}" type="datetimeFigureOut">
               <a:rPr lang="en-US" smtClean="0"/>
-              <a:t>1/7/2017</a:t>
+              <a:t>11/11/18</a:t>
             </a:fld>
             <a:endParaRPr lang="en-US"/>
           </a:p>
@@ -822,7 +822,7 @@
           <a:p>
             <a:fld id="{78C97017-6FC3-485B-9764-EAC9E56C1D49}" type="datetimeFigureOut">
               <a:rPr lang="en-US" smtClean="0"/>
-              <a:t>1/7/2017</a:t>
+              <a:t>11/11/18</a:t>
             </a:fld>
             <a:endParaRPr lang="en-US"/>
           </a:p>
@@ -1000,7 +1000,7 @@
           <a:p>
             <a:fld id="{78C97017-6FC3-485B-9764-EAC9E56C1D49}" type="datetimeFigureOut">
               <a:rPr lang="en-US" smtClean="0"/>
-              <a:t>1/7/2017</a:t>
+              <a:t>11/11/18</a:t>
             </a:fld>
             <a:endParaRPr lang="en-US"/>
           </a:p>
@@ -1168,7 +1168,7 @@
           <a:p>
             <a:fld id="{78C97017-6FC3-485B-9764-EAC9E56C1D49}" type="datetimeFigureOut">
               <a:rPr lang="en-US" smtClean="0"/>
-              <a:t>1/7/2017</a:t>
+              <a:t>11/11/18</a:t>
             </a:fld>
             <a:endParaRPr lang="en-US"/>
           </a:p>
@@ -1413,7 +1413,7 @@
           <a:p>
             <a:fld id="{78C97017-6FC3-485B-9764-EAC9E56C1D49}" type="datetimeFigureOut">
               <a:rPr lang="en-US" smtClean="0"/>
-              <a:t>1/7/2017</a:t>
+              <a:t>11/11/18</a:t>
             </a:fld>
             <a:endParaRPr lang="en-US"/>
           </a:p>
@@ -1698,7 +1698,7 @@
           <a:p>
             <a:fld id="{78C97017-6FC3-485B-9764-EAC9E56C1D49}" type="datetimeFigureOut">
               <a:rPr lang="en-US" smtClean="0"/>
-              <a:t>1/7/2017</a:t>
+              <a:t>11/11/18</a:t>
             </a:fld>
             <a:endParaRPr lang="en-US"/>
           </a:p>
@@ -2117,7 +2117,7 @@
           <a:p>
             <a:fld id="{78C97017-6FC3-485B-9764-EAC9E56C1D49}" type="datetimeFigureOut">
               <a:rPr lang="en-US" smtClean="0"/>
-              <a:t>1/7/2017</a:t>
+              <a:t>11/11/18</a:t>
             </a:fld>
             <a:endParaRPr lang="en-US"/>
           </a:p>
@@ -2234,7 +2234,7 @@
           <a:p>
             <a:fld id="{78C97017-6FC3-485B-9764-EAC9E56C1D49}" type="datetimeFigureOut">
               <a:rPr lang="en-US" smtClean="0"/>
-              <a:t>1/7/2017</a:t>
+              <a:t>11/11/18</a:t>
             </a:fld>
             <a:endParaRPr lang="en-US"/>
           </a:p>
@@ -2329,7 +2329,7 @@
           <a:p>
             <a:fld id="{78C97017-6FC3-485B-9764-EAC9E56C1D49}" type="datetimeFigureOut">
               <a:rPr lang="en-US" smtClean="0"/>
-              <a:t>1/7/2017</a:t>
+              <a:t>11/11/18</a:t>
             </a:fld>
             <a:endParaRPr lang="en-US"/>
           </a:p>
@@ -2604,7 +2604,7 @@
           <a:p>
             <a:fld id="{78C97017-6FC3-485B-9764-EAC9E56C1D49}" type="datetimeFigureOut">
               <a:rPr lang="en-US" smtClean="0"/>
-              <a:t>1/7/2017</a:t>
+              <a:t>11/11/18</a:t>
             </a:fld>
             <a:endParaRPr lang="en-US"/>
           </a:p>
@@ -2856,7 +2856,7 @@
           <a:p>
             <a:fld id="{78C97017-6FC3-485B-9764-EAC9E56C1D49}" type="datetimeFigureOut">
               <a:rPr lang="en-US" smtClean="0"/>
-              <a:t>1/7/2017</a:t>
+              <a:t>11/11/18</a:t>
             </a:fld>
             <a:endParaRPr lang="en-US"/>
           </a:p>
@@ -3067,7 +3067,7 @@
           <a:p>
             <a:fld id="{78C97017-6FC3-485B-9764-EAC9E56C1D49}" type="datetimeFigureOut">
               <a:rPr lang="en-US" smtClean="0"/>
-              <a:t>1/7/2017</a:t>
+              <a:t>11/11/18</a:t>
             </a:fld>
             <a:endParaRPr lang="en-US"/>
           </a:p>
@@ -3442,2073 +3442,42 @@
           <a:chExt cx="0" cy="0"/>
         </a:xfrm>
       </p:grpSpPr>
-      <p:sp>
-        <p:nvSpPr>
-          <p:cNvPr id="23" name="Rectangle 65"/>
-          <p:cNvSpPr/>
+      <p:pic>
+        <p:nvPicPr>
+          <p:cNvPr id="7" name="Picture 6">
+            <a:extLst>
+              <a:ext uri="{FF2B5EF4-FFF2-40B4-BE49-F238E27FC236}">
+                <a16:creationId xmlns:a16="http://schemas.microsoft.com/office/drawing/2014/main" id="{3CEB87EB-9999-3A4A-9374-8FB11D40A53E}"/>
+              </a:ext>
+            </a:extLst>
+          </p:cNvPr>
+          <p:cNvPicPr>
+            <a:picLocks noChangeAspect="1"/>
+          </p:cNvPicPr>
           <p:nvPr/>
-        </p:nvSpPr>
+        </p:nvPicPr>
+        <p:blipFill>
+          <a:blip r:embed="rId2">
+            <a:extLst>
+              <a:ext uri="{28A0092B-C50C-407E-A947-70E740481C1C}">
+                <a14:useLocalDpi xmlns:a14="http://schemas.microsoft.com/office/drawing/2010/main" val="0"/>
+              </a:ext>
+            </a:extLst>
+          </a:blip>
+          <a:stretch>
+            <a:fillRect/>
+          </a:stretch>
+        </p:blipFill>
         <p:spPr>
           <a:xfrm>
-            <a:off x="1217465" y="1447800"/>
-            <a:ext cx="4917083" cy="3962400"/>
-          </a:xfrm>
-          <a:prstGeom prst="roundRect">
-            <a:avLst>
-              <a:gd name="adj" fmla="val 3484"/>
-            </a:avLst>
-          </a:prstGeom>
-          <a:solidFill>
-            <a:srgbClr val="F1F5E9"/>
-          </a:solidFill>
-          <a:ln w="19050">
-            <a:noFill/>
-          </a:ln>
-          <a:effectLst/>
-        </p:spPr>
-        <p:style>
-          <a:lnRef idx="1">
-            <a:schemeClr val="accent2"/>
-          </a:lnRef>
-          <a:fillRef idx="2">
-            <a:schemeClr val="accent2"/>
-          </a:fillRef>
-          <a:effectRef idx="1">
-            <a:schemeClr val="accent2"/>
-          </a:effectRef>
-          <a:fontRef idx="minor">
-            <a:schemeClr val="dk1"/>
-          </a:fontRef>
-        </p:style>
-        <p:txBody>
-          <a:bodyPr rtlCol="0" anchor="t"/>
-          <a:lstStyle/>
-          <a:p>
-            <a:r>
-              <a:rPr lang="en-US" sz="1200" b="1" dirty="0">
-                <a:solidFill>
-                  <a:schemeClr val="accent3">
-                    <a:lumMod val="75000"/>
-                  </a:schemeClr>
-                </a:solidFill>
-              </a:rPr>
-              <a:t>UI</a:t>
-            </a:r>
-            <a:endParaRPr lang="en-SG" sz="1200" b="1" dirty="0">
-              <a:solidFill>
-                <a:schemeClr val="accent3">
-                  <a:lumMod val="75000"/>
-                </a:schemeClr>
-              </a:solidFill>
-            </a:endParaRPr>
-          </a:p>
-        </p:txBody>
-      </p:sp>
-      <p:sp>
-        <p:nvSpPr>
-          <p:cNvPr id="2" name="Rectangle 8"/>
-          <p:cNvSpPr/>
-          <p:nvPr/>
-        </p:nvSpPr>
-        <p:spPr>
-          <a:xfrm>
-            <a:off x="2095948" y="2341220"/>
-            <a:ext cx="1093635" cy="346760"/>
+            <a:off x="1020679" y="1193800"/>
+            <a:ext cx="7102642" cy="4470400"/>
           </a:xfrm>
           <a:prstGeom prst="rect">
             <a:avLst/>
           </a:prstGeom>
-          <a:ln w="19050">
-            <a:solidFill>
-              <a:schemeClr val="accent3"/>
-            </a:solidFill>
-          </a:ln>
-          <a:effectLst/>
         </p:spPr>
-        <p:style>
-          <a:lnRef idx="1">
-            <a:schemeClr val="accent3"/>
-          </a:lnRef>
-          <a:fillRef idx="2">
-            <a:schemeClr val="accent3"/>
-          </a:fillRef>
-          <a:effectRef idx="1">
-            <a:schemeClr val="accent3"/>
-          </a:effectRef>
-          <a:fontRef idx="minor">
-            <a:schemeClr val="dk1"/>
-          </a:fontRef>
-        </p:style>
-        <p:txBody>
-          <a:bodyPr rtlCol="0" anchor="ctr"/>
-          <a:lstStyle/>
-          <a:p>
-            <a:pPr algn="ctr"/>
-            <a:r>
-              <a:rPr lang="en-US" sz="1050" b="1" dirty="0" err="1">
-                <a:solidFill>
-                  <a:schemeClr val="accent3">
-                    <a:lumMod val="75000"/>
-                  </a:schemeClr>
-                </a:solidFill>
-              </a:rPr>
-              <a:t>MainWindow</a:t>
-            </a:r>
-            <a:endParaRPr lang="en-SG" sz="1050" b="1" dirty="0">
-              <a:solidFill>
-                <a:schemeClr val="accent3">
-                  <a:lumMod val="75000"/>
-                </a:schemeClr>
-              </a:solidFill>
-            </a:endParaRPr>
-          </a:p>
-        </p:txBody>
-      </p:sp>
-      <p:sp>
-        <p:nvSpPr>
-          <p:cNvPr id="3" name="Rectangle 11"/>
-          <p:cNvSpPr/>
-          <p:nvPr/>
-        </p:nvSpPr>
-        <p:spPr>
-          <a:xfrm>
-            <a:off x="2592528" y="2971800"/>
-            <a:ext cx="1093635" cy="236841"/>
-          </a:xfrm>
-          <a:prstGeom prst="rect">
-            <a:avLst/>
-          </a:prstGeom>
-          <a:ln w="19050">
-            <a:solidFill>
-              <a:schemeClr val="accent3"/>
-            </a:solidFill>
-          </a:ln>
-          <a:effectLst/>
-        </p:spPr>
-        <p:style>
-          <a:lnRef idx="1">
-            <a:schemeClr val="accent3"/>
-          </a:lnRef>
-          <a:fillRef idx="2">
-            <a:schemeClr val="accent3"/>
-          </a:fillRef>
-          <a:effectRef idx="1">
-            <a:schemeClr val="accent3"/>
-          </a:effectRef>
-          <a:fontRef idx="minor">
-            <a:schemeClr val="dk1"/>
-          </a:fontRef>
-        </p:style>
-        <p:txBody>
-          <a:bodyPr rtlCol="0" anchor="ctr"/>
-          <a:lstStyle/>
-          <a:p>
-            <a:pPr algn="ctr"/>
-            <a:r>
-              <a:rPr lang="en-US" sz="1050" b="1" dirty="0" err="1">
-                <a:solidFill>
-                  <a:schemeClr val="accent3">
-                    <a:lumMod val="75000"/>
-                  </a:schemeClr>
-                </a:solidFill>
-              </a:rPr>
-              <a:t>CommandBox</a:t>
-            </a:r>
-            <a:endParaRPr lang="en-SG" sz="1050" b="1" dirty="0">
-              <a:solidFill>
-                <a:schemeClr val="accent3">
-                  <a:lumMod val="75000"/>
-                </a:schemeClr>
-              </a:solidFill>
-            </a:endParaRPr>
-          </a:p>
-        </p:txBody>
-      </p:sp>
-      <p:sp>
-        <p:nvSpPr>
-          <p:cNvPr id="9" name="Rectangle 62"/>
-          <p:cNvSpPr/>
-          <p:nvPr/>
-        </p:nvSpPr>
-        <p:spPr>
-          <a:xfrm>
-            <a:off x="2092842" y="1770924"/>
-            <a:ext cx="1093635" cy="346760"/>
-          </a:xfrm>
-          <a:prstGeom prst="rect">
-            <a:avLst/>
-          </a:prstGeom>
-          <a:solidFill>
-            <a:srgbClr val="00B050"/>
-          </a:solidFill>
-          <a:ln w="19050">
-            <a:solidFill>
-              <a:srgbClr val="00B050"/>
-            </a:solidFill>
-          </a:ln>
-          <a:effectLst/>
-        </p:spPr>
-        <p:style>
-          <a:lnRef idx="1">
-            <a:schemeClr val="accent2"/>
-          </a:lnRef>
-          <a:fillRef idx="2">
-            <a:schemeClr val="accent2"/>
-          </a:fillRef>
-          <a:effectRef idx="1">
-            <a:schemeClr val="accent2"/>
-          </a:effectRef>
-          <a:fontRef idx="minor">
-            <a:schemeClr val="dk1"/>
-          </a:fontRef>
-        </p:style>
-        <p:txBody>
-          <a:bodyPr rtlCol="0" anchor="ctr"/>
-          <a:lstStyle/>
-          <a:p>
-            <a:pPr algn="ctr"/>
-            <a:r>
-              <a:rPr lang="en-US" sz="1050" dirty="0" err="1">
-                <a:solidFill>
-                  <a:schemeClr val="bg1"/>
-                </a:solidFill>
-              </a:rPr>
-              <a:t>UiManager</a:t>
-            </a:r>
-            <a:endParaRPr lang="en-SG" sz="1050" dirty="0">
-              <a:solidFill>
-                <a:schemeClr val="bg1"/>
-              </a:solidFill>
-            </a:endParaRPr>
-          </a:p>
-        </p:txBody>
-      </p:sp>
-      <p:cxnSp>
-        <p:nvCxnSpPr>
-          <p:cNvPr id="10" name="Elbow Connector 63"/>
-          <p:cNvCxnSpPr>
-            <a:stCxn id="9" idx="2"/>
-            <a:endCxn id="2" idx="0"/>
-          </p:cNvCxnSpPr>
-          <p:nvPr/>
-        </p:nvCxnSpPr>
-        <p:spPr>
-          <a:xfrm rot="16200000" flipH="1">
-            <a:off x="2529445" y="2227899"/>
-            <a:ext cx="223536" cy="3106"/>
-          </a:xfrm>
-          <a:prstGeom prst="bentConnector3">
-            <a:avLst>
-              <a:gd name="adj1" fmla="val 50000"/>
-            </a:avLst>
-          </a:prstGeom>
-          <a:ln w="19050">
-            <a:solidFill>
-              <a:srgbClr val="00B050"/>
-            </a:solidFill>
-            <a:headEnd type="none" w="med" len="med"/>
-            <a:tailEnd type="arrow" w="med" len="med"/>
-          </a:ln>
-          <a:effectLst/>
-        </p:spPr>
-        <p:style>
-          <a:lnRef idx="1">
-            <a:schemeClr val="accent2"/>
-          </a:lnRef>
-          <a:fillRef idx="2">
-            <a:schemeClr val="accent2"/>
-          </a:fillRef>
-          <a:effectRef idx="1">
-            <a:schemeClr val="accent2"/>
-          </a:effectRef>
-          <a:fontRef idx="minor">
-            <a:schemeClr val="dk1"/>
-          </a:fontRef>
-        </p:style>
-      </p:cxnSp>
-      <p:sp>
-        <p:nvSpPr>
-          <p:cNvPr id="16" name="Isosceles Triangle 102"/>
-          <p:cNvSpPr/>
-          <p:nvPr/>
-        </p:nvSpPr>
-        <p:spPr>
-          <a:xfrm rot="10800000" flipV="1">
-            <a:off x="5394717" y="2110477"/>
-            <a:ext cx="270504" cy="175523"/>
-          </a:xfrm>
-          <a:prstGeom prst="triangle">
-            <a:avLst/>
-          </a:prstGeom>
-          <a:ln w="6350">
-            <a:solidFill>
-              <a:schemeClr val="accent3"/>
-            </a:solidFill>
-          </a:ln>
-          <a:effectLst/>
-        </p:spPr>
-        <p:style>
-          <a:lnRef idx="1">
-            <a:schemeClr val="accent3"/>
-          </a:lnRef>
-          <a:fillRef idx="2">
-            <a:schemeClr val="accent3"/>
-          </a:fillRef>
-          <a:effectRef idx="1">
-            <a:schemeClr val="accent3"/>
-          </a:effectRef>
-          <a:fontRef idx="minor">
-            <a:schemeClr val="dk1"/>
-          </a:fontRef>
-        </p:style>
-        <p:txBody>
-          <a:bodyPr rtlCol="0" anchor="ctr"/>
-          <a:lstStyle/>
-          <a:p>
-            <a:pPr algn="ctr"/>
-            <a:endParaRPr lang="en-SG" sz="1050" b="1">
-              <a:solidFill>
-                <a:srgbClr val="92D050"/>
-              </a:solidFill>
-            </a:endParaRPr>
-          </a:p>
-        </p:txBody>
-      </p:sp>
-      <p:cxnSp>
-        <p:nvCxnSpPr>
-          <p:cNvPr id="19" name="Elbow Connector 122"/>
-          <p:cNvCxnSpPr/>
-          <p:nvPr/>
-        </p:nvCxnSpPr>
-        <p:spPr>
-          <a:xfrm flipV="1">
-            <a:off x="644735" y="2991937"/>
-            <a:ext cx="684904" cy="1"/>
-          </a:xfrm>
-          <a:prstGeom prst="bentConnector3">
-            <a:avLst>
-              <a:gd name="adj1" fmla="val 50000"/>
-            </a:avLst>
-          </a:prstGeom>
-          <a:ln w="19050">
-            <a:solidFill>
-              <a:schemeClr val="bg1">
-                <a:lumMod val="75000"/>
-              </a:schemeClr>
-            </a:solidFill>
-            <a:prstDash val="sysDot"/>
-            <a:headEnd type="none" w="med" len="med"/>
-            <a:tailEnd type="arrow" w="med" len="med"/>
-          </a:ln>
-          <a:effectLst/>
-        </p:spPr>
-        <p:style>
-          <a:lnRef idx="1">
-            <a:schemeClr val="accent2"/>
-          </a:lnRef>
-          <a:fillRef idx="2">
-            <a:schemeClr val="accent2"/>
-          </a:fillRef>
-          <a:effectRef idx="1">
-            <a:schemeClr val="accent2"/>
-          </a:effectRef>
-          <a:fontRef idx="minor">
-            <a:schemeClr val="dk1"/>
-          </a:fontRef>
-        </p:style>
-      </p:cxnSp>
-      <p:sp>
-        <p:nvSpPr>
-          <p:cNvPr id="22" name="Rectangle 65"/>
-          <p:cNvSpPr/>
-          <p:nvPr/>
-        </p:nvSpPr>
-        <p:spPr>
-          <a:xfrm rot="16200000">
-            <a:off x="5703829" y="2464877"/>
-            <a:ext cx="2362201" cy="328045"/>
-          </a:xfrm>
-          <a:prstGeom prst="roundRect">
-            <a:avLst/>
-          </a:prstGeom>
-          <a:solidFill>
-            <a:schemeClr val="accent1">
-              <a:lumMod val="20000"/>
-              <a:lumOff val="80000"/>
-            </a:schemeClr>
-          </a:solidFill>
-          <a:ln w="19050">
-            <a:noFill/>
-          </a:ln>
-          <a:effectLst/>
-        </p:spPr>
-        <p:style>
-          <a:lnRef idx="1">
-            <a:schemeClr val="accent2"/>
-          </a:lnRef>
-          <a:fillRef idx="2">
-            <a:schemeClr val="accent2"/>
-          </a:fillRef>
-          <a:effectRef idx="1">
-            <a:schemeClr val="accent2"/>
-          </a:effectRef>
-          <a:fontRef idx="minor">
-            <a:schemeClr val="dk1"/>
-          </a:fontRef>
-        </p:style>
-        <p:txBody>
-          <a:bodyPr rtlCol="0" anchor="ctr"/>
-          <a:lstStyle/>
-          <a:p>
-            <a:pPr algn="ctr"/>
-            <a:r>
-              <a:rPr lang="en-US" sz="1100" b="1" dirty="0">
-                <a:solidFill>
-                  <a:schemeClr val="bg1"/>
-                </a:solidFill>
-              </a:rPr>
-              <a:t>Logic</a:t>
-            </a:r>
-            <a:endParaRPr lang="en-SG" sz="1100" b="1" dirty="0">
-              <a:solidFill>
-                <a:schemeClr val="bg1"/>
-              </a:solidFill>
-            </a:endParaRPr>
-          </a:p>
-        </p:txBody>
-      </p:sp>
-      <p:sp>
-        <p:nvSpPr>
-          <p:cNvPr id="34" name="Rectangle 11"/>
-          <p:cNvSpPr/>
-          <p:nvPr/>
-        </p:nvSpPr>
-        <p:spPr>
-          <a:xfrm>
-            <a:off x="2592528" y="3649359"/>
-            <a:ext cx="1093635" cy="236841"/>
-          </a:xfrm>
-          <a:prstGeom prst="rect">
-            <a:avLst/>
-          </a:prstGeom>
-          <a:ln w="19050">
-            <a:solidFill>
-              <a:schemeClr val="accent3"/>
-            </a:solidFill>
-          </a:ln>
-          <a:effectLst/>
-        </p:spPr>
-        <p:style>
-          <a:lnRef idx="1">
-            <a:schemeClr val="accent3"/>
-          </a:lnRef>
-          <a:fillRef idx="2">
-            <a:schemeClr val="accent3"/>
-          </a:fillRef>
-          <a:effectRef idx="1">
-            <a:schemeClr val="accent3"/>
-          </a:effectRef>
-          <a:fontRef idx="minor">
-            <a:schemeClr val="dk1"/>
-          </a:fontRef>
-        </p:style>
-        <p:txBody>
-          <a:bodyPr rtlCol="0" anchor="ctr"/>
-          <a:lstStyle/>
-          <a:p>
-            <a:pPr algn="ctr"/>
-            <a:r>
-              <a:rPr lang="en-US" sz="1050" b="1" dirty="0" err="1">
-                <a:solidFill>
-                  <a:schemeClr val="accent3">
-                    <a:lumMod val="75000"/>
-                  </a:schemeClr>
-                </a:solidFill>
-              </a:rPr>
-              <a:t>BrowserPanel</a:t>
-            </a:r>
-            <a:endParaRPr lang="en-SG" sz="1050" b="1" dirty="0">
-              <a:solidFill>
-                <a:schemeClr val="accent3">
-                  <a:lumMod val="75000"/>
-                </a:schemeClr>
-              </a:solidFill>
-            </a:endParaRPr>
-          </a:p>
-        </p:txBody>
-      </p:sp>
-      <p:sp>
-        <p:nvSpPr>
-          <p:cNvPr id="35" name="Rectangle 11"/>
-          <p:cNvSpPr/>
-          <p:nvPr/>
-        </p:nvSpPr>
-        <p:spPr>
-          <a:xfrm>
-            <a:off x="2592527" y="4563759"/>
-            <a:ext cx="1093635" cy="236841"/>
-          </a:xfrm>
-          <a:prstGeom prst="rect">
-            <a:avLst/>
-          </a:prstGeom>
-          <a:ln w="19050">
-            <a:solidFill>
-              <a:schemeClr val="accent3"/>
-            </a:solidFill>
-          </a:ln>
-          <a:effectLst/>
-        </p:spPr>
-        <p:style>
-          <a:lnRef idx="1">
-            <a:schemeClr val="accent3"/>
-          </a:lnRef>
-          <a:fillRef idx="2">
-            <a:schemeClr val="accent3"/>
-          </a:fillRef>
-          <a:effectRef idx="1">
-            <a:schemeClr val="accent3"/>
-          </a:effectRef>
-          <a:fontRef idx="minor">
-            <a:schemeClr val="dk1"/>
-          </a:fontRef>
-        </p:style>
-        <p:txBody>
-          <a:bodyPr rtlCol="0" anchor="ctr"/>
-          <a:lstStyle/>
-          <a:p>
-            <a:pPr algn="ctr"/>
-            <a:r>
-              <a:rPr lang="en-US" sz="1050" b="1" dirty="0" err="1">
-                <a:solidFill>
-                  <a:schemeClr val="accent3">
-                    <a:lumMod val="75000"/>
-                  </a:schemeClr>
-                </a:solidFill>
-              </a:rPr>
-              <a:t>StatusBarFooter</a:t>
-            </a:r>
-            <a:endParaRPr lang="en-SG" sz="1050" b="1" dirty="0">
-              <a:solidFill>
-                <a:schemeClr val="accent3">
-                  <a:lumMod val="75000"/>
-                </a:schemeClr>
-              </a:solidFill>
-            </a:endParaRPr>
-          </a:p>
-        </p:txBody>
-      </p:sp>
-      <p:sp>
-        <p:nvSpPr>
-          <p:cNvPr id="36" name="Rectangle 11"/>
-          <p:cNvSpPr/>
-          <p:nvPr/>
-        </p:nvSpPr>
-        <p:spPr>
-          <a:xfrm>
-            <a:off x="2592526" y="3991960"/>
-            <a:ext cx="1093635" cy="236841"/>
-          </a:xfrm>
-          <a:prstGeom prst="rect">
-            <a:avLst/>
-          </a:prstGeom>
-          <a:ln w="19050">
-            <a:solidFill>
-              <a:schemeClr val="accent3"/>
-            </a:solidFill>
-          </a:ln>
-          <a:effectLst/>
-        </p:spPr>
-        <p:style>
-          <a:lnRef idx="1">
-            <a:schemeClr val="accent3"/>
-          </a:lnRef>
-          <a:fillRef idx="2">
-            <a:schemeClr val="accent3"/>
-          </a:fillRef>
-          <a:effectRef idx="1">
-            <a:schemeClr val="accent3"/>
-          </a:effectRef>
-          <a:fontRef idx="minor">
-            <a:schemeClr val="dk1"/>
-          </a:fontRef>
-        </p:style>
-        <p:txBody>
-          <a:bodyPr rtlCol="0" anchor="ctr"/>
-          <a:lstStyle/>
-          <a:p>
-            <a:pPr algn="ctr"/>
-            <a:r>
-              <a:rPr lang="en-US" sz="1050" b="1" dirty="0" err="1">
-                <a:solidFill>
-                  <a:schemeClr val="accent3">
-                    <a:lumMod val="75000"/>
-                  </a:schemeClr>
-                </a:solidFill>
-              </a:rPr>
-              <a:t>PersonListPanel</a:t>
-            </a:r>
-            <a:endParaRPr lang="en-SG" sz="1050" b="1" dirty="0">
-              <a:solidFill>
-                <a:schemeClr val="accent3">
-                  <a:lumMod val="75000"/>
-                </a:schemeClr>
-              </a:solidFill>
-            </a:endParaRPr>
-          </a:p>
-        </p:txBody>
-      </p:sp>
-      <p:sp>
-        <p:nvSpPr>
-          <p:cNvPr id="37" name="Rectangle 11"/>
-          <p:cNvSpPr/>
-          <p:nvPr/>
-        </p:nvSpPr>
-        <p:spPr>
-          <a:xfrm>
-            <a:off x="3839323" y="4228801"/>
-            <a:ext cx="1040906" cy="236841"/>
-          </a:xfrm>
-          <a:prstGeom prst="rect">
-            <a:avLst/>
-          </a:prstGeom>
-          <a:ln w="19050">
-            <a:solidFill>
-              <a:schemeClr val="accent3"/>
-            </a:solidFill>
-          </a:ln>
-          <a:effectLst/>
-        </p:spPr>
-        <p:style>
-          <a:lnRef idx="1">
-            <a:schemeClr val="accent3"/>
-          </a:lnRef>
-          <a:fillRef idx="2">
-            <a:schemeClr val="accent3"/>
-          </a:fillRef>
-          <a:effectRef idx="1">
-            <a:schemeClr val="accent3"/>
-          </a:effectRef>
-          <a:fontRef idx="minor">
-            <a:schemeClr val="dk1"/>
-          </a:fontRef>
-        </p:style>
-        <p:txBody>
-          <a:bodyPr rtlCol="0" anchor="ctr"/>
-          <a:lstStyle/>
-          <a:p>
-            <a:pPr algn="ctr"/>
-            <a:r>
-              <a:rPr lang="en-US" sz="1050" b="1" dirty="0" err="1">
-                <a:solidFill>
-                  <a:schemeClr val="accent3">
-                    <a:lumMod val="75000"/>
-                  </a:schemeClr>
-                </a:solidFill>
-              </a:rPr>
-              <a:t>PersonCard</a:t>
-            </a:r>
-            <a:endParaRPr lang="en-SG" sz="1050" b="1" dirty="0">
-              <a:solidFill>
-                <a:schemeClr val="accent3">
-                  <a:lumMod val="75000"/>
-                </a:schemeClr>
-              </a:solidFill>
-            </a:endParaRPr>
-          </a:p>
-        </p:txBody>
-      </p:sp>
-      <p:sp>
-        <p:nvSpPr>
-          <p:cNvPr id="38" name="Rectangle 11"/>
-          <p:cNvSpPr/>
-          <p:nvPr/>
-        </p:nvSpPr>
-        <p:spPr>
-          <a:xfrm>
-            <a:off x="2592528" y="4966000"/>
-            <a:ext cx="1093635" cy="236841"/>
-          </a:xfrm>
-          <a:prstGeom prst="rect">
-            <a:avLst/>
-          </a:prstGeom>
-          <a:ln w="19050">
-            <a:solidFill>
-              <a:schemeClr val="accent3"/>
-            </a:solidFill>
-          </a:ln>
-          <a:effectLst/>
-        </p:spPr>
-        <p:style>
-          <a:lnRef idx="1">
-            <a:schemeClr val="accent3"/>
-          </a:lnRef>
-          <a:fillRef idx="2">
-            <a:schemeClr val="accent3"/>
-          </a:fillRef>
-          <a:effectRef idx="1">
-            <a:schemeClr val="accent3"/>
-          </a:effectRef>
-          <a:fontRef idx="minor">
-            <a:schemeClr val="dk1"/>
-          </a:fontRef>
-        </p:style>
-        <p:txBody>
-          <a:bodyPr rtlCol="0" anchor="ctr"/>
-          <a:lstStyle/>
-          <a:p>
-            <a:pPr algn="ctr"/>
-            <a:r>
-              <a:rPr lang="en-US" sz="1050" b="1" dirty="0" err="1">
-                <a:solidFill>
-                  <a:schemeClr val="accent3">
-                    <a:lumMod val="75000"/>
-                  </a:schemeClr>
-                </a:solidFill>
-              </a:rPr>
-              <a:t>HelpWindow</a:t>
-            </a:r>
-            <a:endParaRPr lang="en-SG" sz="1050" b="1" dirty="0">
-              <a:solidFill>
-                <a:schemeClr val="accent3">
-                  <a:lumMod val="75000"/>
-                </a:schemeClr>
-              </a:solidFill>
-            </a:endParaRPr>
-          </a:p>
-        </p:txBody>
-      </p:sp>
-      <p:sp>
-        <p:nvSpPr>
-          <p:cNvPr id="39" name="Flowchart: Decision 38"/>
-          <p:cNvSpPr/>
-          <p:nvPr/>
-        </p:nvSpPr>
-        <p:spPr>
-          <a:xfrm>
-            <a:off x="2324548" y="2706452"/>
-            <a:ext cx="183156" cy="161573"/>
-          </a:xfrm>
-          <a:prstGeom prst="flowChartDecision">
-            <a:avLst/>
-          </a:prstGeom>
-          <a:solidFill>
-            <a:schemeClr val="accent3"/>
-          </a:solidFill>
-          <a:ln>
-            <a:solidFill>
-              <a:schemeClr val="accent3"/>
-            </a:solidFill>
-          </a:ln>
-        </p:spPr>
-        <p:style>
-          <a:lnRef idx="2">
-            <a:schemeClr val="accent1">
-              <a:shade val="50000"/>
-            </a:schemeClr>
-          </a:lnRef>
-          <a:fillRef idx="1">
-            <a:schemeClr val="accent1"/>
-          </a:fillRef>
-          <a:effectRef idx="0">
-            <a:schemeClr val="accent1"/>
-          </a:effectRef>
-          <a:fontRef idx="minor">
-            <a:schemeClr val="lt1"/>
-          </a:fontRef>
-        </p:style>
-        <p:txBody>
-          <a:bodyPr rtlCol="0" anchor="ctr"/>
-          <a:lstStyle/>
-          <a:p>
-            <a:pPr algn="ctr"/>
-            <a:endParaRPr lang="en-SG"/>
-          </a:p>
-        </p:txBody>
-      </p:sp>
-      <p:cxnSp>
-        <p:nvCxnSpPr>
-          <p:cNvPr id="40" name="Elbow Connector 63"/>
-          <p:cNvCxnSpPr>
-            <a:stCxn id="39" idx="2"/>
-            <a:endCxn id="3" idx="1"/>
-          </p:cNvCxnSpPr>
-          <p:nvPr/>
-        </p:nvCxnSpPr>
-        <p:spPr>
-          <a:xfrm rot="16200000" flipH="1">
-            <a:off x="2393229" y="2890922"/>
-            <a:ext cx="222196" cy="176402"/>
-          </a:xfrm>
-          <a:prstGeom prst="bentConnector2">
-            <a:avLst/>
-          </a:prstGeom>
-          <a:ln w="19050">
-            <a:solidFill>
-              <a:schemeClr val="accent3"/>
-            </a:solidFill>
-            <a:headEnd type="none" w="med" len="med"/>
-            <a:tailEnd type="arrow" w="med" len="med"/>
-          </a:ln>
-          <a:effectLst/>
-        </p:spPr>
-        <p:style>
-          <a:lnRef idx="1">
-            <a:schemeClr val="accent2"/>
-          </a:lnRef>
-          <a:fillRef idx="2">
-            <a:schemeClr val="accent2"/>
-          </a:fillRef>
-          <a:effectRef idx="1">
-            <a:schemeClr val="accent2"/>
-          </a:effectRef>
-          <a:fontRef idx="minor">
-            <a:schemeClr val="dk1"/>
-          </a:fontRef>
-        </p:style>
-      </p:cxnSp>
-      <p:sp>
-        <p:nvSpPr>
-          <p:cNvPr id="43" name="Rectangle 11"/>
-          <p:cNvSpPr/>
-          <p:nvPr/>
-        </p:nvSpPr>
-        <p:spPr>
-          <a:xfrm>
-            <a:off x="2590799" y="3304308"/>
-            <a:ext cx="1095361" cy="236841"/>
-          </a:xfrm>
-          <a:prstGeom prst="rect">
-            <a:avLst/>
-          </a:prstGeom>
-          <a:ln w="19050">
-            <a:solidFill>
-              <a:schemeClr val="accent3"/>
-            </a:solidFill>
-          </a:ln>
-          <a:effectLst/>
-        </p:spPr>
-        <p:style>
-          <a:lnRef idx="1">
-            <a:schemeClr val="accent3"/>
-          </a:lnRef>
-          <a:fillRef idx="2">
-            <a:schemeClr val="accent3"/>
-          </a:fillRef>
-          <a:effectRef idx="1">
-            <a:schemeClr val="accent3"/>
-          </a:effectRef>
-          <a:fontRef idx="minor">
-            <a:schemeClr val="dk1"/>
-          </a:fontRef>
-        </p:style>
-        <p:txBody>
-          <a:bodyPr rtlCol="0" anchor="ctr"/>
-          <a:lstStyle/>
-          <a:p>
-            <a:pPr algn="ctr"/>
-            <a:r>
-              <a:rPr lang="en-US" sz="1050" b="1" dirty="0" err="1">
-                <a:solidFill>
-                  <a:schemeClr val="accent3">
-                    <a:lumMod val="75000"/>
-                  </a:schemeClr>
-                </a:solidFill>
-              </a:rPr>
-              <a:t>ResultDisplay</a:t>
-            </a:r>
-            <a:endParaRPr lang="en-SG" sz="1050" b="1" dirty="0">
-              <a:solidFill>
-                <a:schemeClr val="accent3">
-                  <a:lumMod val="75000"/>
-                </a:schemeClr>
-              </a:solidFill>
-            </a:endParaRPr>
-          </a:p>
-        </p:txBody>
-      </p:sp>
-      <p:cxnSp>
-        <p:nvCxnSpPr>
-          <p:cNvPr id="44" name="Elbow Connector 63"/>
-          <p:cNvCxnSpPr>
-            <a:stCxn id="39" idx="2"/>
-            <a:endCxn id="34" idx="1"/>
-          </p:cNvCxnSpPr>
-          <p:nvPr/>
-        </p:nvCxnSpPr>
-        <p:spPr>
-          <a:xfrm rot="16200000" flipH="1">
-            <a:off x="2054450" y="3229701"/>
-            <a:ext cx="899755" cy="176402"/>
-          </a:xfrm>
-          <a:prstGeom prst="bentConnector2">
-            <a:avLst/>
-          </a:prstGeom>
-          <a:ln w="19050">
-            <a:solidFill>
-              <a:schemeClr val="accent3"/>
-            </a:solidFill>
-            <a:headEnd type="none" w="med" len="med"/>
-            <a:tailEnd type="arrow" w="med" len="med"/>
-          </a:ln>
-          <a:effectLst/>
-        </p:spPr>
-        <p:style>
-          <a:lnRef idx="1">
-            <a:schemeClr val="accent2"/>
-          </a:lnRef>
-          <a:fillRef idx="2">
-            <a:schemeClr val="accent2"/>
-          </a:fillRef>
-          <a:effectRef idx="1">
-            <a:schemeClr val="accent2"/>
-          </a:effectRef>
-          <a:fontRef idx="minor">
-            <a:schemeClr val="dk1"/>
-          </a:fontRef>
-        </p:style>
-      </p:cxnSp>
-      <p:cxnSp>
-        <p:nvCxnSpPr>
-          <p:cNvPr id="47" name="Elbow Connector 63"/>
-          <p:cNvCxnSpPr>
-            <a:stCxn id="39" idx="2"/>
-            <a:endCxn id="36" idx="1"/>
-          </p:cNvCxnSpPr>
-          <p:nvPr/>
-        </p:nvCxnSpPr>
-        <p:spPr>
-          <a:xfrm rot="16200000" flipH="1">
-            <a:off x="1883148" y="3401003"/>
-            <a:ext cx="1242356" cy="176400"/>
-          </a:xfrm>
-          <a:prstGeom prst="bentConnector2">
-            <a:avLst/>
-          </a:prstGeom>
-          <a:ln w="19050">
-            <a:solidFill>
-              <a:schemeClr val="accent3"/>
-            </a:solidFill>
-            <a:headEnd type="none" w="med" len="med"/>
-            <a:tailEnd type="arrow" w="med" len="med"/>
-          </a:ln>
-          <a:effectLst/>
-        </p:spPr>
-        <p:style>
-          <a:lnRef idx="1">
-            <a:schemeClr val="accent2"/>
-          </a:lnRef>
-          <a:fillRef idx="2">
-            <a:schemeClr val="accent2"/>
-          </a:fillRef>
-          <a:effectRef idx="1">
-            <a:schemeClr val="accent2"/>
-          </a:effectRef>
-          <a:fontRef idx="minor">
-            <a:schemeClr val="dk1"/>
-          </a:fontRef>
-        </p:style>
-      </p:cxnSp>
-      <p:cxnSp>
-        <p:nvCxnSpPr>
-          <p:cNvPr id="50" name="Elbow Connector 63"/>
-          <p:cNvCxnSpPr>
-            <a:stCxn id="39" idx="2"/>
-            <a:endCxn id="35" idx="1"/>
-          </p:cNvCxnSpPr>
-          <p:nvPr/>
-        </p:nvCxnSpPr>
-        <p:spPr>
-          <a:xfrm rot="16200000" flipH="1">
-            <a:off x="1597249" y="3686901"/>
-            <a:ext cx="1814155" cy="176401"/>
-          </a:xfrm>
-          <a:prstGeom prst="bentConnector2">
-            <a:avLst/>
-          </a:prstGeom>
-          <a:ln w="19050">
-            <a:solidFill>
-              <a:schemeClr val="accent3"/>
-            </a:solidFill>
-            <a:headEnd type="none" w="med" len="med"/>
-            <a:tailEnd type="arrow" w="med" len="med"/>
-          </a:ln>
-          <a:effectLst/>
-        </p:spPr>
-        <p:style>
-          <a:lnRef idx="1">
-            <a:schemeClr val="accent2"/>
-          </a:lnRef>
-          <a:fillRef idx="2">
-            <a:schemeClr val="accent2"/>
-          </a:fillRef>
-          <a:effectRef idx="1">
-            <a:schemeClr val="accent2"/>
-          </a:effectRef>
-          <a:fontRef idx="minor">
-            <a:schemeClr val="dk1"/>
-          </a:fontRef>
-        </p:style>
-      </p:cxnSp>
-      <p:cxnSp>
-        <p:nvCxnSpPr>
-          <p:cNvPr id="53" name="Elbow Connector 63"/>
-          <p:cNvCxnSpPr>
-            <a:endCxn id="38" idx="1"/>
-          </p:cNvCxnSpPr>
-          <p:nvPr/>
-        </p:nvCxnSpPr>
-        <p:spPr>
-          <a:xfrm rot="16200000" flipH="1">
-            <a:off x="1184119" y="3676012"/>
-            <a:ext cx="2396440" cy="420377"/>
-          </a:xfrm>
-          <a:prstGeom prst="bentConnector2">
-            <a:avLst/>
-          </a:prstGeom>
-          <a:ln w="19050">
-            <a:solidFill>
-              <a:schemeClr val="accent3"/>
-            </a:solidFill>
-            <a:headEnd type="none" w="med" len="med"/>
-            <a:tailEnd type="arrow" w="med" len="med"/>
-          </a:ln>
-          <a:effectLst/>
-        </p:spPr>
-        <p:style>
-          <a:lnRef idx="1">
-            <a:schemeClr val="accent2"/>
-          </a:lnRef>
-          <a:fillRef idx="2">
-            <a:schemeClr val="accent2"/>
-          </a:fillRef>
-          <a:effectRef idx="1">
-            <a:schemeClr val="accent2"/>
-          </a:effectRef>
-          <a:fontRef idx="minor">
-            <a:schemeClr val="dk1"/>
-          </a:fontRef>
-        </p:style>
-      </p:cxnSp>
-      <p:sp>
-        <p:nvSpPr>
-          <p:cNvPr id="73" name="Rectangle 62"/>
-          <p:cNvSpPr/>
-          <p:nvPr/>
-        </p:nvSpPr>
-        <p:spPr>
-          <a:xfrm>
-            <a:off x="5143948" y="1770924"/>
-            <a:ext cx="772043" cy="346760"/>
-          </a:xfrm>
-          <a:prstGeom prst="rect">
-            <a:avLst/>
-          </a:prstGeom>
-          <a:ln w="6350">
-            <a:solidFill>
-              <a:schemeClr val="accent3"/>
-            </a:solidFill>
-          </a:ln>
-          <a:effectLst/>
-        </p:spPr>
-        <p:style>
-          <a:lnRef idx="1">
-            <a:schemeClr val="accent3"/>
-          </a:lnRef>
-          <a:fillRef idx="2">
-            <a:schemeClr val="accent3"/>
-          </a:fillRef>
-          <a:effectRef idx="1">
-            <a:schemeClr val="accent3"/>
-          </a:effectRef>
-          <a:fontRef idx="minor">
-            <a:schemeClr val="dk1"/>
-          </a:fontRef>
-        </p:style>
-        <p:txBody>
-          <a:bodyPr rtlCol="0" anchor="ctr"/>
-          <a:lstStyle/>
-          <a:p>
-            <a:pPr algn="ctr"/>
-            <a:r>
-              <a:rPr lang="en-US" sz="1050" b="1" dirty="0">
-                <a:solidFill>
-                  <a:schemeClr val="accent3">
-                    <a:lumMod val="75000"/>
-                  </a:schemeClr>
-                </a:solidFill>
-              </a:rPr>
-              <a:t>{abstract}</a:t>
-            </a:r>
-            <a:br>
-              <a:rPr lang="en-US" sz="1050" b="1" dirty="0">
-                <a:solidFill>
-                  <a:schemeClr val="accent3">
-                    <a:lumMod val="75000"/>
-                  </a:schemeClr>
-                </a:solidFill>
-              </a:rPr>
-            </a:br>
-            <a:r>
-              <a:rPr lang="en-US" sz="1050" b="1" dirty="0" err="1">
-                <a:solidFill>
-                  <a:schemeClr val="accent3">
-                    <a:lumMod val="75000"/>
-                  </a:schemeClr>
-                </a:solidFill>
-              </a:rPr>
-              <a:t>UiPart</a:t>
-            </a:r>
-            <a:endParaRPr lang="en-SG" sz="1050" b="1" dirty="0">
-              <a:solidFill>
-                <a:schemeClr val="accent3">
-                  <a:lumMod val="75000"/>
-                </a:schemeClr>
-              </a:solidFill>
-            </a:endParaRPr>
-          </a:p>
-        </p:txBody>
-      </p:sp>
-      <p:cxnSp>
-        <p:nvCxnSpPr>
-          <p:cNvPr id="74" name="Elbow Connector 63"/>
-          <p:cNvCxnSpPr>
-            <a:stCxn id="43" idx="3"/>
-            <a:endCxn id="16" idx="3"/>
-          </p:cNvCxnSpPr>
-          <p:nvPr/>
-        </p:nvCxnSpPr>
-        <p:spPr>
-          <a:xfrm flipV="1">
-            <a:off x="3686160" y="2286000"/>
-            <a:ext cx="1843809" cy="1136729"/>
-          </a:xfrm>
-          <a:prstGeom prst="bentConnector2">
-            <a:avLst/>
-          </a:prstGeom>
-          <a:ln w="6350">
-            <a:solidFill>
-              <a:schemeClr val="accent3"/>
-            </a:solidFill>
-            <a:headEnd type="none" w="med" len="med"/>
-            <a:tailEnd type="none" w="med" len="med"/>
-          </a:ln>
-          <a:effectLst/>
-        </p:spPr>
-        <p:style>
-          <a:lnRef idx="1">
-            <a:schemeClr val="accent2"/>
-          </a:lnRef>
-          <a:fillRef idx="2">
-            <a:schemeClr val="accent2"/>
-          </a:fillRef>
-          <a:effectRef idx="1">
-            <a:schemeClr val="accent2"/>
-          </a:effectRef>
-          <a:fontRef idx="minor">
-            <a:schemeClr val="dk1"/>
-          </a:fontRef>
-        </p:style>
-      </p:cxnSp>
-      <p:cxnSp>
-        <p:nvCxnSpPr>
-          <p:cNvPr id="77" name="Elbow Connector 63"/>
-          <p:cNvCxnSpPr>
-            <a:stCxn id="16" idx="3"/>
-            <a:endCxn id="37" idx="3"/>
-          </p:cNvCxnSpPr>
-          <p:nvPr/>
-        </p:nvCxnSpPr>
-        <p:spPr>
-          <a:xfrm rot="5400000">
-            <a:off x="4174488" y="2991741"/>
-            <a:ext cx="2061222" cy="649740"/>
-          </a:xfrm>
-          <a:prstGeom prst="bentConnector2">
-            <a:avLst/>
-          </a:prstGeom>
-          <a:ln w="6350">
-            <a:solidFill>
-              <a:schemeClr val="accent3"/>
-            </a:solidFill>
-            <a:headEnd type="none" w="med" len="med"/>
-            <a:tailEnd type="none" w="med" len="med"/>
-          </a:ln>
-          <a:effectLst/>
-        </p:spPr>
-        <p:style>
-          <a:lnRef idx="1">
-            <a:schemeClr val="accent2"/>
-          </a:lnRef>
-          <a:fillRef idx="2">
-            <a:schemeClr val="accent2"/>
-          </a:fillRef>
-          <a:effectRef idx="1">
-            <a:schemeClr val="accent2"/>
-          </a:effectRef>
-          <a:fontRef idx="minor">
-            <a:schemeClr val="dk1"/>
-          </a:fontRef>
-        </p:style>
-      </p:cxnSp>
-      <p:cxnSp>
-        <p:nvCxnSpPr>
-          <p:cNvPr id="82" name="Elbow Connector 63"/>
-          <p:cNvCxnSpPr>
-            <a:stCxn id="16" idx="3"/>
-            <a:endCxn id="34" idx="3"/>
-          </p:cNvCxnSpPr>
-          <p:nvPr/>
-        </p:nvCxnSpPr>
-        <p:spPr>
-          <a:xfrm rot="5400000">
-            <a:off x="3867176" y="2104987"/>
-            <a:ext cx="1481780" cy="1843806"/>
-          </a:xfrm>
-          <a:prstGeom prst="bentConnector2">
-            <a:avLst/>
-          </a:prstGeom>
-          <a:ln w="6350">
-            <a:solidFill>
-              <a:schemeClr val="accent3"/>
-            </a:solidFill>
-            <a:headEnd type="none" w="med" len="med"/>
-            <a:tailEnd type="none" w="med" len="med"/>
-          </a:ln>
-          <a:effectLst/>
-        </p:spPr>
-        <p:style>
-          <a:lnRef idx="1">
-            <a:schemeClr val="accent2"/>
-          </a:lnRef>
-          <a:fillRef idx="2">
-            <a:schemeClr val="accent2"/>
-          </a:fillRef>
-          <a:effectRef idx="1">
-            <a:schemeClr val="accent2"/>
-          </a:effectRef>
-          <a:fontRef idx="minor">
-            <a:schemeClr val="dk1"/>
-          </a:fontRef>
-        </p:style>
-      </p:cxnSp>
-      <p:cxnSp>
-        <p:nvCxnSpPr>
-          <p:cNvPr id="88" name="Elbow Connector 63"/>
-          <p:cNvCxnSpPr>
-            <a:stCxn id="2" idx="3"/>
-            <a:endCxn id="16" idx="3"/>
-          </p:cNvCxnSpPr>
-          <p:nvPr/>
-        </p:nvCxnSpPr>
-        <p:spPr>
-          <a:xfrm flipV="1">
-            <a:off x="3189583" y="2286000"/>
-            <a:ext cx="2340386" cy="228600"/>
-          </a:xfrm>
-          <a:prstGeom prst="bentConnector2">
-            <a:avLst/>
-          </a:prstGeom>
-          <a:ln w="6350">
-            <a:solidFill>
-              <a:schemeClr val="accent3"/>
-            </a:solidFill>
-            <a:headEnd type="none" w="med" len="med"/>
-            <a:tailEnd type="none" w="med" len="med"/>
-          </a:ln>
-          <a:effectLst/>
-        </p:spPr>
-        <p:style>
-          <a:lnRef idx="1">
-            <a:schemeClr val="accent2"/>
-          </a:lnRef>
-          <a:fillRef idx="2">
-            <a:schemeClr val="accent2"/>
-          </a:fillRef>
-          <a:effectRef idx="1">
-            <a:schemeClr val="accent2"/>
-          </a:effectRef>
-          <a:fontRef idx="minor">
-            <a:schemeClr val="dk1"/>
-          </a:fontRef>
-        </p:style>
-      </p:cxnSp>
-      <p:cxnSp>
-        <p:nvCxnSpPr>
-          <p:cNvPr id="91" name="Elbow Connector 63"/>
-          <p:cNvCxnSpPr>
-            <a:stCxn id="16" idx="3"/>
-            <a:endCxn id="35" idx="3"/>
-          </p:cNvCxnSpPr>
-          <p:nvPr/>
-        </p:nvCxnSpPr>
-        <p:spPr>
-          <a:xfrm rot="5400000">
-            <a:off x="3409976" y="2562187"/>
-            <a:ext cx="2396180" cy="1843807"/>
-          </a:xfrm>
-          <a:prstGeom prst="bentConnector2">
-            <a:avLst/>
-          </a:prstGeom>
-          <a:ln w="6350">
-            <a:solidFill>
-              <a:schemeClr val="accent3"/>
-            </a:solidFill>
-            <a:headEnd type="none" w="med" len="med"/>
-            <a:tailEnd type="none" w="med" len="med"/>
-          </a:ln>
-          <a:effectLst/>
-        </p:spPr>
-        <p:style>
-          <a:lnRef idx="1">
-            <a:schemeClr val="accent2"/>
-          </a:lnRef>
-          <a:fillRef idx="2">
-            <a:schemeClr val="accent2"/>
-          </a:fillRef>
-          <a:effectRef idx="1">
-            <a:schemeClr val="accent2"/>
-          </a:effectRef>
-          <a:fontRef idx="minor">
-            <a:schemeClr val="dk1"/>
-          </a:fontRef>
-        </p:style>
-      </p:cxnSp>
-      <p:cxnSp>
-        <p:nvCxnSpPr>
-          <p:cNvPr id="94" name="Elbow Connector 63"/>
-          <p:cNvCxnSpPr>
-            <a:stCxn id="16" idx="3"/>
-            <a:endCxn id="38" idx="3"/>
-          </p:cNvCxnSpPr>
-          <p:nvPr/>
-        </p:nvCxnSpPr>
-        <p:spPr>
-          <a:xfrm rot="5400000">
-            <a:off x="3208856" y="2763307"/>
-            <a:ext cx="2798421" cy="1843806"/>
-          </a:xfrm>
-          <a:prstGeom prst="bentConnector2">
-            <a:avLst/>
-          </a:prstGeom>
-          <a:ln w="6350">
-            <a:solidFill>
-              <a:schemeClr val="accent3"/>
-            </a:solidFill>
-            <a:headEnd type="none" w="med" len="med"/>
-            <a:tailEnd type="none" w="med" len="med"/>
-          </a:ln>
-          <a:effectLst/>
-        </p:spPr>
-        <p:style>
-          <a:lnRef idx="1">
-            <a:schemeClr val="accent2"/>
-          </a:lnRef>
-          <a:fillRef idx="2">
-            <a:schemeClr val="accent2"/>
-          </a:fillRef>
-          <a:effectRef idx="1">
-            <a:schemeClr val="accent2"/>
-          </a:effectRef>
-          <a:fontRef idx="minor">
-            <a:schemeClr val="dk1"/>
-          </a:fontRef>
-        </p:style>
-      </p:cxnSp>
-      <p:cxnSp>
-        <p:nvCxnSpPr>
-          <p:cNvPr id="107" name="Elbow Connector 106"/>
-          <p:cNvCxnSpPr>
-            <a:stCxn id="9" idx="0"/>
-          </p:cNvCxnSpPr>
-          <p:nvPr/>
-        </p:nvCxnSpPr>
-        <p:spPr>
-          <a:xfrm rot="5400000" flipH="1" flipV="1">
-            <a:off x="4594921" y="-355061"/>
-            <a:ext cx="170724" cy="4081246"/>
-          </a:xfrm>
-          <a:prstGeom prst="bentConnector2">
-            <a:avLst/>
-          </a:prstGeom>
-          <a:ln w="19050">
-            <a:solidFill>
-              <a:srgbClr val="00B050"/>
-            </a:solidFill>
-            <a:prstDash val="solid"/>
-            <a:headEnd type="none" w="med" len="med"/>
-            <a:tailEnd type="arrow" w="med" len="med"/>
-          </a:ln>
-          <a:effectLst/>
-        </p:spPr>
-        <p:style>
-          <a:lnRef idx="1">
-            <a:schemeClr val="accent2"/>
-          </a:lnRef>
-          <a:fillRef idx="2">
-            <a:schemeClr val="accent2"/>
-          </a:fillRef>
-          <a:effectRef idx="1">
-            <a:schemeClr val="accent2"/>
-          </a:effectRef>
-          <a:fontRef idx="minor">
-            <a:schemeClr val="dk1"/>
-          </a:fontRef>
-        </p:style>
-      </p:cxnSp>
-      <p:sp>
-        <p:nvSpPr>
-          <p:cNvPr id="117" name="Rectangle 65"/>
-          <p:cNvSpPr/>
-          <p:nvPr/>
-        </p:nvSpPr>
-        <p:spPr>
-          <a:xfrm rot="16200000">
-            <a:off x="6213739" y="4560376"/>
-            <a:ext cx="1371599" cy="328045"/>
-          </a:xfrm>
-          <a:prstGeom prst="roundRect">
-            <a:avLst/>
-          </a:prstGeom>
-          <a:solidFill>
-            <a:schemeClr val="accent4">
-              <a:lumMod val="20000"/>
-              <a:lumOff val="80000"/>
-            </a:schemeClr>
-          </a:solidFill>
-          <a:ln w="19050">
-            <a:noFill/>
-          </a:ln>
-          <a:effectLst/>
-        </p:spPr>
-        <p:style>
-          <a:lnRef idx="1">
-            <a:schemeClr val="accent2"/>
-          </a:lnRef>
-          <a:fillRef idx="2">
-            <a:schemeClr val="accent2"/>
-          </a:fillRef>
-          <a:effectRef idx="1">
-            <a:schemeClr val="accent2"/>
-          </a:effectRef>
-          <a:fontRef idx="minor">
-            <a:schemeClr val="dk1"/>
-          </a:fontRef>
-        </p:style>
-        <p:txBody>
-          <a:bodyPr rtlCol="0" anchor="ctr"/>
-          <a:lstStyle/>
-          <a:p>
-            <a:pPr algn="ctr"/>
-            <a:r>
-              <a:rPr lang="en-US" sz="1100" b="1" dirty="0">
-                <a:solidFill>
-                  <a:schemeClr val="bg1"/>
-                </a:solidFill>
-              </a:rPr>
-              <a:t>Model</a:t>
-            </a:r>
-            <a:endParaRPr lang="en-SG" sz="1100" b="1" dirty="0">
-              <a:solidFill>
-                <a:schemeClr val="bg1"/>
-              </a:solidFill>
-            </a:endParaRPr>
-          </a:p>
-        </p:txBody>
-      </p:sp>
-      <p:sp>
-        <p:nvSpPr>
-          <p:cNvPr id="119" name="Rectangle 62"/>
-          <p:cNvSpPr/>
-          <p:nvPr/>
-        </p:nvSpPr>
-        <p:spPr>
-          <a:xfrm rot="16200000">
-            <a:off x="956202" y="2861202"/>
-            <a:ext cx="1093635" cy="346760"/>
-          </a:xfrm>
-          <a:prstGeom prst="rect">
-            <a:avLst/>
-          </a:prstGeom>
-          <a:solidFill>
-            <a:srgbClr val="00B050"/>
-          </a:solidFill>
-          <a:ln w="19050">
-            <a:solidFill>
-              <a:srgbClr val="00B050"/>
-            </a:solidFill>
-          </a:ln>
-          <a:effectLst/>
-        </p:spPr>
-        <p:style>
-          <a:lnRef idx="1">
-            <a:schemeClr val="accent2"/>
-          </a:lnRef>
-          <a:fillRef idx="2">
-            <a:schemeClr val="accent2"/>
-          </a:fillRef>
-          <a:effectRef idx="1">
-            <a:schemeClr val="accent2"/>
-          </a:effectRef>
-          <a:fontRef idx="minor">
-            <a:schemeClr val="dk1"/>
-          </a:fontRef>
-        </p:style>
-        <p:txBody>
-          <a:bodyPr rtlCol="0" anchor="ctr"/>
-          <a:lstStyle/>
-          <a:p>
-            <a:pPr algn="ctr"/>
-            <a:r>
-              <a:rPr lang="en-US" sz="1050" dirty="0">
-                <a:solidFill>
-                  <a:schemeClr val="bg1"/>
-                </a:solidFill>
-              </a:rPr>
-              <a:t>&lt;&lt;interface&gt;&gt;</a:t>
-            </a:r>
-          </a:p>
-          <a:p>
-            <a:pPr algn="ctr"/>
-            <a:r>
-              <a:rPr lang="en-US" sz="1050" dirty="0" err="1">
-                <a:solidFill>
-                  <a:schemeClr val="bg1"/>
-                </a:solidFill>
-              </a:rPr>
-              <a:t>Ui</a:t>
-            </a:r>
-            <a:endParaRPr lang="en-SG" sz="1050" dirty="0">
-              <a:solidFill>
-                <a:schemeClr val="bg1"/>
-              </a:solidFill>
-            </a:endParaRPr>
-          </a:p>
-        </p:txBody>
-      </p:sp>
-      <p:sp>
-        <p:nvSpPr>
-          <p:cNvPr id="120" name="Isosceles Triangle 102"/>
-          <p:cNvSpPr/>
-          <p:nvPr/>
-        </p:nvSpPr>
-        <p:spPr>
-          <a:xfrm flipV="1">
-            <a:off x="1367767" y="2286001"/>
-            <a:ext cx="270504" cy="175523"/>
-          </a:xfrm>
-          <a:prstGeom prst="triangle">
-            <a:avLst/>
-          </a:prstGeom>
-          <a:ln w="19050">
-            <a:solidFill>
-              <a:srgbClr val="00B050"/>
-            </a:solidFill>
-          </a:ln>
-          <a:effectLst/>
-        </p:spPr>
-        <p:style>
-          <a:lnRef idx="1">
-            <a:schemeClr val="accent3"/>
-          </a:lnRef>
-          <a:fillRef idx="2">
-            <a:schemeClr val="accent3"/>
-          </a:fillRef>
-          <a:effectRef idx="1">
-            <a:schemeClr val="accent3"/>
-          </a:effectRef>
-          <a:fontRef idx="minor">
-            <a:schemeClr val="dk1"/>
-          </a:fontRef>
-        </p:style>
-        <p:txBody>
-          <a:bodyPr rtlCol="0" anchor="ctr"/>
-          <a:lstStyle/>
-          <a:p>
-            <a:pPr algn="ctr"/>
-            <a:endParaRPr lang="en-SG" sz="1050" b="1">
-              <a:solidFill>
-                <a:srgbClr val="92D050"/>
-              </a:solidFill>
-            </a:endParaRPr>
-          </a:p>
-        </p:txBody>
-      </p:sp>
-      <p:cxnSp>
-        <p:nvCxnSpPr>
-          <p:cNvPr id="121" name="Elbow Connector 63"/>
-          <p:cNvCxnSpPr>
-            <a:stCxn id="9" idx="1"/>
-            <a:endCxn id="120" idx="3"/>
-          </p:cNvCxnSpPr>
-          <p:nvPr/>
-        </p:nvCxnSpPr>
-        <p:spPr>
-          <a:xfrm rot="10800000" flipV="1">
-            <a:off x="1503020" y="1944303"/>
-            <a:ext cx="589823" cy="341697"/>
-          </a:xfrm>
-          <a:prstGeom prst="bentConnector2">
-            <a:avLst/>
-          </a:prstGeom>
-          <a:ln w="19050">
-            <a:solidFill>
-              <a:srgbClr val="00B050"/>
-            </a:solidFill>
-            <a:prstDash val="sysDot"/>
-            <a:headEnd type="none" w="med" len="med"/>
-            <a:tailEnd type="none" w="med" len="med"/>
-          </a:ln>
-          <a:effectLst/>
-        </p:spPr>
-        <p:style>
-          <a:lnRef idx="1">
-            <a:schemeClr val="accent2"/>
-          </a:lnRef>
-          <a:fillRef idx="2">
-            <a:schemeClr val="accent2"/>
-          </a:fillRef>
-          <a:effectRef idx="1">
-            <a:schemeClr val="accent2"/>
-          </a:effectRef>
-          <a:fontRef idx="minor">
-            <a:schemeClr val="dk1"/>
-          </a:fontRef>
-        </p:style>
-      </p:cxnSp>
-      <p:cxnSp>
-        <p:nvCxnSpPr>
-          <p:cNvPr id="131" name="Elbow Connector 130"/>
-          <p:cNvCxnSpPr>
-            <a:stCxn id="39" idx="2"/>
-            <a:endCxn id="43" idx="1"/>
-          </p:cNvCxnSpPr>
-          <p:nvPr/>
-        </p:nvCxnSpPr>
-        <p:spPr>
-          <a:xfrm rot="16200000" flipH="1">
-            <a:off x="2226110" y="3058040"/>
-            <a:ext cx="554704" cy="174673"/>
-          </a:xfrm>
-          <a:prstGeom prst="bentConnector2">
-            <a:avLst/>
-          </a:prstGeom>
-          <a:ln w="19050">
-            <a:solidFill>
-              <a:schemeClr val="accent3"/>
-            </a:solidFill>
-            <a:headEnd type="none" w="med" len="med"/>
-            <a:tailEnd type="arrow" w="med" len="med"/>
-          </a:ln>
-          <a:effectLst/>
-        </p:spPr>
-        <p:style>
-          <a:lnRef idx="1">
-            <a:schemeClr val="accent2"/>
-          </a:lnRef>
-          <a:fillRef idx="2">
-            <a:schemeClr val="accent2"/>
-          </a:fillRef>
-          <a:effectRef idx="1">
-            <a:schemeClr val="accent2"/>
-          </a:effectRef>
-          <a:fontRef idx="minor">
-            <a:schemeClr val="dk1"/>
-          </a:fontRef>
-        </p:style>
-      </p:cxnSp>
-      <p:cxnSp>
-        <p:nvCxnSpPr>
-          <p:cNvPr id="132" name="Elbow Connector 63"/>
-          <p:cNvCxnSpPr>
-            <a:stCxn id="16" idx="3"/>
-            <a:endCxn id="3" idx="3"/>
-          </p:cNvCxnSpPr>
-          <p:nvPr/>
-        </p:nvCxnSpPr>
-        <p:spPr>
-          <a:xfrm rot="5400000">
-            <a:off x="4205956" y="1766207"/>
-            <a:ext cx="804221" cy="1843806"/>
-          </a:xfrm>
-          <a:prstGeom prst="bentConnector2">
-            <a:avLst/>
-          </a:prstGeom>
-          <a:ln w="6350">
-            <a:solidFill>
-              <a:schemeClr val="accent3"/>
-            </a:solidFill>
-            <a:headEnd type="none" w="med" len="med"/>
-            <a:tailEnd type="none" w="med" len="med"/>
-          </a:ln>
-          <a:effectLst/>
-        </p:spPr>
-        <p:style>
-          <a:lnRef idx="1">
-            <a:schemeClr val="accent2"/>
-          </a:lnRef>
-          <a:fillRef idx="2">
-            <a:schemeClr val="accent2"/>
-          </a:fillRef>
-          <a:effectRef idx="1">
-            <a:schemeClr val="accent2"/>
-          </a:effectRef>
-          <a:fontRef idx="minor">
-            <a:schemeClr val="dk1"/>
-          </a:fontRef>
-        </p:style>
-      </p:cxnSp>
-      <p:cxnSp>
-        <p:nvCxnSpPr>
-          <p:cNvPr id="137" name="Elbow Connector 136"/>
-          <p:cNvCxnSpPr>
-            <a:stCxn id="36" idx="2"/>
-            <a:endCxn id="37" idx="1"/>
-          </p:cNvCxnSpPr>
-          <p:nvPr/>
-        </p:nvCxnSpPr>
-        <p:spPr>
-          <a:xfrm rot="16200000" flipH="1">
-            <a:off x="3430123" y="3938021"/>
-            <a:ext cx="118421" cy="699979"/>
-          </a:xfrm>
-          <a:prstGeom prst="bentConnector2">
-            <a:avLst/>
-          </a:prstGeom>
-          <a:ln w="19050">
-            <a:solidFill>
-              <a:schemeClr val="accent3"/>
-            </a:solidFill>
-            <a:headEnd type="none" w="med" len="med"/>
-            <a:tailEnd type="arrow" w="med" len="med"/>
-          </a:ln>
-          <a:effectLst/>
-        </p:spPr>
-        <p:style>
-          <a:lnRef idx="1">
-            <a:schemeClr val="accent2"/>
-          </a:lnRef>
-          <a:fillRef idx="2">
-            <a:schemeClr val="accent2"/>
-          </a:fillRef>
-          <a:effectRef idx="1">
-            <a:schemeClr val="accent2"/>
-          </a:effectRef>
-          <a:fontRef idx="minor">
-            <a:schemeClr val="dk1"/>
-          </a:fontRef>
-        </p:style>
-      </p:cxnSp>
-      <p:cxnSp>
-        <p:nvCxnSpPr>
-          <p:cNvPr id="140" name="Elbow Connector 63"/>
-          <p:cNvCxnSpPr>
-            <a:stCxn id="16" idx="3"/>
-            <a:endCxn id="36" idx="3"/>
-          </p:cNvCxnSpPr>
-          <p:nvPr/>
-        </p:nvCxnSpPr>
-        <p:spPr>
-          <a:xfrm rot="5400000">
-            <a:off x="3695875" y="2276286"/>
-            <a:ext cx="1824381" cy="1843808"/>
-          </a:xfrm>
-          <a:prstGeom prst="bentConnector2">
-            <a:avLst/>
-          </a:prstGeom>
-          <a:ln w="6350">
-            <a:solidFill>
-              <a:schemeClr val="accent3"/>
-            </a:solidFill>
-            <a:headEnd type="none" w="med" len="med"/>
-            <a:tailEnd type="none" w="med" len="med"/>
-          </a:ln>
-          <a:effectLst/>
-        </p:spPr>
-        <p:style>
-          <a:lnRef idx="1">
-            <a:schemeClr val="accent2"/>
-          </a:lnRef>
-          <a:fillRef idx="2">
-            <a:schemeClr val="accent2"/>
-          </a:fillRef>
-          <a:effectRef idx="1">
-            <a:schemeClr val="accent2"/>
-          </a:effectRef>
-          <a:fontRef idx="minor">
-            <a:schemeClr val="dk1"/>
-          </a:fontRef>
-        </p:style>
-      </p:cxnSp>
-      <p:sp>
-        <p:nvSpPr>
-          <p:cNvPr id="143" name="Rectangle 142"/>
-          <p:cNvSpPr/>
-          <p:nvPr/>
-        </p:nvSpPr>
-        <p:spPr>
-          <a:xfrm>
-            <a:off x="5435896" y="2743200"/>
-            <a:ext cx="229325" cy="166560"/>
-          </a:xfrm>
-          <a:prstGeom prst="rect">
-            <a:avLst/>
-          </a:prstGeom>
-          <a:solidFill>
-            <a:schemeClr val="accent3">
-              <a:lumMod val="20000"/>
-              <a:lumOff val="80000"/>
-              <a:alpha val="80000"/>
-            </a:schemeClr>
-          </a:solidFill>
-          <a:ln>
-            <a:noFill/>
-          </a:ln>
-          <a:effectLst>
-            <a:softEdge rad="31750"/>
-          </a:effectLst>
-        </p:spPr>
-        <p:style>
-          <a:lnRef idx="2">
-            <a:schemeClr val="accent1">
-              <a:shade val="50000"/>
-            </a:schemeClr>
-          </a:lnRef>
-          <a:fillRef idx="1">
-            <a:schemeClr val="accent1"/>
-          </a:fillRef>
-          <a:effectRef idx="0">
-            <a:schemeClr val="accent1"/>
-          </a:effectRef>
-          <a:fontRef idx="minor">
-            <a:schemeClr val="lt1"/>
-          </a:fontRef>
-        </p:style>
-        <p:txBody>
-          <a:bodyPr rtlCol="0" anchor="ctr"/>
-          <a:lstStyle/>
-          <a:p>
-            <a:pPr algn="ctr"/>
-            <a:endParaRPr lang="en-SG"/>
-          </a:p>
-        </p:txBody>
-      </p:sp>
-      <p:sp>
-        <p:nvSpPr>
-          <p:cNvPr id="116" name="Freeform 115"/>
-          <p:cNvSpPr/>
-          <p:nvPr/>
-        </p:nvSpPr>
-        <p:spPr>
-          <a:xfrm>
-            <a:off x="3687515" y="2828802"/>
-            <a:ext cx="3048000" cy="203200"/>
-          </a:xfrm>
-          <a:custGeom>
-            <a:avLst/>
-            <a:gdLst>
-              <a:gd name="connsiteX0" fmla="*/ 0 w 3048000"/>
-              <a:gd name="connsiteY0" fmla="*/ 203200 h 203200"/>
-              <a:gd name="connsiteX1" fmla="*/ 221673 w 3048000"/>
-              <a:gd name="connsiteY1" fmla="*/ 0 h 203200"/>
-              <a:gd name="connsiteX2" fmla="*/ 3048000 w 3048000"/>
-              <a:gd name="connsiteY2" fmla="*/ 0 h 203200"/>
-            </a:gdLst>
-            <a:ahLst/>
-            <a:cxnLst>
-              <a:cxn ang="0">
-                <a:pos x="connsiteX0" y="connsiteY0"/>
-              </a:cxn>
-              <a:cxn ang="0">
-                <a:pos x="connsiteX1" y="connsiteY1"/>
-              </a:cxn>
-              <a:cxn ang="0">
-                <a:pos x="connsiteX2" y="connsiteY2"/>
-              </a:cxn>
-            </a:cxnLst>
-            <a:rect l="l" t="t" r="r" b="b"/>
-            <a:pathLst>
-              <a:path w="3048000" h="203200">
-                <a:moveTo>
-                  <a:pt x="0" y="203200"/>
-                </a:moveTo>
-                <a:lnTo>
-                  <a:pt x="221673" y="0"/>
-                </a:lnTo>
-                <a:lnTo>
-                  <a:pt x="3048000" y="0"/>
-                </a:lnTo>
-              </a:path>
-            </a:pathLst>
-          </a:custGeom>
-          <a:noFill/>
-          <a:ln w="19050">
-            <a:solidFill>
-              <a:schemeClr val="accent3"/>
-            </a:solidFill>
-            <a:prstDash val="solid"/>
-            <a:headEnd type="none" w="med" len="med"/>
-            <a:tailEnd type="arrow" w="med" len="med"/>
-          </a:ln>
-          <a:effectLst/>
-        </p:spPr>
-        <p:style>
-          <a:lnRef idx="1">
-            <a:schemeClr val="accent2"/>
-          </a:lnRef>
-          <a:fillRef idx="2">
-            <a:schemeClr val="accent2"/>
-          </a:fillRef>
-          <a:effectRef idx="1">
-            <a:schemeClr val="accent2"/>
-          </a:effectRef>
-          <a:fontRef idx="minor">
-            <a:schemeClr val="dk1"/>
-          </a:fontRef>
-        </p:style>
-        <p:txBody>
-          <a:bodyPr rtlCol="0" anchor="ctr"/>
-          <a:lstStyle/>
-          <a:p>
-            <a:pPr algn="ctr"/>
-            <a:endParaRPr lang="en-SG"/>
-          </a:p>
-        </p:txBody>
-      </p:sp>
-      <p:sp>
-        <p:nvSpPr>
-          <p:cNvPr id="144" name="Rectangle 143"/>
-          <p:cNvSpPr/>
-          <p:nvPr/>
-        </p:nvSpPr>
-        <p:spPr>
-          <a:xfrm>
-            <a:off x="5431573" y="4488138"/>
-            <a:ext cx="229325" cy="160062"/>
-          </a:xfrm>
-          <a:prstGeom prst="rect">
-            <a:avLst/>
-          </a:prstGeom>
-          <a:solidFill>
-            <a:schemeClr val="accent3">
-              <a:lumMod val="20000"/>
-              <a:lumOff val="80000"/>
-              <a:alpha val="80000"/>
-            </a:schemeClr>
-          </a:solidFill>
-          <a:ln>
-            <a:noFill/>
-          </a:ln>
-          <a:effectLst>
-            <a:softEdge rad="31750"/>
-          </a:effectLst>
-        </p:spPr>
-        <p:style>
-          <a:lnRef idx="2">
-            <a:schemeClr val="accent1">
-              <a:shade val="50000"/>
-            </a:schemeClr>
-          </a:lnRef>
-          <a:fillRef idx="1">
-            <a:schemeClr val="accent1"/>
-          </a:fillRef>
-          <a:effectRef idx="0">
-            <a:schemeClr val="accent1"/>
-          </a:effectRef>
-          <a:fontRef idx="minor">
-            <a:schemeClr val="lt1"/>
-          </a:fontRef>
-        </p:style>
-        <p:txBody>
-          <a:bodyPr rtlCol="0" anchor="ctr"/>
-          <a:lstStyle/>
-          <a:p>
-            <a:pPr algn="ctr"/>
-            <a:endParaRPr lang="en-SG"/>
-          </a:p>
-        </p:txBody>
-      </p:sp>
-      <p:sp>
-        <p:nvSpPr>
-          <p:cNvPr id="118" name="Freeform 117"/>
-          <p:cNvSpPr/>
-          <p:nvPr/>
-        </p:nvSpPr>
-        <p:spPr>
-          <a:xfrm flipV="1">
-            <a:off x="4114799" y="4472708"/>
-            <a:ext cx="2642195" cy="101600"/>
-          </a:xfrm>
-          <a:custGeom>
-            <a:avLst/>
-            <a:gdLst>
-              <a:gd name="connsiteX0" fmla="*/ 0 w 3048000"/>
-              <a:gd name="connsiteY0" fmla="*/ 203200 h 203200"/>
-              <a:gd name="connsiteX1" fmla="*/ 221673 w 3048000"/>
-              <a:gd name="connsiteY1" fmla="*/ 0 h 203200"/>
-              <a:gd name="connsiteX2" fmla="*/ 3048000 w 3048000"/>
-              <a:gd name="connsiteY2" fmla="*/ 0 h 203200"/>
-            </a:gdLst>
-            <a:ahLst/>
-            <a:cxnLst>
-              <a:cxn ang="0">
-                <a:pos x="connsiteX0" y="connsiteY0"/>
-              </a:cxn>
-              <a:cxn ang="0">
-                <a:pos x="connsiteX1" y="connsiteY1"/>
-              </a:cxn>
-              <a:cxn ang="0">
-                <a:pos x="connsiteX2" y="connsiteY2"/>
-              </a:cxn>
-            </a:cxnLst>
-            <a:rect l="l" t="t" r="r" b="b"/>
-            <a:pathLst>
-              <a:path w="3048000" h="203200">
-                <a:moveTo>
-                  <a:pt x="0" y="203200"/>
-                </a:moveTo>
-                <a:lnTo>
-                  <a:pt x="221673" y="0"/>
-                </a:lnTo>
-                <a:lnTo>
-                  <a:pt x="3048000" y="0"/>
-                </a:lnTo>
-              </a:path>
-            </a:pathLst>
-          </a:custGeom>
-          <a:noFill/>
-          <a:ln w="19050">
-            <a:solidFill>
-              <a:schemeClr val="accent3"/>
-            </a:solidFill>
-            <a:prstDash val="sysDot"/>
-            <a:headEnd type="none" w="med" len="med"/>
-            <a:tailEnd type="arrow" w="med" len="med"/>
-          </a:ln>
-          <a:effectLst/>
-        </p:spPr>
-        <p:style>
-          <a:lnRef idx="1">
-            <a:schemeClr val="accent2"/>
-          </a:lnRef>
-          <a:fillRef idx="2">
-            <a:schemeClr val="accent2"/>
-          </a:fillRef>
-          <a:effectRef idx="1">
-            <a:schemeClr val="accent2"/>
-          </a:effectRef>
-          <a:fontRef idx="minor">
-            <a:schemeClr val="dk1"/>
-          </a:fontRef>
-        </p:style>
-        <p:txBody>
-          <a:bodyPr rtlCol="0" anchor="ctr"/>
-          <a:lstStyle/>
-          <a:p>
-            <a:pPr algn="ctr"/>
-            <a:endParaRPr lang="en-SG"/>
-          </a:p>
-        </p:txBody>
-      </p:sp>
+      </p:pic>
     </p:spTree>
     <p:extLst>
       <p:ext uri="{BB962C8B-B14F-4D97-AF65-F5344CB8AC3E}">

</xml_diff>